<commit_message>
Analyse_Präsentation_v1.pptx um eine Erste Version meines Teils erweitert, ausserdem den Folienmaster etwas aufgeräumt.
</commit_message>
<xml_diff>
--- a/Documents/Analyse/Analyse_Präsentation_v1.pptx
+++ b/Documents/Analyse/Analyse_Präsentation_v1.pptx
@@ -5,17 +5,21 @@
     <p:sldMasterId id="2147483696" r:id="rId1"/>
   </p:sldMasterIdLst>
   <p:notesMasterIdLst>
-    <p:notesMasterId r:id="rId7"/>
+    <p:notesMasterId r:id="rId11"/>
   </p:notesMasterIdLst>
   <p:handoutMasterIdLst>
-    <p:handoutMasterId r:id="rId8"/>
+    <p:handoutMasterId r:id="rId12"/>
   </p:handoutMasterIdLst>
   <p:sldIdLst>
     <p:sldId id="256" r:id="rId2"/>
-    <p:sldId id="257" r:id="rId3"/>
-    <p:sldId id="268" r:id="rId4"/>
-    <p:sldId id="258" r:id="rId5"/>
-    <p:sldId id="264" r:id="rId6"/>
+    <p:sldId id="261" r:id="rId3"/>
+    <p:sldId id="262" r:id="rId4"/>
+    <p:sldId id="260" r:id="rId5"/>
+    <p:sldId id="257" r:id="rId6"/>
+    <p:sldId id="258" r:id="rId7"/>
+    <p:sldId id="265" r:id="rId8"/>
+    <p:sldId id="263" r:id="rId9"/>
+    <p:sldId id="264" r:id="rId10"/>
   </p:sldIdLst>
   <p:sldSz cx="9144000" cy="6858000" type="screen4x3"/>
   <p:notesSz cx="6858000" cy="9144000"/>
@@ -116,7 +120,7 @@
   </p:defaultTextStyle>
   <p:extLst>
     <p:ext uri="{EFAFB233-063F-42B5-8137-9DF3F51BA10A}">
-      <p15:sldGuideLst xmlns:p15="http://schemas.microsoft.com/office/powerpoint/2012/main" xmlns="">
+      <p15:sldGuideLst xmlns:p15="http://schemas.microsoft.com/office/powerpoint/2012/main">
         <p15:guide id="1" orient="horz" pos="2160">
           <p15:clr>
             <a:srgbClr val="A4A3A4"/>
@@ -128,6 +132,9 @@
           </p15:clr>
         </p15:guide>
       </p15:sldGuideLst>
+    </p:ext>
+    <p:ext uri="{2D200454-40CA-4A62-9FC3-DE9A4176ACB9}">
+      <p15:notesGuideLst xmlns:p15="http://schemas.microsoft.com/office/powerpoint/2012/main"/>
     </p:ext>
   </p:extLst>
 </p:presentation>
@@ -281,7 +288,7 @@
           <a:p>
             <a:fld id="{8FA47960-71E6-41D7-97C8-9D68B0218EF7}" type="slidenum">
               <a:rPr lang="de-CH" smtClean="0"/>
-              <a:t>‹#›</a:t>
+              <a:t>‹Nr.›</a:t>
             </a:fld>
             <a:endParaRPr lang="de-CH"/>
           </a:p>
@@ -539,7 +546,7 @@
           <a:p>
             <a:fld id="{539D6FB8-A289-4D31-AE1B-368BC10F6FE7}" type="slidenum">
               <a:rPr lang="de-CH" smtClean="0"/>
-              <a:t>‹#›</a:t>
+              <a:t>‹Nr.›</a:t>
             </a:fld>
             <a:endParaRPr lang="de-CH"/>
           </a:p>
@@ -713,7 +720,7 @@
           <a:p>
             <a:fld id="{539D6FB8-A289-4D31-AE1B-368BC10F6FE7}" type="slidenum">
               <a:rPr lang="de-CH" smtClean="0"/>
-              <a:t>3</a:t>
+              <a:t>4</a:t>
             </a:fld>
             <a:endParaRPr lang="de-CH"/>
           </a:p>
@@ -722,7 +729,7 @@
     </p:spTree>
     <p:extLst>
       <p:ext uri="{BB962C8B-B14F-4D97-AF65-F5344CB8AC3E}">
-        <p14:creationId xmlns:p14="http://schemas.microsoft.com/office/powerpoint/2010/main" val="2228381965"/>
+        <p14:creationId xmlns:p14="http://schemas.microsoft.com/office/powerpoint/2010/main" val="2695757469"/>
       </p:ext>
     </p:extLst>
   </p:cSld>
@@ -732,9 +739,9 @@
 </p:notes>
 </file>
 
-<file path=ppt/notesSlides/notesSlide2.xml><?xml version="1.0" encoding="utf-8"?>
-<p:notes xmlns:a="http://schemas.openxmlformats.org/drawingml/2006/main" xmlns:r="http://schemas.openxmlformats.org/officeDocument/2006/relationships" xmlns:p="http://schemas.openxmlformats.org/presentationml/2006/main">
-  <p:cSld>
+<file path=ppt/slideLayouts/slideLayout1.xml><?xml version="1.0" encoding="utf-8"?>
+<p:sldLayout xmlns:a="http://schemas.openxmlformats.org/drawingml/2006/main" xmlns:r="http://schemas.openxmlformats.org/officeDocument/2006/relationships" xmlns:p="http://schemas.openxmlformats.org/presentationml/2006/main" type="titleOnly" preserve="1">
+  <p:cSld name="Title Only">
     <p:spTree>
       <p:nvGrpSpPr>
         <p:cNvPr id="1" name=""/>
@@ -751,24 +758,12 @@
       </p:grpSpPr>
       <p:sp>
         <p:nvSpPr>
-          <p:cNvPr id="2" name="Folienbildplatzhalter 1"/>
-          <p:cNvSpPr>
-            <a:spLocks noGrp="1" noRot="1" noChangeAspect="1"/>
-          </p:cNvSpPr>
-          <p:nvPr>
-            <p:ph type="sldImg"/>
-          </p:nvPr>
-        </p:nvSpPr>
-        <p:spPr/>
-      </p:sp>
-      <p:sp>
-        <p:nvSpPr>
-          <p:cNvPr id="3" name="Notizenplatzhalter 2"/>
-          <p:cNvSpPr>
-            <a:spLocks noGrp="1"/>
-          </p:cNvSpPr>
-          <p:nvPr>
-            <p:ph type="body" idx="1"/>
+          <p:cNvPr id="2" name="Title 1"/>
+          <p:cNvSpPr>
+            <a:spLocks noGrp="1"/>
+          </p:cNvSpPr>
+          <p:nvPr>
+            <p:ph type="title"/>
           </p:nvPr>
         </p:nvSpPr>
         <p:spPr/>
@@ -776,47 +771,704 @@
           <a:bodyPr/>
           <a:lstStyle/>
           <a:p>
-            <a:endParaRPr lang="de-CH" dirty="0"/>
-          </a:p>
-        </p:txBody>
-      </p:sp>
-      <p:sp>
-        <p:nvSpPr>
-          <p:cNvPr id="4" name="Foliennummernplatzhalter 3"/>
-          <p:cNvSpPr>
-            <a:spLocks noGrp="1"/>
-          </p:cNvSpPr>
-          <p:nvPr>
-            <p:ph type="sldNum" sz="quarter" idx="10"/>
-          </p:nvPr>
-        </p:nvSpPr>
-        <p:spPr/>
-        <p:txBody>
-          <a:bodyPr/>
-          <a:lstStyle/>
-          <a:p>
-            <a:fld id="{539D6FB8-A289-4D31-AE1B-368BC10F6FE7}" type="slidenum">
-              <a:rPr lang="de-CH" smtClean="0"/>
-              <a:t>4</a:t>
-            </a:fld>
-            <a:endParaRPr lang="de-CH"/>
+            <a:r>
+              <a:rPr lang="en-US" smtClean="0"/>
+              <a:t>Click to edit Master title style</a:t>
+            </a:r>
+            <a:endParaRPr lang="en-US"/>
           </a:p>
         </p:txBody>
       </p:sp>
     </p:spTree>
-    <p:extLst>
-      <p:ext uri="{BB962C8B-B14F-4D97-AF65-F5344CB8AC3E}">
-        <p14:creationId xmlns:p14="http://schemas.microsoft.com/office/powerpoint/2010/main" val="2665731172"/>
-      </p:ext>
-    </p:extLst>
   </p:cSld>
   <p:clrMapOvr>
     <a:masterClrMapping/>
   </p:clrMapOvr>
-</p:notes>
+  <p:timing>
+    <p:tnLst>
+      <p:par>
+        <p:cTn id="1" dur="indefinite" restart="never" nodeType="tmRoot"/>
+      </p:par>
+    </p:tnLst>
+  </p:timing>
+</p:sldLayout>
 </file>
 
-<file path=ppt/slideLayouts/slideLayout1.xml><?xml version="1.0" encoding="utf-8"?>
+<file path=ppt/slideLayouts/slideLayout10.xml><?xml version="1.0" encoding="utf-8"?>
+<p:sldLayout xmlns:a="http://schemas.openxmlformats.org/drawingml/2006/main" xmlns:r="http://schemas.openxmlformats.org/officeDocument/2006/relationships" xmlns:p="http://schemas.openxmlformats.org/presentationml/2006/main" type="vertTx" preserve="1">
+  <p:cSld name="Title and Vertical Text">
+    <p:spTree>
+      <p:nvGrpSpPr>
+        <p:cNvPr id="1" name=""/>
+        <p:cNvGrpSpPr/>
+        <p:nvPr/>
+      </p:nvGrpSpPr>
+      <p:grpSpPr>
+        <a:xfrm>
+          <a:off x="0" y="0"/>
+          <a:ext cx="0" cy="0"/>
+          <a:chOff x="0" y="0"/>
+          <a:chExt cx="0" cy="0"/>
+        </a:xfrm>
+      </p:grpSpPr>
+      <p:sp>
+        <p:nvSpPr>
+          <p:cNvPr id="2" name="Title 1"/>
+          <p:cNvSpPr>
+            <a:spLocks noGrp="1"/>
+          </p:cNvSpPr>
+          <p:nvPr>
+            <p:ph type="title"/>
+          </p:nvPr>
+        </p:nvSpPr>
+        <p:spPr/>
+        <p:txBody>
+          <a:bodyPr/>
+          <a:lstStyle/>
+          <a:p>
+            <a:r>
+              <a:rPr lang="en-US" smtClean="0"/>
+              <a:t>Click to edit Master title style</a:t>
+            </a:r>
+            <a:endParaRPr lang="en-US"/>
+          </a:p>
+        </p:txBody>
+      </p:sp>
+      <p:sp>
+        <p:nvSpPr>
+          <p:cNvPr id="3" name="Vertical Text Placeholder 2"/>
+          <p:cNvSpPr>
+            <a:spLocks noGrp="1"/>
+          </p:cNvSpPr>
+          <p:nvPr>
+            <p:ph type="body" orient="vert" idx="1"/>
+          </p:nvPr>
+        </p:nvSpPr>
+        <p:spPr/>
+        <p:txBody>
+          <a:bodyPr vert="eaVert"/>
+          <a:lstStyle/>
+          <a:p>
+            <a:pPr lvl="0"/>
+            <a:r>
+              <a:rPr lang="en-US" smtClean="0"/>
+              <a:t>Click to edit Master text styles</a:t>
+            </a:r>
+          </a:p>
+          <a:p>
+            <a:pPr lvl="1"/>
+            <a:r>
+              <a:rPr lang="en-US" smtClean="0"/>
+              <a:t>Second level</a:t>
+            </a:r>
+          </a:p>
+          <a:p>
+            <a:pPr lvl="2"/>
+            <a:r>
+              <a:rPr lang="en-US" smtClean="0"/>
+              <a:t>Third level</a:t>
+            </a:r>
+          </a:p>
+          <a:p>
+            <a:pPr lvl="3"/>
+            <a:r>
+              <a:rPr lang="en-US" smtClean="0"/>
+              <a:t>Fourth level</a:t>
+            </a:r>
+          </a:p>
+          <a:p>
+            <a:pPr lvl="4"/>
+            <a:r>
+              <a:rPr lang="en-US" smtClean="0"/>
+              <a:t>Fifth level</a:t>
+            </a:r>
+            <a:endParaRPr lang="en-US"/>
+          </a:p>
+        </p:txBody>
+      </p:sp>
+      <p:sp>
+        <p:nvSpPr>
+          <p:cNvPr id="4" name="Date Placeholder 3"/>
+          <p:cNvSpPr>
+            <a:spLocks noGrp="1"/>
+          </p:cNvSpPr>
+          <p:nvPr>
+            <p:ph type="dt" sz="half" idx="10"/>
+          </p:nvPr>
+        </p:nvSpPr>
+        <p:spPr>
+          <a:xfrm>
+            <a:off x="6007690" y="548797"/>
+            <a:ext cx="1189132" cy="297918"/>
+          </a:xfrm>
+          <a:prstGeom prst="rect">
+            <a:avLst/>
+          </a:prstGeom>
+        </p:spPr>
+        <p:txBody>
+          <a:bodyPr/>
+          <a:lstStyle/>
+          <a:p>
+            <a:fld id="{1BA50D42-C9CD-4801-B293-61D1F53EC57E}" type="datetimeFigureOut">
+              <a:rPr lang="de-DE" smtClean="0"/>
+              <a:t>16.10.2014</a:t>
+            </a:fld>
+            <a:endParaRPr lang="de-DE"/>
+          </a:p>
+        </p:txBody>
+      </p:sp>
+      <p:sp>
+        <p:nvSpPr>
+          <p:cNvPr id="5" name="Footer Placeholder 4"/>
+          <p:cNvSpPr>
+            <a:spLocks noGrp="1"/>
+          </p:cNvSpPr>
+          <p:nvPr>
+            <p:ph type="ftr" sz="quarter" idx="11"/>
+          </p:nvPr>
+        </p:nvSpPr>
+        <p:spPr>
+          <a:xfrm>
+            <a:off x="6008688" y="855956"/>
+            <a:ext cx="2246489" cy="301227"/>
+          </a:xfrm>
+          <a:prstGeom prst="rect">
+            <a:avLst/>
+          </a:prstGeom>
+        </p:spPr>
+        <p:txBody>
+          <a:bodyPr/>
+          <a:lstStyle/>
+          <a:p>
+            <a:endParaRPr lang="de-DE"/>
+          </a:p>
+        </p:txBody>
+      </p:sp>
+      <p:sp>
+        <p:nvSpPr>
+          <p:cNvPr id="6" name="Slide Number Placeholder 5"/>
+          <p:cNvSpPr>
+            <a:spLocks noGrp="1"/>
+          </p:cNvSpPr>
+          <p:nvPr>
+            <p:ph type="sldNum" sz="quarter" idx="12"/>
+          </p:nvPr>
+        </p:nvSpPr>
+        <p:spPr>
+          <a:xfrm>
+            <a:off x="7314415" y="548797"/>
+            <a:ext cx="941203" cy="301752"/>
+          </a:xfrm>
+          <a:prstGeom prst="rect">
+            <a:avLst/>
+          </a:prstGeom>
+        </p:spPr>
+        <p:txBody>
+          <a:bodyPr/>
+          <a:lstStyle/>
+          <a:p>
+            <a:fld id="{6C6AE60A-B69C-4790-82F7-3882EDF23186}" type="slidenum">
+              <a:rPr lang="de-DE" smtClean="0"/>
+              <a:t>‹Nr.›</a:t>
+            </a:fld>
+            <a:endParaRPr lang="de-DE"/>
+          </a:p>
+        </p:txBody>
+      </p:sp>
+    </p:spTree>
+  </p:cSld>
+  <p:clrMapOvr>
+    <a:masterClrMapping/>
+  </p:clrMapOvr>
+</p:sldLayout>
+</file>
+
+<file path=ppt/slideLayouts/slideLayout11.xml><?xml version="1.0" encoding="utf-8"?>
+<p:sldLayout xmlns:a="http://schemas.openxmlformats.org/drawingml/2006/main" xmlns:r="http://schemas.openxmlformats.org/officeDocument/2006/relationships" xmlns:p="http://schemas.openxmlformats.org/presentationml/2006/main" type="vertTitleAndTx" preserve="1">
+  <p:cSld name="Vertical Title and Text">
+    <p:spTree>
+      <p:nvGrpSpPr>
+        <p:cNvPr id="1" name=""/>
+        <p:cNvGrpSpPr/>
+        <p:nvPr/>
+      </p:nvGrpSpPr>
+      <p:grpSpPr>
+        <a:xfrm>
+          <a:off x="0" y="0"/>
+          <a:ext cx="0" cy="0"/>
+          <a:chOff x="0" y="0"/>
+          <a:chExt cx="0" cy="0"/>
+        </a:xfrm>
+      </p:grpSpPr>
+      <p:sp>
+        <p:nvSpPr>
+          <p:cNvPr id="2" name="Vertical Title 1"/>
+          <p:cNvSpPr>
+            <a:spLocks noGrp="1"/>
+          </p:cNvSpPr>
+          <p:nvPr>
+            <p:ph type="title" orient="vert"/>
+          </p:nvPr>
+        </p:nvSpPr>
+        <p:spPr>
+          <a:xfrm>
+            <a:off x="6248400" y="1826709"/>
+            <a:ext cx="1492499" cy="4484454"/>
+          </a:xfrm>
+        </p:spPr>
+        <p:txBody>
+          <a:bodyPr vert="eaVert"/>
+          <a:lstStyle/>
+          <a:p>
+            <a:r>
+              <a:rPr lang="en-US" smtClean="0"/>
+              <a:t>Click to edit Master title style</a:t>
+            </a:r>
+            <a:endParaRPr lang="en-US"/>
+          </a:p>
+        </p:txBody>
+      </p:sp>
+      <p:sp>
+        <p:nvSpPr>
+          <p:cNvPr id="3" name="Vertical Text Placeholder 2"/>
+          <p:cNvSpPr>
+            <a:spLocks noGrp="1"/>
+          </p:cNvSpPr>
+          <p:nvPr>
+            <p:ph type="body" orient="vert" idx="1"/>
+          </p:nvPr>
+        </p:nvSpPr>
+        <p:spPr>
+          <a:xfrm>
+            <a:off x="854524" y="1826709"/>
+            <a:ext cx="5241476" cy="4484454"/>
+          </a:xfrm>
+        </p:spPr>
+        <p:txBody>
+          <a:bodyPr vert="eaVert"/>
+          <a:lstStyle/>
+          <a:p>
+            <a:pPr lvl="0"/>
+            <a:r>
+              <a:rPr lang="en-US" smtClean="0"/>
+              <a:t>Click to edit Master text styles</a:t>
+            </a:r>
+          </a:p>
+          <a:p>
+            <a:pPr lvl="1"/>
+            <a:r>
+              <a:rPr lang="en-US" smtClean="0"/>
+              <a:t>Second level</a:t>
+            </a:r>
+          </a:p>
+          <a:p>
+            <a:pPr lvl="2"/>
+            <a:r>
+              <a:rPr lang="en-US" smtClean="0"/>
+              <a:t>Third level</a:t>
+            </a:r>
+          </a:p>
+          <a:p>
+            <a:pPr lvl="3"/>
+            <a:r>
+              <a:rPr lang="en-US" smtClean="0"/>
+              <a:t>Fourth level</a:t>
+            </a:r>
+          </a:p>
+          <a:p>
+            <a:pPr lvl="4"/>
+            <a:r>
+              <a:rPr lang="en-US" smtClean="0"/>
+              <a:t>Fifth level</a:t>
+            </a:r>
+            <a:endParaRPr lang="en-US"/>
+          </a:p>
+        </p:txBody>
+      </p:sp>
+      <p:sp>
+        <p:nvSpPr>
+          <p:cNvPr id="4" name="Date Placeholder 3"/>
+          <p:cNvSpPr>
+            <a:spLocks noGrp="1"/>
+          </p:cNvSpPr>
+          <p:nvPr>
+            <p:ph type="dt" sz="half" idx="10"/>
+          </p:nvPr>
+        </p:nvSpPr>
+        <p:spPr>
+          <a:xfrm>
+            <a:off x="6007690" y="548797"/>
+            <a:ext cx="1189132" cy="297918"/>
+          </a:xfrm>
+          <a:prstGeom prst="rect">
+            <a:avLst/>
+          </a:prstGeom>
+        </p:spPr>
+        <p:txBody>
+          <a:bodyPr/>
+          <a:lstStyle/>
+          <a:p>
+            <a:fld id="{1BA50D42-C9CD-4801-B293-61D1F53EC57E}" type="datetimeFigureOut">
+              <a:rPr lang="de-DE" smtClean="0"/>
+              <a:t>16.10.2014</a:t>
+            </a:fld>
+            <a:endParaRPr lang="de-DE"/>
+          </a:p>
+        </p:txBody>
+      </p:sp>
+      <p:sp>
+        <p:nvSpPr>
+          <p:cNvPr id="5" name="Footer Placeholder 4"/>
+          <p:cNvSpPr>
+            <a:spLocks noGrp="1"/>
+          </p:cNvSpPr>
+          <p:nvPr>
+            <p:ph type="ftr" sz="quarter" idx="11"/>
+          </p:nvPr>
+        </p:nvSpPr>
+        <p:spPr>
+          <a:xfrm>
+            <a:off x="6008688" y="855956"/>
+            <a:ext cx="2246489" cy="301227"/>
+          </a:xfrm>
+          <a:prstGeom prst="rect">
+            <a:avLst/>
+          </a:prstGeom>
+        </p:spPr>
+        <p:txBody>
+          <a:bodyPr/>
+          <a:lstStyle/>
+          <a:p>
+            <a:endParaRPr lang="de-DE"/>
+          </a:p>
+        </p:txBody>
+      </p:sp>
+      <p:sp>
+        <p:nvSpPr>
+          <p:cNvPr id="6" name="Slide Number Placeholder 5"/>
+          <p:cNvSpPr>
+            <a:spLocks noGrp="1"/>
+          </p:cNvSpPr>
+          <p:nvPr>
+            <p:ph type="sldNum" sz="quarter" idx="12"/>
+          </p:nvPr>
+        </p:nvSpPr>
+        <p:spPr>
+          <a:xfrm>
+            <a:off x="7314415" y="548797"/>
+            <a:ext cx="941203" cy="301752"/>
+          </a:xfrm>
+          <a:prstGeom prst="rect">
+            <a:avLst/>
+          </a:prstGeom>
+        </p:spPr>
+        <p:txBody>
+          <a:bodyPr/>
+          <a:lstStyle/>
+          <a:p>
+            <a:fld id="{6C6AE60A-B69C-4790-82F7-3882EDF23186}" type="slidenum">
+              <a:rPr lang="de-DE" smtClean="0"/>
+              <a:t>‹Nr.›</a:t>
+            </a:fld>
+            <a:endParaRPr lang="de-DE"/>
+          </a:p>
+        </p:txBody>
+      </p:sp>
+    </p:spTree>
+  </p:cSld>
+  <p:clrMapOvr>
+    <a:masterClrMapping/>
+  </p:clrMapOvr>
+</p:sldLayout>
+</file>
+
+<file path=ppt/slideLayouts/slideLayout2.xml><?xml version="1.0" encoding="utf-8"?>
+<p:sldLayout xmlns:a="http://schemas.openxmlformats.org/drawingml/2006/main" xmlns:r="http://schemas.openxmlformats.org/officeDocument/2006/relationships" xmlns:p="http://schemas.openxmlformats.org/presentationml/2006/main" type="obj" preserve="1">
+  <p:cSld name="Title and Content">
+    <p:spTree>
+      <p:nvGrpSpPr>
+        <p:cNvPr id="1" name=""/>
+        <p:cNvGrpSpPr/>
+        <p:nvPr/>
+      </p:nvGrpSpPr>
+      <p:grpSpPr>
+        <a:xfrm>
+          <a:off x="0" y="0"/>
+          <a:ext cx="0" cy="0"/>
+          <a:chOff x="0" y="0"/>
+          <a:chExt cx="0" cy="0"/>
+        </a:xfrm>
+      </p:grpSpPr>
+      <p:sp>
+        <p:nvSpPr>
+          <p:cNvPr id="2" name="Title 1"/>
+          <p:cNvSpPr>
+            <a:spLocks noGrp="1"/>
+          </p:cNvSpPr>
+          <p:nvPr>
+            <p:ph type="title"/>
+          </p:nvPr>
+        </p:nvSpPr>
+        <p:spPr>
+          <a:xfrm>
+            <a:off x="538480" y="330687"/>
+            <a:ext cx="7691120" cy="938073"/>
+          </a:xfrm>
+        </p:spPr>
+        <p:txBody>
+          <a:bodyPr/>
+          <a:lstStyle/>
+          <a:p>
+            <a:r>
+              <a:rPr lang="en-US" smtClean="0"/>
+              <a:t>Click to edit Master title style</a:t>
+            </a:r>
+            <a:endParaRPr lang="en-US"/>
+          </a:p>
+        </p:txBody>
+      </p:sp>
+      <p:sp>
+        <p:nvSpPr>
+          <p:cNvPr id="3" name="Content Placeholder 2"/>
+          <p:cNvSpPr>
+            <a:spLocks noGrp="1"/>
+          </p:cNvSpPr>
+          <p:nvPr>
+            <p:ph idx="1"/>
+          </p:nvPr>
+        </p:nvSpPr>
+        <p:spPr/>
+        <p:txBody>
+          <a:bodyPr/>
+          <a:lstStyle/>
+          <a:p>
+            <a:pPr lvl="0"/>
+            <a:r>
+              <a:rPr lang="en-US" dirty="0" smtClean="0"/>
+              <a:t>Click to edit Master text styles</a:t>
+            </a:r>
+          </a:p>
+          <a:p>
+            <a:pPr lvl="1"/>
+            <a:r>
+              <a:rPr lang="en-US" dirty="0" smtClean="0"/>
+              <a:t>Second level</a:t>
+            </a:r>
+          </a:p>
+          <a:p>
+            <a:pPr lvl="2"/>
+            <a:r>
+              <a:rPr lang="en-US" dirty="0" smtClean="0"/>
+              <a:t>Third level</a:t>
+            </a:r>
+          </a:p>
+          <a:p>
+            <a:pPr lvl="3"/>
+            <a:r>
+              <a:rPr lang="en-US" dirty="0" smtClean="0"/>
+              <a:t>Fourth level</a:t>
+            </a:r>
+          </a:p>
+          <a:p>
+            <a:pPr lvl="4"/>
+            <a:r>
+              <a:rPr lang="en-US" dirty="0" smtClean="0"/>
+              <a:t>Fifth level</a:t>
+            </a:r>
+            <a:endParaRPr lang="en-US" dirty="0"/>
+          </a:p>
+        </p:txBody>
+      </p:sp>
+    </p:spTree>
+  </p:cSld>
+  <p:clrMapOvr>
+    <a:masterClrMapping/>
+  </p:clrMapOvr>
+  <p:timing>
+    <p:tnLst>
+      <p:par>
+        <p:cTn id="1" dur="indefinite" restart="never" nodeType="tmRoot"/>
+      </p:par>
+    </p:tnLst>
+  </p:timing>
+</p:sldLayout>
+</file>
+
+<file path=ppt/slideLayouts/slideLayout3.xml><?xml version="1.0" encoding="utf-8"?>
+<p:sldLayout xmlns:a="http://schemas.openxmlformats.org/drawingml/2006/main" xmlns:r="http://schemas.openxmlformats.org/officeDocument/2006/relationships" xmlns:p="http://schemas.openxmlformats.org/presentationml/2006/main" type="twoObj" preserve="1">
+  <p:cSld name="Two Content">
+    <p:spTree>
+      <p:nvGrpSpPr>
+        <p:cNvPr id="1" name=""/>
+        <p:cNvGrpSpPr/>
+        <p:nvPr/>
+      </p:nvGrpSpPr>
+      <p:grpSpPr>
+        <a:xfrm>
+          <a:off x="0" y="0"/>
+          <a:ext cx="0" cy="0"/>
+          <a:chOff x="0" y="0"/>
+          <a:chExt cx="0" cy="0"/>
+        </a:xfrm>
+      </p:grpSpPr>
+      <p:sp>
+        <p:nvSpPr>
+          <p:cNvPr id="9" name="Title 8"/>
+          <p:cNvSpPr>
+            <a:spLocks noGrp="1"/>
+          </p:cNvSpPr>
+          <p:nvPr>
+            <p:ph type="title"/>
+          </p:nvPr>
+        </p:nvSpPr>
+        <p:spPr>
+          <a:xfrm>
+            <a:off x="539552" y="330687"/>
+            <a:ext cx="7704856" cy="938073"/>
+          </a:xfrm>
+        </p:spPr>
+        <p:txBody>
+          <a:bodyPr/>
+          <a:lstStyle/>
+          <a:p>
+            <a:r>
+              <a:rPr lang="en-US" dirty="0" smtClean="0"/>
+              <a:t>Click to edit Master title style</a:t>
+            </a:r>
+            <a:endParaRPr lang="en-US" dirty="0"/>
+          </a:p>
+        </p:txBody>
+      </p:sp>
+      <p:sp>
+        <p:nvSpPr>
+          <p:cNvPr id="8" name="Content Placeholder 7"/>
+          <p:cNvSpPr>
+            <a:spLocks noGrp="1"/>
+          </p:cNvSpPr>
+          <p:nvPr>
+            <p:ph sz="quarter" idx="13"/>
+          </p:nvPr>
+        </p:nvSpPr>
+        <p:spPr>
+          <a:xfrm>
+            <a:off x="539552" y="1412776"/>
+            <a:ext cx="4032448" cy="4896544"/>
+          </a:xfrm>
+        </p:spPr>
+        <p:txBody>
+          <a:bodyPr/>
+          <a:lstStyle/>
+          <a:p>
+            <a:pPr lvl="0"/>
+            <a:r>
+              <a:rPr lang="en-US" smtClean="0"/>
+              <a:t>Click to edit Master text styles</a:t>
+            </a:r>
+          </a:p>
+          <a:p>
+            <a:pPr lvl="1"/>
+            <a:r>
+              <a:rPr lang="en-US" smtClean="0"/>
+              <a:t>Second level</a:t>
+            </a:r>
+          </a:p>
+          <a:p>
+            <a:pPr lvl="2"/>
+            <a:r>
+              <a:rPr lang="en-US" smtClean="0"/>
+              <a:t>Third level</a:t>
+            </a:r>
+          </a:p>
+          <a:p>
+            <a:pPr lvl="3"/>
+            <a:r>
+              <a:rPr lang="en-US" smtClean="0"/>
+              <a:t>Fourth level</a:t>
+            </a:r>
+          </a:p>
+          <a:p>
+            <a:pPr lvl="4"/>
+            <a:r>
+              <a:rPr lang="en-US" smtClean="0"/>
+              <a:t>Fifth level</a:t>
+            </a:r>
+            <a:endParaRPr lang="en-US"/>
+          </a:p>
+        </p:txBody>
+      </p:sp>
+      <p:sp>
+        <p:nvSpPr>
+          <p:cNvPr id="11" name="Content Placeholder 10"/>
+          <p:cNvSpPr>
+            <a:spLocks noGrp="1"/>
+          </p:cNvSpPr>
+          <p:nvPr>
+            <p:ph sz="quarter" idx="14"/>
+          </p:nvPr>
+        </p:nvSpPr>
+        <p:spPr>
+          <a:xfrm>
+            <a:off x="4644008" y="1412776"/>
+            <a:ext cx="3960440" cy="4896544"/>
+          </a:xfrm>
+        </p:spPr>
+        <p:txBody>
+          <a:bodyPr/>
+          <a:lstStyle/>
+          <a:p>
+            <a:pPr lvl="0"/>
+            <a:r>
+              <a:rPr lang="en-US" dirty="0" smtClean="0"/>
+              <a:t>Click to edit Master text styles</a:t>
+            </a:r>
+          </a:p>
+          <a:p>
+            <a:pPr lvl="1"/>
+            <a:r>
+              <a:rPr lang="en-US" dirty="0" smtClean="0"/>
+              <a:t>Second level</a:t>
+            </a:r>
+          </a:p>
+          <a:p>
+            <a:pPr lvl="2"/>
+            <a:r>
+              <a:rPr lang="en-US" dirty="0" smtClean="0"/>
+              <a:t>Third level</a:t>
+            </a:r>
+          </a:p>
+          <a:p>
+            <a:pPr lvl="3"/>
+            <a:r>
+              <a:rPr lang="en-US" dirty="0" smtClean="0"/>
+              <a:t>Fourth level</a:t>
+            </a:r>
+          </a:p>
+          <a:p>
+            <a:pPr lvl="4"/>
+            <a:r>
+              <a:rPr lang="en-US" dirty="0" smtClean="0"/>
+              <a:t>Fifth level</a:t>
+            </a:r>
+            <a:endParaRPr lang="en-US" dirty="0"/>
+          </a:p>
+        </p:txBody>
+      </p:sp>
+    </p:spTree>
+  </p:cSld>
+  <p:clrMapOvr>
+    <a:masterClrMapping/>
+  </p:clrMapOvr>
+  <p:timing>
+    <p:tnLst>
+      <p:par>
+        <p:cTn id="1" dur="indefinite" restart="never" nodeType="tmRoot"/>
+      </p:par>
+    </p:tnLst>
+  </p:timing>
+</p:sldLayout>
+</file>
+
+<file path=ppt/slideLayouts/slideLayout4.xml><?xml version="1.0" encoding="utf-8"?>
 <p:sldLayout xmlns:a="http://schemas.openxmlformats.org/drawingml/2006/main" xmlns:r="http://schemas.openxmlformats.org/officeDocument/2006/relationships" xmlns:p="http://schemas.openxmlformats.org/presentationml/2006/main" type="title" preserve="1">
   <p:cSld name="Title Slide">
     <p:spTree>
@@ -1042,7 +1694,7 @@
           <a:p>
             <a:fld id="{6C6AE60A-B69C-4790-82F7-3882EDF23186}" type="slidenum">
               <a:rPr lang="de-DE" smtClean="0"/>
-              <a:t>‹#›</a:t>
+              <a:t>‹Nr.›</a:t>
             </a:fld>
             <a:endParaRPr lang="de-DE"/>
           </a:p>
@@ -1090,596 +1742,7 @@
 </p:sldLayout>
 </file>
 
-<file path=ppt/slideLayouts/slideLayout10.xml><?xml version="1.0" encoding="utf-8"?>
-<p:sldLayout xmlns:a="http://schemas.openxmlformats.org/drawingml/2006/main" xmlns:r="http://schemas.openxmlformats.org/officeDocument/2006/relationships" xmlns:p="http://schemas.openxmlformats.org/presentationml/2006/main" type="vertTx" preserve="1">
-  <p:cSld name="Title and Vertical Text">
-    <p:spTree>
-      <p:nvGrpSpPr>
-        <p:cNvPr id="1" name=""/>
-        <p:cNvGrpSpPr/>
-        <p:nvPr/>
-      </p:nvGrpSpPr>
-      <p:grpSpPr>
-        <a:xfrm>
-          <a:off x="0" y="0"/>
-          <a:ext cx="0" cy="0"/>
-          <a:chOff x="0" y="0"/>
-          <a:chExt cx="0" cy="0"/>
-        </a:xfrm>
-      </p:grpSpPr>
-      <p:sp>
-        <p:nvSpPr>
-          <p:cNvPr id="2" name="Title 1"/>
-          <p:cNvSpPr>
-            <a:spLocks noGrp="1"/>
-          </p:cNvSpPr>
-          <p:nvPr>
-            <p:ph type="title"/>
-          </p:nvPr>
-        </p:nvSpPr>
-        <p:spPr/>
-        <p:txBody>
-          <a:bodyPr/>
-          <a:lstStyle/>
-          <a:p>
-            <a:r>
-              <a:rPr lang="en-US" smtClean="0"/>
-              <a:t>Click to edit Master title style</a:t>
-            </a:r>
-            <a:endParaRPr lang="en-US"/>
-          </a:p>
-        </p:txBody>
-      </p:sp>
-      <p:sp>
-        <p:nvSpPr>
-          <p:cNvPr id="3" name="Vertical Text Placeholder 2"/>
-          <p:cNvSpPr>
-            <a:spLocks noGrp="1"/>
-          </p:cNvSpPr>
-          <p:nvPr>
-            <p:ph type="body" orient="vert" idx="1"/>
-          </p:nvPr>
-        </p:nvSpPr>
-        <p:spPr/>
-        <p:txBody>
-          <a:bodyPr vert="eaVert"/>
-          <a:lstStyle/>
-          <a:p>
-            <a:pPr lvl="0"/>
-            <a:r>
-              <a:rPr lang="en-US" smtClean="0"/>
-              <a:t>Click to edit Master text styles</a:t>
-            </a:r>
-          </a:p>
-          <a:p>
-            <a:pPr lvl="1"/>
-            <a:r>
-              <a:rPr lang="en-US" smtClean="0"/>
-              <a:t>Second level</a:t>
-            </a:r>
-          </a:p>
-          <a:p>
-            <a:pPr lvl="2"/>
-            <a:r>
-              <a:rPr lang="en-US" smtClean="0"/>
-              <a:t>Third level</a:t>
-            </a:r>
-          </a:p>
-          <a:p>
-            <a:pPr lvl="3"/>
-            <a:r>
-              <a:rPr lang="en-US" smtClean="0"/>
-              <a:t>Fourth level</a:t>
-            </a:r>
-          </a:p>
-          <a:p>
-            <a:pPr lvl="4"/>
-            <a:r>
-              <a:rPr lang="en-US" smtClean="0"/>
-              <a:t>Fifth level</a:t>
-            </a:r>
-            <a:endParaRPr lang="en-US"/>
-          </a:p>
-        </p:txBody>
-      </p:sp>
-      <p:sp>
-        <p:nvSpPr>
-          <p:cNvPr id="4" name="Date Placeholder 3"/>
-          <p:cNvSpPr>
-            <a:spLocks noGrp="1"/>
-          </p:cNvSpPr>
-          <p:nvPr>
-            <p:ph type="dt" sz="half" idx="10"/>
-          </p:nvPr>
-        </p:nvSpPr>
-        <p:spPr>
-          <a:xfrm>
-            <a:off x="6007690" y="548797"/>
-            <a:ext cx="1189132" cy="297918"/>
-          </a:xfrm>
-          <a:prstGeom prst="rect">
-            <a:avLst/>
-          </a:prstGeom>
-        </p:spPr>
-        <p:txBody>
-          <a:bodyPr/>
-          <a:lstStyle/>
-          <a:p>
-            <a:fld id="{1BA50D42-C9CD-4801-B293-61D1F53EC57E}" type="datetimeFigureOut">
-              <a:rPr lang="de-DE" smtClean="0"/>
-              <a:t>16.10.2014</a:t>
-            </a:fld>
-            <a:endParaRPr lang="de-DE"/>
-          </a:p>
-        </p:txBody>
-      </p:sp>
-      <p:sp>
-        <p:nvSpPr>
-          <p:cNvPr id="5" name="Footer Placeholder 4"/>
-          <p:cNvSpPr>
-            <a:spLocks noGrp="1"/>
-          </p:cNvSpPr>
-          <p:nvPr>
-            <p:ph type="ftr" sz="quarter" idx="11"/>
-          </p:nvPr>
-        </p:nvSpPr>
-        <p:spPr>
-          <a:xfrm>
-            <a:off x="6008688" y="855956"/>
-            <a:ext cx="2246489" cy="301227"/>
-          </a:xfrm>
-          <a:prstGeom prst="rect">
-            <a:avLst/>
-          </a:prstGeom>
-        </p:spPr>
-        <p:txBody>
-          <a:bodyPr/>
-          <a:lstStyle/>
-          <a:p>
-            <a:endParaRPr lang="de-DE"/>
-          </a:p>
-        </p:txBody>
-      </p:sp>
-      <p:sp>
-        <p:nvSpPr>
-          <p:cNvPr id="6" name="Slide Number Placeholder 5"/>
-          <p:cNvSpPr>
-            <a:spLocks noGrp="1"/>
-          </p:cNvSpPr>
-          <p:nvPr>
-            <p:ph type="sldNum" sz="quarter" idx="12"/>
-          </p:nvPr>
-        </p:nvSpPr>
-        <p:spPr>
-          <a:xfrm>
-            <a:off x="7314415" y="548797"/>
-            <a:ext cx="941203" cy="301752"/>
-          </a:xfrm>
-          <a:prstGeom prst="rect">
-            <a:avLst/>
-          </a:prstGeom>
-        </p:spPr>
-        <p:txBody>
-          <a:bodyPr/>
-          <a:lstStyle/>
-          <a:p>
-            <a:fld id="{6C6AE60A-B69C-4790-82F7-3882EDF23186}" type="slidenum">
-              <a:rPr lang="de-DE" smtClean="0"/>
-              <a:t>‹#›</a:t>
-            </a:fld>
-            <a:endParaRPr lang="de-DE"/>
-          </a:p>
-        </p:txBody>
-      </p:sp>
-    </p:spTree>
-  </p:cSld>
-  <p:clrMapOvr>
-    <a:masterClrMapping/>
-  </p:clrMapOvr>
-</p:sldLayout>
-</file>
-
-<file path=ppt/slideLayouts/slideLayout11.xml><?xml version="1.0" encoding="utf-8"?>
-<p:sldLayout xmlns:a="http://schemas.openxmlformats.org/drawingml/2006/main" xmlns:r="http://schemas.openxmlformats.org/officeDocument/2006/relationships" xmlns:p="http://schemas.openxmlformats.org/presentationml/2006/main" type="vertTitleAndTx" preserve="1">
-  <p:cSld name="Vertical Title and Text">
-    <p:spTree>
-      <p:nvGrpSpPr>
-        <p:cNvPr id="1" name=""/>
-        <p:cNvGrpSpPr/>
-        <p:nvPr/>
-      </p:nvGrpSpPr>
-      <p:grpSpPr>
-        <a:xfrm>
-          <a:off x="0" y="0"/>
-          <a:ext cx="0" cy="0"/>
-          <a:chOff x="0" y="0"/>
-          <a:chExt cx="0" cy="0"/>
-        </a:xfrm>
-      </p:grpSpPr>
-      <p:sp>
-        <p:nvSpPr>
-          <p:cNvPr id="2" name="Vertical Title 1"/>
-          <p:cNvSpPr>
-            <a:spLocks noGrp="1"/>
-          </p:cNvSpPr>
-          <p:nvPr>
-            <p:ph type="title" orient="vert"/>
-          </p:nvPr>
-        </p:nvSpPr>
-        <p:spPr>
-          <a:xfrm>
-            <a:off x="6248400" y="1826709"/>
-            <a:ext cx="1492499" cy="4484454"/>
-          </a:xfrm>
-        </p:spPr>
-        <p:txBody>
-          <a:bodyPr vert="eaVert"/>
-          <a:lstStyle/>
-          <a:p>
-            <a:r>
-              <a:rPr lang="en-US" smtClean="0"/>
-              <a:t>Click to edit Master title style</a:t>
-            </a:r>
-            <a:endParaRPr lang="en-US"/>
-          </a:p>
-        </p:txBody>
-      </p:sp>
-      <p:sp>
-        <p:nvSpPr>
-          <p:cNvPr id="3" name="Vertical Text Placeholder 2"/>
-          <p:cNvSpPr>
-            <a:spLocks noGrp="1"/>
-          </p:cNvSpPr>
-          <p:nvPr>
-            <p:ph type="body" orient="vert" idx="1"/>
-          </p:nvPr>
-        </p:nvSpPr>
-        <p:spPr>
-          <a:xfrm>
-            <a:off x="854524" y="1826709"/>
-            <a:ext cx="5241476" cy="4484454"/>
-          </a:xfrm>
-        </p:spPr>
-        <p:txBody>
-          <a:bodyPr vert="eaVert"/>
-          <a:lstStyle/>
-          <a:p>
-            <a:pPr lvl="0"/>
-            <a:r>
-              <a:rPr lang="en-US" smtClean="0"/>
-              <a:t>Click to edit Master text styles</a:t>
-            </a:r>
-          </a:p>
-          <a:p>
-            <a:pPr lvl="1"/>
-            <a:r>
-              <a:rPr lang="en-US" smtClean="0"/>
-              <a:t>Second level</a:t>
-            </a:r>
-          </a:p>
-          <a:p>
-            <a:pPr lvl="2"/>
-            <a:r>
-              <a:rPr lang="en-US" smtClean="0"/>
-              <a:t>Third level</a:t>
-            </a:r>
-          </a:p>
-          <a:p>
-            <a:pPr lvl="3"/>
-            <a:r>
-              <a:rPr lang="en-US" smtClean="0"/>
-              <a:t>Fourth level</a:t>
-            </a:r>
-          </a:p>
-          <a:p>
-            <a:pPr lvl="4"/>
-            <a:r>
-              <a:rPr lang="en-US" smtClean="0"/>
-              <a:t>Fifth level</a:t>
-            </a:r>
-            <a:endParaRPr lang="en-US"/>
-          </a:p>
-        </p:txBody>
-      </p:sp>
-      <p:sp>
-        <p:nvSpPr>
-          <p:cNvPr id="4" name="Date Placeholder 3"/>
-          <p:cNvSpPr>
-            <a:spLocks noGrp="1"/>
-          </p:cNvSpPr>
-          <p:nvPr>
-            <p:ph type="dt" sz="half" idx="10"/>
-          </p:nvPr>
-        </p:nvSpPr>
-        <p:spPr>
-          <a:xfrm>
-            <a:off x="6007690" y="548797"/>
-            <a:ext cx="1189132" cy="297918"/>
-          </a:xfrm>
-          <a:prstGeom prst="rect">
-            <a:avLst/>
-          </a:prstGeom>
-        </p:spPr>
-        <p:txBody>
-          <a:bodyPr/>
-          <a:lstStyle/>
-          <a:p>
-            <a:fld id="{1BA50D42-C9CD-4801-B293-61D1F53EC57E}" type="datetimeFigureOut">
-              <a:rPr lang="de-DE" smtClean="0"/>
-              <a:t>16.10.2014</a:t>
-            </a:fld>
-            <a:endParaRPr lang="de-DE"/>
-          </a:p>
-        </p:txBody>
-      </p:sp>
-      <p:sp>
-        <p:nvSpPr>
-          <p:cNvPr id="5" name="Footer Placeholder 4"/>
-          <p:cNvSpPr>
-            <a:spLocks noGrp="1"/>
-          </p:cNvSpPr>
-          <p:nvPr>
-            <p:ph type="ftr" sz="quarter" idx="11"/>
-          </p:nvPr>
-        </p:nvSpPr>
-        <p:spPr>
-          <a:xfrm>
-            <a:off x="6008688" y="855956"/>
-            <a:ext cx="2246489" cy="301227"/>
-          </a:xfrm>
-          <a:prstGeom prst="rect">
-            <a:avLst/>
-          </a:prstGeom>
-        </p:spPr>
-        <p:txBody>
-          <a:bodyPr/>
-          <a:lstStyle/>
-          <a:p>
-            <a:endParaRPr lang="de-DE"/>
-          </a:p>
-        </p:txBody>
-      </p:sp>
-      <p:sp>
-        <p:nvSpPr>
-          <p:cNvPr id="6" name="Slide Number Placeholder 5"/>
-          <p:cNvSpPr>
-            <a:spLocks noGrp="1"/>
-          </p:cNvSpPr>
-          <p:nvPr>
-            <p:ph type="sldNum" sz="quarter" idx="12"/>
-          </p:nvPr>
-        </p:nvSpPr>
-        <p:spPr>
-          <a:xfrm>
-            <a:off x="7314415" y="548797"/>
-            <a:ext cx="941203" cy="301752"/>
-          </a:xfrm>
-          <a:prstGeom prst="rect">
-            <a:avLst/>
-          </a:prstGeom>
-        </p:spPr>
-        <p:txBody>
-          <a:bodyPr/>
-          <a:lstStyle/>
-          <a:p>
-            <a:fld id="{6C6AE60A-B69C-4790-82F7-3882EDF23186}" type="slidenum">
-              <a:rPr lang="de-DE" smtClean="0"/>
-              <a:t>‹#›</a:t>
-            </a:fld>
-            <a:endParaRPr lang="de-DE"/>
-          </a:p>
-        </p:txBody>
-      </p:sp>
-    </p:spTree>
-  </p:cSld>
-  <p:clrMapOvr>
-    <a:masterClrMapping/>
-  </p:clrMapOvr>
-</p:sldLayout>
-</file>
-
-<file path=ppt/slideLayouts/slideLayout2.xml><?xml version="1.0" encoding="utf-8"?>
-<p:sldLayout xmlns:a="http://schemas.openxmlformats.org/drawingml/2006/main" xmlns:r="http://schemas.openxmlformats.org/officeDocument/2006/relationships" xmlns:p="http://schemas.openxmlformats.org/presentationml/2006/main" type="obj" preserve="1">
-  <p:cSld name="Title and Content">
-    <p:spTree>
-      <p:nvGrpSpPr>
-        <p:cNvPr id="1" name=""/>
-        <p:cNvGrpSpPr/>
-        <p:nvPr/>
-      </p:nvGrpSpPr>
-      <p:grpSpPr>
-        <a:xfrm>
-          <a:off x="0" y="0"/>
-          <a:ext cx="0" cy="0"/>
-          <a:chOff x="0" y="0"/>
-          <a:chExt cx="0" cy="0"/>
-        </a:xfrm>
-      </p:grpSpPr>
-      <p:sp>
-        <p:nvSpPr>
-          <p:cNvPr id="2" name="Title 1"/>
-          <p:cNvSpPr>
-            <a:spLocks noGrp="1"/>
-          </p:cNvSpPr>
-          <p:nvPr>
-            <p:ph type="title"/>
-          </p:nvPr>
-        </p:nvSpPr>
-        <p:spPr>
-          <a:xfrm>
-            <a:off x="538480" y="330687"/>
-            <a:ext cx="7691120" cy="1010081"/>
-          </a:xfrm>
-        </p:spPr>
-        <p:txBody>
-          <a:bodyPr/>
-          <a:lstStyle/>
-          <a:p>
-            <a:r>
-              <a:rPr lang="en-US" smtClean="0"/>
-              <a:t>Click to edit Master title style</a:t>
-            </a:r>
-            <a:endParaRPr lang="en-US"/>
-          </a:p>
-        </p:txBody>
-      </p:sp>
-      <p:sp>
-        <p:nvSpPr>
-          <p:cNvPr id="3" name="Content Placeholder 2"/>
-          <p:cNvSpPr>
-            <a:spLocks noGrp="1"/>
-          </p:cNvSpPr>
-          <p:nvPr>
-            <p:ph idx="1"/>
-          </p:nvPr>
-        </p:nvSpPr>
-        <p:spPr/>
-        <p:txBody>
-          <a:bodyPr/>
-          <a:lstStyle/>
-          <a:p>
-            <a:pPr lvl="0"/>
-            <a:r>
-              <a:rPr lang="en-US" dirty="0" smtClean="0"/>
-              <a:t>Click to edit Master text styles</a:t>
-            </a:r>
-          </a:p>
-          <a:p>
-            <a:pPr lvl="1"/>
-            <a:r>
-              <a:rPr lang="en-US" dirty="0" smtClean="0"/>
-              <a:t>Second level</a:t>
-            </a:r>
-          </a:p>
-          <a:p>
-            <a:pPr lvl="2"/>
-            <a:r>
-              <a:rPr lang="en-US" dirty="0" smtClean="0"/>
-              <a:t>Third level</a:t>
-            </a:r>
-          </a:p>
-          <a:p>
-            <a:pPr lvl="3"/>
-            <a:r>
-              <a:rPr lang="en-US" dirty="0" smtClean="0"/>
-              <a:t>Fourth level</a:t>
-            </a:r>
-          </a:p>
-          <a:p>
-            <a:pPr lvl="4"/>
-            <a:r>
-              <a:rPr lang="en-US" dirty="0" smtClean="0"/>
-              <a:t>Fifth level</a:t>
-            </a:r>
-            <a:endParaRPr lang="en-US" dirty="0"/>
-          </a:p>
-        </p:txBody>
-      </p:sp>
-      <p:sp>
-        <p:nvSpPr>
-          <p:cNvPr id="4" name="Date Placeholder 3"/>
-          <p:cNvSpPr>
-            <a:spLocks noGrp="1"/>
-          </p:cNvSpPr>
-          <p:nvPr>
-            <p:ph type="dt" sz="half" idx="10"/>
-          </p:nvPr>
-        </p:nvSpPr>
-        <p:spPr>
-          <a:xfrm>
-            <a:off x="6007690" y="548797"/>
-            <a:ext cx="1189132" cy="297918"/>
-          </a:xfrm>
-          <a:prstGeom prst="rect">
-            <a:avLst/>
-          </a:prstGeom>
-        </p:spPr>
-        <p:txBody>
-          <a:bodyPr/>
-          <a:lstStyle/>
-          <a:p>
-            <a:fld id="{1BA50D42-C9CD-4801-B293-61D1F53EC57E}" type="datetimeFigureOut">
-              <a:rPr lang="de-DE" smtClean="0"/>
-              <a:t>16.10.2014</a:t>
-            </a:fld>
-            <a:endParaRPr lang="de-DE" dirty="0"/>
-          </a:p>
-        </p:txBody>
-      </p:sp>
-      <p:sp>
-        <p:nvSpPr>
-          <p:cNvPr id="5" name="Footer Placeholder 4"/>
-          <p:cNvSpPr>
-            <a:spLocks noGrp="1"/>
-          </p:cNvSpPr>
-          <p:nvPr>
-            <p:ph type="ftr" sz="quarter" idx="11"/>
-          </p:nvPr>
-        </p:nvSpPr>
-        <p:spPr>
-          <a:xfrm>
-            <a:off x="6008688" y="855956"/>
-            <a:ext cx="2246489" cy="301227"/>
-          </a:xfrm>
-          <a:prstGeom prst="rect">
-            <a:avLst/>
-          </a:prstGeom>
-        </p:spPr>
-        <p:txBody>
-          <a:bodyPr/>
-          <a:lstStyle/>
-          <a:p>
-            <a:endParaRPr lang="de-DE" dirty="0"/>
-          </a:p>
-        </p:txBody>
-      </p:sp>
-      <p:sp>
-        <p:nvSpPr>
-          <p:cNvPr id="6" name="Slide Number Placeholder 5"/>
-          <p:cNvSpPr>
-            <a:spLocks noGrp="1"/>
-          </p:cNvSpPr>
-          <p:nvPr>
-            <p:ph type="sldNum" sz="quarter" idx="12"/>
-          </p:nvPr>
-        </p:nvSpPr>
-        <p:spPr>
-          <a:xfrm>
-            <a:off x="7314415" y="548797"/>
-            <a:ext cx="941203" cy="301752"/>
-          </a:xfrm>
-          <a:prstGeom prst="rect">
-            <a:avLst/>
-          </a:prstGeom>
-        </p:spPr>
-        <p:txBody>
-          <a:bodyPr/>
-          <a:lstStyle/>
-          <a:p>
-            <a:fld id="{6C6AE60A-B69C-4790-82F7-3882EDF23186}" type="slidenum">
-              <a:rPr lang="de-DE" smtClean="0"/>
-              <a:t>‹#›</a:t>
-            </a:fld>
-            <a:endParaRPr lang="de-DE"/>
-          </a:p>
-        </p:txBody>
-      </p:sp>
-    </p:spTree>
-  </p:cSld>
-  <p:clrMapOvr>
-    <a:masterClrMapping/>
-  </p:clrMapOvr>
-  <p:timing>
-    <p:tnLst>
-      <p:par>
-        <p:cTn id="1" dur="indefinite" restart="never" nodeType="tmRoot"/>
-      </p:par>
-    </p:tnLst>
-  </p:timing>
-</p:sldLayout>
-</file>
-
-<file path=ppt/slideLayouts/slideLayout3.xml><?xml version="1.0" encoding="utf-8"?>
+<file path=ppt/slideLayouts/slideLayout5.xml><?xml version="1.0" encoding="utf-8"?>
 <p:sldLayout xmlns:a="http://schemas.openxmlformats.org/drawingml/2006/main" xmlns:r="http://schemas.openxmlformats.org/officeDocument/2006/relationships" xmlns:p="http://schemas.openxmlformats.org/presentationml/2006/main" type="secHead" preserve="1">
   <p:cSld name="Section Header">
     <p:spTree>
@@ -1928,7 +1991,7 @@
           <a:p>
             <a:fld id="{6C6AE60A-B69C-4790-82F7-3882EDF23186}" type="slidenum">
               <a:rPr lang="de-DE" smtClean="0"/>
-              <a:t>‹#›</a:t>
+              <a:t>‹Nr.›</a:t>
             </a:fld>
             <a:endParaRPr lang="de-DE"/>
           </a:p>
@@ -1949,798 +2012,7 @@
 </p:sldLayout>
 </file>
 
-<file path=ppt/slideLayouts/slideLayout4.xml><?xml version="1.0" encoding="utf-8"?>
-<p:sldLayout xmlns:a="http://schemas.openxmlformats.org/drawingml/2006/main" xmlns:r="http://schemas.openxmlformats.org/officeDocument/2006/relationships" xmlns:p="http://schemas.openxmlformats.org/presentationml/2006/main" type="twoObj" preserve="1">
-  <p:cSld name="Two Content">
-    <p:spTree>
-      <p:nvGrpSpPr>
-        <p:cNvPr id="1" name=""/>
-        <p:cNvGrpSpPr/>
-        <p:nvPr/>
-      </p:nvGrpSpPr>
-      <p:grpSpPr>
-        <a:xfrm>
-          <a:off x="0" y="0"/>
-          <a:ext cx="0" cy="0"/>
-          <a:chOff x="0" y="0"/>
-          <a:chExt cx="0" cy="0"/>
-        </a:xfrm>
-      </p:grpSpPr>
-      <p:sp>
-        <p:nvSpPr>
-          <p:cNvPr id="5" name="Date Placeholder 4"/>
-          <p:cNvSpPr>
-            <a:spLocks noGrp="1"/>
-          </p:cNvSpPr>
-          <p:nvPr>
-            <p:ph type="dt" sz="half" idx="10"/>
-          </p:nvPr>
-        </p:nvSpPr>
-        <p:spPr>
-          <a:xfrm>
-            <a:off x="6007690" y="548797"/>
-            <a:ext cx="1189132" cy="297918"/>
-          </a:xfrm>
-          <a:prstGeom prst="rect">
-            <a:avLst/>
-          </a:prstGeom>
-        </p:spPr>
-        <p:txBody>
-          <a:bodyPr/>
-          <a:lstStyle/>
-          <a:p>
-            <a:fld id="{1BA50D42-C9CD-4801-B293-61D1F53EC57E}" type="datetimeFigureOut">
-              <a:rPr lang="de-DE" smtClean="0"/>
-              <a:t>16.10.2014</a:t>
-            </a:fld>
-            <a:endParaRPr lang="de-DE"/>
-          </a:p>
-        </p:txBody>
-      </p:sp>
-      <p:sp>
-        <p:nvSpPr>
-          <p:cNvPr id="6" name="Footer Placeholder 5"/>
-          <p:cNvSpPr>
-            <a:spLocks noGrp="1"/>
-          </p:cNvSpPr>
-          <p:nvPr>
-            <p:ph type="ftr" sz="quarter" idx="11"/>
-          </p:nvPr>
-        </p:nvSpPr>
-        <p:spPr>
-          <a:xfrm>
-            <a:off x="6008688" y="855956"/>
-            <a:ext cx="2246489" cy="301227"/>
-          </a:xfrm>
-          <a:prstGeom prst="rect">
-            <a:avLst/>
-          </a:prstGeom>
-        </p:spPr>
-        <p:txBody>
-          <a:bodyPr/>
-          <a:lstStyle/>
-          <a:p>
-            <a:endParaRPr lang="de-DE"/>
-          </a:p>
-        </p:txBody>
-      </p:sp>
-      <p:sp>
-        <p:nvSpPr>
-          <p:cNvPr id="7" name="Slide Number Placeholder 6"/>
-          <p:cNvSpPr>
-            <a:spLocks noGrp="1"/>
-          </p:cNvSpPr>
-          <p:nvPr>
-            <p:ph type="sldNum" sz="quarter" idx="12"/>
-          </p:nvPr>
-        </p:nvSpPr>
-        <p:spPr>
-          <a:xfrm>
-            <a:off x="7314415" y="548797"/>
-            <a:ext cx="941203" cy="301752"/>
-          </a:xfrm>
-          <a:prstGeom prst="rect">
-            <a:avLst/>
-          </a:prstGeom>
-        </p:spPr>
-        <p:txBody>
-          <a:bodyPr/>
-          <a:lstStyle/>
-          <a:p>
-            <a:fld id="{6C6AE60A-B69C-4790-82F7-3882EDF23186}" type="slidenum">
-              <a:rPr lang="de-DE" smtClean="0"/>
-              <a:t>‹#›</a:t>
-            </a:fld>
-            <a:endParaRPr lang="de-DE"/>
-          </a:p>
-        </p:txBody>
-      </p:sp>
-      <p:sp>
-        <p:nvSpPr>
-          <p:cNvPr id="9" name="Title 8"/>
-          <p:cNvSpPr>
-            <a:spLocks noGrp="1"/>
-          </p:cNvSpPr>
-          <p:nvPr>
-            <p:ph type="title"/>
-          </p:nvPr>
-        </p:nvSpPr>
-        <p:spPr>
-          <a:xfrm>
-            <a:off x="914400" y="1544715"/>
-            <a:ext cx="7315200" cy="1154097"/>
-          </a:xfrm>
-        </p:spPr>
-        <p:txBody>
-          <a:bodyPr/>
-          <a:lstStyle/>
-          <a:p>
-            <a:r>
-              <a:rPr lang="en-US" smtClean="0"/>
-              <a:t>Click to edit Master title style</a:t>
-            </a:r>
-            <a:endParaRPr lang="en-US"/>
-          </a:p>
-        </p:txBody>
-      </p:sp>
-      <p:sp>
-        <p:nvSpPr>
-          <p:cNvPr id="8" name="Content Placeholder 7"/>
-          <p:cNvSpPr>
-            <a:spLocks noGrp="1"/>
-          </p:cNvSpPr>
-          <p:nvPr>
-            <p:ph sz="quarter" idx="13"/>
-          </p:nvPr>
-        </p:nvSpPr>
-        <p:spPr>
-          <a:xfrm>
-            <a:off x="914400" y="2743200"/>
-            <a:ext cx="3566160" cy="3593592"/>
-          </a:xfrm>
-        </p:spPr>
-        <p:txBody>
-          <a:bodyPr/>
-          <a:lstStyle/>
-          <a:p>
-            <a:pPr lvl="0"/>
-            <a:r>
-              <a:rPr lang="en-US" smtClean="0"/>
-              <a:t>Click to edit Master text styles</a:t>
-            </a:r>
-          </a:p>
-          <a:p>
-            <a:pPr lvl="1"/>
-            <a:r>
-              <a:rPr lang="en-US" smtClean="0"/>
-              <a:t>Second level</a:t>
-            </a:r>
-          </a:p>
-          <a:p>
-            <a:pPr lvl="2"/>
-            <a:r>
-              <a:rPr lang="en-US" smtClean="0"/>
-              <a:t>Third level</a:t>
-            </a:r>
-          </a:p>
-          <a:p>
-            <a:pPr lvl="3"/>
-            <a:r>
-              <a:rPr lang="en-US" smtClean="0"/>
-              <a:t>Fourth level</a:t>
-            </a:r>
-          </a:p>
-          <a:p>
-            <a:pPr lvl="4"/>
-            <a:r>
-              <a:rPr lang="en-US" smtClean="0"/>
-              <a:t>Fifth level</a:t>
-            </a:r>
-            <a:endParaRPr lang="en-US"/>
-          </a:p>
-        </p:txBody>
-      </p:sp>
-      <p:sp>
-        <p:nvSpPr>
-          <p:cNvPr id="11" name="Content Placeholder 10"/>
-          <p:cNvSpPr>
-            <a:spLocks noGrp="1"/>
-          </p:cNvSpPr>
-          <p:nvPr>
-            <p:ph sz="quarter" idx="14"/>
-          </p:nvPr>
-        </p:nvSpPr>
-        <p:spPr>
-          <a:xfrm>
-            <a:off x="4681728" y="2743200"/>
-            <a:ext cx="3566160" cy="3595687"/>
-          </a:xfrm>
-        </p:spPr>
-        <p:txBody>
-          <a:bodyPr/>
-          <a:lstStyle/>
-          <a:p>
-            <a:pPr lvl="0"/>
-            <a:r>
-              <a:rPr lang="en-US" smtClean="0"/>
-              <a:t>Click to edit Master text styles</a:t>
-            </a:r>
-          </a:p>
-          <a:p>
-            <a:pPr lvl="1"/>
-            <a:r>
-              <a:rPr lang="en-US" smtClean="0"/>
-              <a:t>Second level</a:t>
-            </a:r>
-          </a:p>
-          <a:p>
-            <a:pPr lvl="2"/>
-            <a:r>
-              <a:rPr lang="en-US" smtClean="0"/>
-              <a:t>Third level</a:t>
-            </a:r>
-          </a:p>
-          <a:p>
-            <a:pPr lvl="3"/>
-            <a:r>
-              <a:rPr lang="en-US" smtClean="0"/>
-              <a:t>Fourth level</a:t>
-            </a:r>
-          </a:p>
-          <a:p>
-            <a:pPr lvl="4"/>
-            <a:r>
-              <a:rPr lang="en-US" smtClean="0"/>
-              <a:t>Fifth level</a:t>
-            </a:r>
-            <a:endParaRPr lang="en-US"/>
-          </a:p>
-        </p:txBody>
-      </p:sp>
-    </p:spTree>
-  </p:cSld>
-  <p:clrMapOvr>
-    <a:masterClrMapping/>
-  </p:clrMapOvr>
-</p:sldLayout>
-</file>
-
-<file path=ppt/slideLayouts/slideLayout5.xml><?xml version="1.0" encoding="utf-8"?>
-<p:sldLayout xmlns:a="http://schemas.openxmlformats.org/drawingml/2006/main" xmlns:r="http://schemas.openxmlformats.org/officeDocument/2006/relationships" xmlns:p="http://schemas.openxmlformats.org/presentationml/2006/main" type="twoTxTwoObj" preserve="1">
-  <p:cSld name="Comparison">
-    <p:spTree>
-      <p:nvGrpSpPr>
-        <p:cNvPr id="1" name=""/>
-        <p:cNvGrpSpPr/>
-        <p:nvPr/>
-      </p:nvGrpSpPr>
-      <p:grpSpPr>
-        <a:xfrm>
-          <a:off x="0" y="0"/>
-          <a:ext cx="0" cy="0"/>
-          <a:chOff x="0" y="0"/>
-          <a:chExt cx="0" cy="0"/>
-        </a:xfrm>
-      </p:grpSpPr>
-      <p:sp>
-        <p:nvSpPr>
-          <p:cNvPr id="3" name="Text Placeholder 2"/>
-          <p:cNvSpPr>
-            <a:spLocks noGrp="1"/>
-          </p:cNvSpPr>
-          <p:nvPr>
-            <p:ph type="body" idx="1"/>
-          </p:nvPr>
-        </p:nvSpPr>
-        <p:spPr>
-          <a:xfrm>
-            <a:off x="1116348" y="2743200"/>
-            <a:ext cx="3364992" cy="621792"/>
-          </a:xfrm>
-        </p:spPr>
-        <p:txBody>
-          <a:bodyPr anchor="b">
-            <a:noAutofit/>
-          </a:bodyPr>
-          <a:lstStyle>
-            <a:lvl1pPr marL="0" indent="0">
-              <a:buNone/>
-              <a:defRPr sz="2000" b="1">
-                <a:solidFill>
-                  <a:schemeClr val="tx2"/>
-                </a:solidFill>
-              </a:defRPr>
-            </a:lvl1pPr>
-            <a:lvl2pPr marL="457200" indent="0">
-              <a:buNone/>
-              <a:defRPr sz="2000" b="1"/>
-            </a:lvl2pPr>
-            <a:lvl3pPr marL="914400" indent="0">
-              <a:buNone/>
-              <a:defRPr sz="1800" b="1"/>
-            </a:lvl3pPr>
-            <a:lvl4pPr marL="1371600" indent="0">
-              <a:buNone/>
-              <a:defRPr sz="1600" b="1"/>
-            </a:lvl4pPr>
-            <a:lvl5pPr marL="1828800" indent="0">
-              <a:buNone/>
-              <a:defRPr sz="1600" b="1"/>
-            </a:lvl5pPr>
-            <a:lvl6pPr marL="2286000" indent="0">
-              <a:buNone/>
-              <a:defRPr sz="1600" b="1"/>
-            </a:lvl6pPr>
-            <a:lvl7pPr marL="2743200" indent="0">
-              <a:buNone/>
-              <a:defRPr sz="1600" b="1"/>
-            </a:lvl7pPr>
-            <a:lvl8pPr marL="3200400" indent="0">
-              <a:buNone/>
-              <a:defRPr sz="1600" b="1"/>
-            </a:lvl8pPr>
-            <a:lvl9pPr marL="3657600" indent="0">
-              <a:buNone/>
-              <a:defRPr sz="1600" b="1"/>
-            </a:lvl9pPr>
-          </a:lstStyle>
-          <a:p>
-            <a:pPr lvl="0"/>
-            <a:r>
-              <a:rPr lang="en-US" smtClean="0"/>
-              <a:t>Click to edit Master text styles</a:t>
-            </a:r>
-          </a:p>
-        </p:txBody>
-      </p:sp>
-      <p:sp>
-        <p:nvSpPr>
-          <p:cNvPr id="5" name="Text Placeholder 4"/>
-          <p:cNvSpPr>
-            <a:spLocks noGrp="1"/>
-          </p:cNvSpPr>
-          <p:nvPr>
-            <p:ph type="body" sz="quarter" idx="3"/>
-          </p:nvPr>
-        </p:nvSpPr>
-        <p:spPr>
-          <a:xfrm>
-            <a:off x="4885144" y="2743200"/>
-            <a:ext cx="3362062" cy="621792"/>
-          </a:xfrm>
-        </p:spPr>
-        <p:txBody>
-          <a:bodyPr anchor="b">
-            <a:noAutofit/>
-          </a:bodyPr>
-          <a:lstStyle>
-            <a:lvl1pPr marL="0" indent="0">
-              <a:buNone/>
-              <a:defRPr sz="2000" b="1">
-                <a:solidFill>
-                  <a:schemeClr val="tx2"/>
-                </a:solidFill>
-              </a:defRPr>
-            </a:lvl1pPr>
-            <a:lvl2pPr marL="457200" indent="0">
-              <a:buNone/>
-              <a:defRPr sz="2000" b="1"/>
-            </a:lvl2pPr>
-            <a:lvl3pPr marL="914400" indent="0">
-              <a:buNone/>
-              <a:defRPr sz="1800" b="1"/>
-            </a:lvl3pPr>
-            <a:lvl4pPr marL="1371600" indent="0">
-              <a:buNone/>
-              <a:defRPr sz="1600" b="1"/>
-            </a:lvl4pPr>
-            <a:lvl5pPr marL="1828800" indent="0">
-              <a:buNone/>
-              <a:defRPr sz="1600" b="1"/>
-            </a:lvl5pPr>
-            <a:lvl6pPr marL="2286000" indent="0">
-              <a:buNone/>
-              <a:defRPr sz="1600" b="1"/>
-            </a:lvl6pPr>
-            <a:lvl7pPr marL="2743200" indent="0">
-              <a:buNone/>
-              <a:defRPr sz="1600" b="1"/>
-            </a:lvl7pPr>
-            <a:lvl8pPr marL="3200400" indent="0">
-              <a:buNone/>
-              <a:defRPr sz="1600" b="1"/>
-            </a:lvl8pPr>
-            <a:lvl9pPr marL="3657600" indent="0">
-              <a:buNone/>
-              <a:defRPr sz="1600" b="1"/>
-            </a:lvl9pPr>
-          </a:lstStyle>
-          <a:p>
-            <a:pPr lvl="0"/>
-            <a:r>
-              <a:rPr lang="en-US" smtClean="0"/>
-              <a:t>Click to edit Master text styles</a:t>
-            </a:r>
-          </a:p>
-        </p:txBody>
-      </p:sp>
-      <p:sp>
-        <p:nvSpPr>
-          <p:cNvPr id="7" name="Date Placeholder 6"/>
-          <p:cNvSpPr>
-            <a:spLocks noGrp="1"/>
-          </p:cNvSpPr>
-          <p:nvPr>
-            <p:ph type="dt" sz="half" idx="10"/>
-          </p:nvPr>
-        </p:nvSpPr>
-        <p:spPr>
-          <a:xfrm>
-            <a:off x="6007690" y="548797"/>
-            <a:ext cx="1189132" cy="297918"/>
-          </a:xfrm>
-          <a:prstGeom prst="rect">
-            <a:avLst/>
-          </a:prstGeom>
-        </p:spPr>
-        <p:txBody>
-          <a:bodyPr/>
-          <a:lstStyle/>
-          <a:p>
-            <a:fld id="{1BA50D42-C9CD-4801-B293-61D1F53EC57E}" type="datetimeFigureOut">
-              <a:rPr lang="de-DE" smtClean="0"/>
-              <a:t>16.10.2014</a:t>
-            </a:fld>
-            <a:endParaRPr lang="de-DE"/>
-          </a:p>
-        </p:txBody>
-      </p:sp>
-      <p:sp>
-        <p:nvSpPr>
-          <p:cNvPr id="8" name="Footer Placeholder 7"/>
-          <p:cNvSpPr>
-            <a:spLocks noGrp="1"/>
-          </p:cNvSpPr>
-          <p:nvPr>
-            <p:ph type="ftr" sz="quarter" idx="11"/>
-          </p:nvPr>
-        </p:nvSpPr>
-        <p:spPr>
-          <a:xfrm>
-            <a:off x="6008688" y="855956"/>
-            <a:ext cx="2246489" cy="301227"/>
-          </a:xfrm>
-          <a:prstGeom prst="rect">
-            <a:avLst/>
-          </a:prstGeom>
-        </p:spPr>
-        <p:txBody>
-          <a:bodyPr/>
-          <a:lstStyle/>
-          <a:p>
-            <a:endParaRPr lang="de-DE"/>
-          </a:p>
-        </p:txBody>
-      </p:sp>
-      <p:sp>
-        <p:nvSpPr>
-          <p:cNvPr id="9" name="Slide Number Placeholder 8"/>
-          <p:cNvSpPr>
-            <a:spLocks noGrp="1"/>
-          </p:cNvSpPr>
-          <p:nvPr>
-            <p:ph type="sldNum" sz="quarter" idx="12"/>
-          </p:nvPr>
-        </p:nvSpPr>
-        <p:spPr>
-          <a:xfrm>
-            <a:off x="7314415" y="548797"/>
-            <a:ext cx="941203" cy="301752"/>
-          </a:xfrm>
-          <a:prstGeom prst="rect">
-            <a:avLst/>
-          </a:prstGeom>
-        </p:spPr>
-        <p:txBody>
-          <a:bodyPr/>
-          <a:lstStyle/>
-          <a:p>
-            <a:fld id="{6C6AE60A-B69C-4790-82F7-3882EDF23186}" type="slidenum">
-              <a:rPr lang="de-DE" smtClean="0"/>
-              <a:t>‹#›</a:t>
-            </a:fld>
-            <a:endParaRPr lang="de-DE"/>
-          </a:p>
-        </p:txBody>
-      </p:sp>
-      <p:sp>
-        <p:nvSpPr>
-          <p:cNvPr id="10" name="Title 9"/>
-          <p:cNvSpPr>
-            <a:spLocks noGrp="1"/>
-          </p:cNvSpPr>
-          <p:nvPr>
-            <p:ph type="title"/>
-          </p:nvPr>
-        </p:nvSpPr>
-        <p:spPr>
-          <a:xfrm>
-            <a:off x="914400" y="1544715"/>
-            <a:ext cx="7315200" cy="1154097"/>
-          </a:xfrm>
-        </p:spPr>
-        <p:txBody>
-          <a:bodyPr/>
-          <a:lstStyle/>
-          <a:p>
-            <a:r>
-              <a:rPr lang="en-US" smtClean="0"/>
-              <a:t>Click to edit Master title style</a:t>
-            </a:r>
-            <a:endParaRPr lang="en-US" dirty="0"/>
-          </a:p>
-        </p:txBody>
-      </p:sp>
-      <p:sp>
-        <p:nvSpPr>
-          <p:cNvPr id="11" name="Content Placeholder 10"/>
-          <p:cNvSpPr>
-            <a:spLocks noGrp="1"/>
-          </p:cNvSpPr>
-          <p:nvPr>
-            <p:ph sz="quarter" idx="13"/>
-          </p:nvPr>
-        </p:nvSpPr>
-        <p:spPr>
-          <a:xfrm>
-            <a:off x="914400" y="3383280"/>
-            <a:ext cx="3566160" cy="2953512"/>
-          </a:xfrm>
-        </p:spPr>
-        <p:txBody>
-          <a:bodyPr/>
-          <a:lstStyle/>
-          <a:p>
-            <a:pPr lvl="0"/>
-            <a:r>
-              <a:rPr lang="en-US" smtClean="0"/>
-              <a:t>Click to edit Master text styles</a:t>
-            </a:r>
-          </a:p>
-          <a:p>
-            <a:pPr lvl="1"/>
-            <a:r>
-              <a:rPr lang="en-US" smtClean="0"/>
-              <a:t>Second level</a:t>
-            </a:r>
-          </a:p>
-          <a:p>
-            <a:pPr lvl="2"/>
-            <a:r>
-              <a:rPr lang="en-US" smtClean="0"/>
-              <a:t>Third level</a:t>
-            </a:r>
-          </a:p>
-          <a:p>
-            <a:pPr lvl="3"/>
-            <a:r>
-              <a:rPr lang="en-US" smtClean="0"/>
-              <a:t>Fourth level</a:t>
-            </a:r>
-          </a:p>
-          <a:p>
-            <a:pPr lvl="4"/>
-            <a:r>
-              <a:rPr lang="en-US" smtClean="0"/>
-              <a:t>Fifth level</a:t>
-            </a:r>
-            <a:endParaRPr lang="en-US" dirty="0"/>
-          </a:p>
-        </p:txBody>
-      </p:sp>
-      <p:sp>
-        <p:nvSpPr>
-          <p:cNvPr id="13" name="Content Placeholder 12"/>
-          <p:cNvSpPr>
-            <a:spLocks noGrp="1"/>
-          </p:cNvSpPr>
-          <p:nvPr>
-            <p:ph sz="quarter" idx="14"/>
-          </p:nvPr>
-        </p:nvSpPr>
-        <p:spPr>
-          <a:xfrm>
-            <a:off x="4681727" y="3383280"/>
-            <a:ext cx="3566160" cy="2953512"/>
-          </a:xfrm>
-        </p:spPr>
-        <p:txBody>
-          <a:bodyPr/>
-          <a:lstStyle/>
-          <a:p>
-            <a:pPr lvl="0"/>
-            <a:r>
-              <a:rPr lang="en-US" smtClean="0"/>
-              <a:t>Click to edit Master text styles</a:t>
-            </a:r>
-          </a:p>
-          <a:p>
-            <a:pPr lvl="1"/>
-            <a:r>
-              <a:rPr lang="en-US" smtClean="0"/>
-              <a:t>Second level</a:t>
-            </a:r>
-          </a:p>
-          <a:p>
-            <a:pPr lvl="2"/>
-            <a:r>
-              <a:rPr lang="en-US" smtClean="0"/>
-              <a:t>Third level</a:t>
-            </a:r>
-          </a:p>
-          <a:p>
-            <a:pPr lvl="3"/>
-            <a:r>
-              <a:rPr lang="en-US" smtClean="0"/>
-              <a:t>Fourth level</a:t>
-            </a:r>
-          </a:p>
-          <a:p>
-            <a:pPr lvl="4"/>
-            <a:r>
-              <a:rPr lang="en-US" smtClean="0"/>
-              <a:t>Fifth level</a:t>
-            </a:r>
-            <a:endParaRPr lang="en-US" dirty="0"/>
-          </a:p>
-        </p:txBody>
-      </p:sp>
-    </p:spTree>
-  </p:cSld>
-  <p:clrMapOvr>
-    <a:masterClrMapping/>
-  </p:clrMapOvr>
-</p:sldLayout>
-</file>
-
 <file path=ppt/slideLayouts/slideLayout6.xml><?xml version="1.0" encoding="utf-8"?>
-<p:sldLayout xmlns:a="http://schemas.openxmlformats.org/drawingml/2006/main" xmlns:r="http://schemas.openxmlformats.org/officeDocument/2006/relationships" xmlns:p="http://schemas.openxmlformats.org/presentationml/2006/main" type="titleOnly" preserve="1">
-  <p:cSld name="Title Only">
-    <p:spTree>
-      <p:nvGrpSpPr>
-        <p:cNvPr id="1" name=""/>
-        <p:cNvGrpSpPr/>
-        <p:nvPr/>
-      </p:nvGrpSpPr>
-      <p:grpSpPr>
-        <a:xfrm>
-          <a:off x="0" y="0"/>
-          <a:ext cx="0" cy="0"/>
-          <a:chOff x="0" y="0"/>
-          <a:chExt cx="0" cy="0"/>
-        </a:xfrm>
-      </p:grpSpPr>
-      <p:sp>
-        <p:nvSpPr>
-          <p:cNvPr id="2" name="Title 1"/>
-          <p:cNvSpPr>
-            <a:spLocks noGrp="1"/>
-          </p:cNvSpPr>
-          <p:nvPr>
-            <p:ph type="title"/>
-          </p:nvPr>
-        </p:nvSpPr>
-        <p:spPr/>
-        <p:txBody>
-          <a:bodyPr/>
-          <a:lstStyle/>
-          <a:p>
-            <a:r>
-              <a:rPr lang="en-US" smtClean="0"/>
-              <a:t>Click to edit Master title style</a:t>
-            </a:r>
-            <a:endParaRPr lang="en-US"/>
-          </a:p>
-        </p:txBody>
-      </p:sp>
-      <p:sp>
-        <p:nvSpPr>
-          <p:cNvPr id="3" name="Date Placeholder 2"/>
-          <p:cNvSpPr>
-            <a:spLocks noGrp="1"/>
-          </p:cNvSpPr>
-          <p:nvPr>
-            <p:ph type="dt" sz="half" idx="10"/>
-          </p:nvPr>
-        </p:nvSpPr>
-        <p:spPr>
-          <a:xfrm>
-            <a:off x="6007690" y="548797"/>
-            <a:ext cx="1189132" cy="297918"/>
-          </a:xfrm>
-          <a:prstGeom prst="rect">
-            <a:avLst/>
-          </a:prstGeom>
-        </p:spPr>
-        <p:txBody>
-          <a:bodyPr/>
-          <a:lstStyle/>
-          <a:p>
-            <a:fld id="{1BA50D42-C9CD-4801-B293-61D1F53EC57E}" type="datetimeFigureOut">
-              <a:rPr lang="de-DE" smtClean="0"/>
-              <a:t>16.10.2014</a:t>
-            </a:fld>
-            <a:endParaRPr lang="de-DE"/>
-          </a:p>
-        </p:txBody>
-      </p:sp>
-      <p:sp>
-        <p:nvSpPr>
-          <p:cNvPr id="4" name="Footer Placeholder 3"/>
-          <p:cNvSpPr>
-            <a:spLocks noGrp="1"/>
-          </p:cNvSpPr>
-          <p:nvPr>
-            <p:ph type="ftr" sz="quarter" idx="11"/>
-          </p:nvPr>
-        </p:nvSpPr>
-        <p:spPr>
-          <a:xfrm>
-            <a:off x="6008688" y="855956"/>
-            <a:ext cx="2246489" cy="301227"/>
-          </a:xfrm>
-          <a:prstGeom prst="rect">
-            <a:avLst/>
-          </a:prstGeom>
-        </p:spPr>
-        <p:txBody>
-          <a:bodyPr/>
-          <a:lstStyle/>
-          <a:p>
-            <a:endParaRPr lang="de-DE"/>
-          </a:p>
-        </p:txBody>
-      </p:sp>
-      <p:sp>
-        <p:nvSpPr>
-          <p:cNvPr id="5" name="Slide Number Placeholder 4"/>
-          <p:cNvSpPr>
-            <a:spLocks noGrp="1"/>
-          </p:cNvSpPr>
-          <p:nvPr>
-            <p:ph type="sldNum" sz="quarter" idx="12"/>
-          </p:nvPr>
-        </p:nvSpPr>
-        <p:spPr>
-          <a:xfrm>
-            <a:off x="7314415" y="548797"/>
-            <a:ext cx="941203" cy="301752"/>
-          </a:xfrm>
-          <a:prstGeom prst="rect">
-            <a:avLst/>
-          </a:prstGeom>
-        </p:spPr>
-        <p:txBody>
-          <a:bodyPr/>
-          <a:lstStyle/>
-          <a:p>
-            <a:fld id="{6C6AE60A-B69C-4790-82F7-3882EDF23186}" type="slidenum">
-              <a:rPr lang="de-DE" smtClean="0"/>
-              <a:t>‹#›</a:t>
-            </a:fld>
-            <a:endParaRPr lang="de-DE"/>
-          </a:p>
-        </p:txBody>
-      </p:sp>
-    </p:spTree>
-  </p:cSld>
-  <p:clrMapOvr>
-    <a:masterClrMapping/>
-  </p:clrMapOvr>
-</p:sldLayout>
-</file>
-
-<file path=ppt/slideLayouts/slideLayout7.xml><?xml version="1.0" encoding="utf-8"?>
 <p:sldLayout xmlns:a="http://schemas.openxmlformats.org/drawingml/2006/main" xmlns:r="http://schemas.openxmlformats.org/officeDocument/2006/relationships" xmlns:p="http://schemas.openxmlformats.org/presentationml/2006/main" type="blank" preserve="1">
   <p:cSld name="Blank">
     <p:spTree>
@@ -2757,6 +2029,38 @@
           <a:chExt cx="0" cy="0"/>
         </a:xfrm>
       </p:grpSpPr>
+    </p:spTree>
+  </p:cSld>
+  <p:clrMapOvr>
+    <a:masterClrMapping/>
+  </p:clrMapOvr>
+  <p:timing>
+    <p:tnLst>
+      <p:par>
+        <p:cTn id="1" dur="indefinite" restart="never" nodeType="tmRoot"/>
+      </p:par>
+    </p:tnLst>
+  </p:timing>
+</p:sldLayout>
+</file>
+
+<file path=ppt/slideLayouts/slideLayout7.xml><?xml version="1.0" encoding="utf-8"?>
+<p:sldLayout xmlns:a="http://schemas.openxmlformats.org/drawingml/2006/main" xmlns:r="http://schemas.openxmlformats.org/officeDocument/2006/relationships" xmlns:p="http://schemas.openxmlformats.org/presentationml/2006/main" type="blank" preserve="1">
+  <p:cSld name="1_Blank">
+    <p:spTree>
+      <p:nvGrpSpPr>
+        <p:cNvPr id="1" name=""/>
+        <p:cNvGrpSpPr/>
+        <p:nvPr/>
+      </p:nvGrpSpPr>
+      <p:grpSpPr>
+        <a:xfrm>
+          <a:off x="0" y="0"/>
+          <a:ext cx="0" cy="0"/>
+          <a:chOff x="0" y="0"/>
+          <a:chExt cx="0" cy="0"/>
+        </a:xfrm>
+      </p:grpSpPr>
       <p:sp>
         <p:nvSpPr>
           <p:cNvPr id="2" name="Date Placeholder 1"/>
@@ -2840,17 +2144,101 @@
           <a:p>
             <a:fld id="{6C6AE60A-B69C-4790-82F7-3882EDF23186}" type="slidenum">
               <a:rPr lang="de-DE" smtClean="0"/>
-              <a:t>‹#›</a:t>
+              <a:t>‹Nr.›</a:t>
             </a:fld>
             <a:endParaRPr lang="de-DE"/>
           </a:p>
         </p:txBody>
       </p:sp>
+      <p:sp>
+        <p:nvSpPr>
+          <p:cNvPr id="5" name="Rechteck 4"/>
+          <p:cNvSpPr/>
+          <p:nvPr userDrawn="1"/>
+        </p:nvSpPr>
+        <p:spPr>
+          <a:xfrm>
+            <a:off x="0" y="0"/>
+            <a:ext cx="9144000" cy="6858000"/>
+          </a:xfrm>
+          <a:prstGeom prst="rect">
+            <a:avLst/>
+          </a:prstGeom>
+          <a:gradFill>
+            <a:gsLst>
+              <a:gs pos="0">
+                <a:schemeClr val="bg2">
+                  <a:tint val="100000"/>
+                  <a:shade val="80000"/>
+                  <a:satMod val="100000"/>
+                  <a:lumMod val="100000"/>
+                </a:schemeClr>
+              </a:gs>
+              <a:gs pos="65000">
+                <a:schemeClr val="bg2">
+                  <a:tint val="100000"/>
+                  <a:shade val="95000"/>
+                  <a:satMod val="100000"/>
+                  <a:lumMod val="100000"/>
+                </a:schemeClr>
+              </a:gs>
+              <a:gs pos="100000">
+                <a:schemeClr val="bg2">
+                  <a:tint val="88000"/>
+                  <a:shade val="100000"/>
+                  <a:satMod val="400000"/>
+                  <a:lumMod val="100000"/>
+                </a:schemeClr>
+              </a:gs>
+            </a:gsLst>
+            <a:lin ang="5400000" scaled="0"/>
+          </a:gradFill>
+          <a:ln>
+            <a:noFill/>
+          </a:ln>
+        </p:spPr>
+        <p:style>
+          <a:lnRef idx="2">
+            <a:schemeClr val="accent1">
+              <a:shade val="50000"/>
+            </a:schemeClr>
+          </a:lnRef>
+          <a:fillRef idx="1">
+            <a:schemeClr val="accent1"/>
+          </a:fillRef>
+          <a:effectRef idx="0">
+            <a:schemeClr val="accent1"/>
+          </a:effectRef>
+          <a:fontRef idx="minor">
+            <a:schemeClr val="lt1"/>
+          </a:fontRef>
+        </p:style>
+        <p:txBody>
+          <a:bodyPr rtlCol="0" anchor="ctr"/>
+          <a:lstStyle/>
+          <a:p>
+            <a:pPr algn="ctr"/>
+            <a:endParaRPr lang="de-CH"/>
+          </a:p>
+        </p:txBody>
+      </p:sp>
     </p:spTree>
+    <p:extLst>
+      <p:ext uri="{BB962C8B-B14F-4D97-AF65-F5344CB8AC3E}">
+        <p14:creationId xmlns:p14="http://schemas.microsoft.com/office/powerpoint/2010/main" val="1363629832"/>
+      </p:ext>
+    </p:extLst>
   </p:cSld>
   <p:clrMapOvr>
     <a:masterClrMapping/>
   </p:clrMapOvr>
+  <p:timing>
+    <p:tnLst>
+      <p:par>
+        <p:cTn id="1" dur="indefinite" restart="never" nodeType="tmRoot"/>
+      </p:par>
+    </p:tnLst>
+  </p:timing>
 </p:sldLayout>
 </file>
 
@@ -3138,7 +2526,7 @@
           <a:p>
             <a:fld id="{6C6AE60A-B69C-4790-82F7-3882EDF23186}" type="slidenum">
               <a:rPr lang="de-DE" smtClean="0"/>
-              <a:t>‹#›</a:t>
+              <a:t>‹Nr.›</a:t>
             </a:fld>
             <a:endParaRPr lang="de-DE"/>
           </a:p>
@@ -3149,6 +2537,13 @@
   <p:clrMapOvr>
     <a:masterClrMapping/>
   </p:clrMapOvr>
+  <p:timing>
+    <p:tnLst>
+      <p:par>
+        <p:cTn id="1" dur="indefinite" restart="never" nodeType="tmRoot"/>
+      </p:par>
+    </p:tnLst>
+  </p:timing>
 </p:sldLayout>
 </file>
 
@@ -3434,7 +2829,7 @@
           <a:p>
             <a:fld id="{6C6AE60A-B69C-4790-82F7-3882EDF23186}" type="slidenum">
               <a:rPr lang="de-DE" smtClean="0"/>
-              <a:t>‹#›</a:t>
+              <a:t>‹Nr.›</a:t>
             </a:fld>
             <a:endParaRPr lang="de-DE"/>
           </a:p>
@@ -3445,6 +2840,13 @@
   <p:clrMapOvr>
     <a:masterClrMapping/>
   </p:clrMapOvr>
+  <p:timing>
+    <p:tnLst>
+      <p:par>
+        <p:cTn id="1" dur="indefinite" restart="never" nodeType="tmRoot"/>
+      </p:par>
+    </p:tnLst>
+  </p:timing>
 </p:sldLayout>
 </file>
 
@@ -3574,8 +2976,8 @@
         </p:nvSpPr>
         <p:spPr>
           <a:xfrm>
-            <a:off x="538480" y="114663"/>
-            <a:ext cx="7691120" cy="1154097"/>
+            <a:off x="538480" y="330687"/>
+            <a:ext cx="7691120" cy="938073"/>
           </a:xfrm>
           <a:prstGeom prst="rect">
             <a:avLst/>
@@ -3661,13 +3063,13 @@
   </p:cSld>
   <p:clrMap bg1="dk1" tx1="lt1" bg2="dk2" tx2="lt2" accent1="accent1" accent2="accent2" accent3="accent3" accent4="accent4" accent5="accent5" accent6="accent6" hlink="hlink" folHlink="folHlink"/>
   <p:sldLayoutIdLst>
-    <p:sldLayoutId id="2147483697" r:id="rId1"/>
+    <p:sldLayoutId id="2147483702" r:id="rId1"/>
     <p:sldLayoutId id="2147483698" r:id="rId2"/>
-    <p:sldLayoutId id="2147483699" r:id="rId3"/>
-    <p:sldLayoutId id="2147483700" r:id="rId4"/>
-    <p:sldLayoutId id="2147483701" r:id="rId5"/>
-    <p:sldLayoutId id="2147483702" r:id="rId6"/>
-    <p:sldLayoutId id="2147483703" r:id="rId7"/>
+    <p:sldLayoutId id="2147483700" r:id="rId3"/>
+    <p:sldLayoutId id="2147483697" r:id="rId4"/>
+    <p:sldLayoutId id="2147483699" r:id="rId5"/>
+    <p:sldLayoutId id="2147483703" r:id="rId6"/>
+    <p:sldLayoutId id="2147483708" r:id="rId7"/>
     <p:sldLayoutId id="2147483704" r:id="rId8"/>
     <p:sldLayoutId id="2147483705" r:id="rId9"/>
     <p:sldLayoutId id="2147483706" r:id="rId10"/>
@@ -4054,10 +3456,6 @@
               <a:rPr lang="de-CH" sz="8000" dirty="0" smtClean="0"/>
               <a:t>Analyse</a:t>
             </a:r>
-            <a:r>
-              <a:rPr lang="de-CH" sz="8000" dirty="0" smtClean="0"/>
-              <a:t/>
-            </a:r>
             <a:br>
               <a:rPr lang="de-CH" sz="8000" dirty="0" smtClean="0"/>
             </a:br>
@@ -4141,12 +3539,37 @@
       </p:grpSpPr>
       <p:sp>
         <p:nvSpPr>
-          <p:cNvPr id="2" name="Title 1"/>
+          <p:cNvPr id="7" name="Titel 6"/>
           <p:cNvSpPr>
             <a:spLocks noGrp="1"/>
           </p:cNvSpPr>
           <p:nvPr>
             <p:ph type="title"/>
+          </p:nvPr>
+        </p:nvSpPr>
+        <p:spPr/>
+        <p:txBody>
+          <a:bodyPr>
+            <a:normAutofit fontScale="90000"/>
+          </a:bodyPr>
+          <a:lstStyle/>
+          <a:p>
+            <a:r>
+              <a:rPr lang="de-CH" dirty="0" smtClean="0"/>
+              <a:t>Anwendungsfälle</a:t>
+            </a:r>
+            <a:endParaRPr lang="de-CH" dirty="0"/>
+          </a:p>
+        </p:txBody>
+      </p:sp>
+      <p:sp>
+        <p:nvSpPr>
+          <p:cNvPr id="8" name="Inhaltsplatzhalter 7"/>
+          <p:cNvSpPr>
+            <a:spLocks noGrp="1"/>
+          </p:cNvSpPr>
+          <p:nvPr>
+            <p:ph idx="1"/>
           </p:nvPr>
         </p:nvSpPr>
         <p:spPr/>
@@ -4154,37 +3577,14 @@
           <a:bodyPr/>
           <a:lstStyle/>
           <a:p>
-            <a:r>
-              <a:rPr lang="de-CH" dirty="0" err="1" smtClean="0"/>
-              <a:t>Awendungsfälle</a:t>
-            </a:r>
-            <a:endParaRPr lang="de-CH" dirty="0"/>
-          </a:p>
-        </p:txBody>
-      </p:sp>
-      <p:sp>
-        <p:nvSpPr>
-          <p:cNvPr id="3" name="Content Placeholder 2"/>
-          <p:cNvSpPr>
-            <a:spLocks noGrp="1"/>
-          </p:cNvSpPr>
-          <p:nvPr>
-            <p:ph idx="1"/>
-          </p:nvPr>
-        </p:nvSpPr>
-        <p:spPr/>
-        <p:txBody>
-          <a:bodyPr/>
-          <a:lstStyle/>
-          <a:p>
-            <a:endParaRPr lang="de-CH" dirty="0" smtClean="0"/>
+            <a:endParaRPr lang="de-CH"/>
           </a:p>
         </p:txBody>
       </p:sp>
     </p:spTree>
     <p:extLst>
       <p:ext uri="{BB962C8B-B14F-4D97-AF65-F5344CB8AC3E}">
-        <p14:creationId xmlns:p14="http://schemas.microsoft.com/office/powerpoint/2010/main" val="2094647969"/>
+        <p14:creationId xmlns:p14="http://schemas.microsoft.com/office/powerpoint/2010/main" val="2753285307"/>
       </p:ext>
     </p:extLst>
   </p:cSld>
@@ -4230,40 +3630,41 @@
         </p:nvSpPr>
         <p:spPr/>
         <p:txBody>
+          <a:bodyPr>
+            <a:normAutofit fontScale="90000"/>
+          </a:bodyPr>
+          <a:lstStyle/>
+          <a:p>
+            <a:r>
+              <a:rPr lang="de-CH" dirty="0"/>
+              <a:t>Domänenmodell</a:t>
+            </a:r>
+          </a:p>
+        </p:txBody>
+      </p:sp>
+      <p:sp>
+        <p:nvSpPr>
+          <p:cNvPr id="3" name="Inhaltsplatzhalter 2"/>
+          <p:cNvSpPr>
+            <a:spLocks noGrp="1"/>
+          </p:cNvSpPr>
+          <p:nvPr>
+            <p:ph idx="1"/>
+          </p:nvPr>
+        </p:nvSpPr>
+        <p:spPr/>
+        <p:txBody>
           <a:bodyPr/>
           <a:lstStyle/>
           <a:p>
-            <a:r>
-              <a:rPr lang="de-CH" dirty="0" smtClean="0"/>
-              <a:t>Domänenmodell</a:t>
-            </a:r>
-            <a:endParaRPr lang="de-CH" dirty="0"/>
-          </a:p>
-        </p:txBody>
-      </p:sp>
-      <p:sp>
-        <p:nvSpPr>
-          <p:cNvPr id="3" name="Inhaltsplatzhalter 2"/>
-          <p:cNvSpPr>
-            <a:spLocks noGrp="1"/>
-          </p:cNvSpPr>
-          <p:nvPr>
-            <p:ph idx="1"/>
-          </p:nvPr>
-        </p:nvSpPr>
-        <p:spPr/>
-        <p:txBody>
-          <a:bodyPr/>
-          <a:lstStyle/>
-          <a:p>
-            <a:endParaRPr lang="de-CH" dirty="0"/>
+            <a:endParaRPr lang="de-CH"/>
           </a:p>
         </p:txBody>
       </p:sp>
     </p:spTree>
     <p:extLst>
       <p:ext uri="{BB962C8B-B14F-4D97-AF65-F5344CB8AC3E}">
-        <p14:creationId xmlns:p14="http://schemas.microsoft.com/office/powerpoint/2010/main" val="2532803136"/>
+        <p14:creationId xmlns:p14="http://schemas.microsoft.com/office/powerpoint/2010/main" val="3490186754"/>
       </p:ext>
     </p:extLst>
   </p:cSld>
@@ -4299,7 +3700,7 @@
       </p:grpSpPr>
       <p:sp>
         <p:nvSpPr>
-          <p:cNvPr id="2" name="Title 1"/>
+          <p:cNvPr id="2" name="Titel 1"/>
           <p:cNvSpPr>
             <a:spLocks noGrp="1"/>
           </p:cNvSpPr>
@@ -4309,27 +3710,27 @@
         </p:nvSpPr>
         <p:spPr/>
         <p:txBody>
-          <a:bodyPr anchor="t">
-            <a:normAutofit/>
+          <a:bodyPr>
+            <a:normAutofit fontScale="90000"/>
           </a:bodyPr>
           <a:lstStyle/>
           <a:p>
             <a:r>
-              <a:rPr lang="de-CH" sz="6000" dirty="0" smtClean="0"/>
+              <a:rPr lang="de-CH" dirty="0" smtClean="0"/>
               <a:t>Architektur</a:t>
             </a:r>
-            <a:endParaRPr lang="de-CH" sz="6000" dirty="0"/>
-          </a:p>
-        </p:txBody>
-      </p:sp>
-      <p:sp>
-        <p:nvSpPr>
-          <p:cNvPr id="3" name="Content Placeholder 2"/>
-          <p:cNvSpPr>
-            <a:spLocks noGrp="1"/>
-          </p:cNvSpPr>
-          <p:nvPr>
-            <p:ph idx="1"/>
+            <a:endParaRPr lang="de-CH" dirty="0"/>
+          </a:p>
+        </p:txBody>
+      </p:sp>
+      <p:sp>
+        <p:nvSpPr>
+          <p:cNvPr id="8" name="Inhaltsplatzhalter 7"/>
+          <p:cNvSpPr>
+            <a:spLocks noGrp="1"/>
+          </p:cNvSpPr>
+          <p:nvPr>
+            <p:ph sz="quarter" idx="13"/>
           </p:nvPr>
         </p:nvSpPr>
         <p:spPr/>
@@ -4338,25 +3739,75 @@
           <a:lstStyle/>
           <a:p>
             <a:r>
+              <a:rPr lang="de-CH" dirty="0" smtClean="0"/>
+              <a:t>Domain-</a:t>
+            </a:r>
+            <a:r>
               <a:rPr lang="de-CH" dirty="0" err="1" smtClean="0"/>
-              <a:t>Inkl</a:t>
-            </a:r>
+              <a:t>driven</a:t>
+            </a:r>
+            <a:endParaRPr lang="de-CH" dirty="0" smtClean="0"/>
+          </a:p>
+          <a:p>
             <a:r>
               <a:rPr lang="de-CH" dirty="0" smtClean="0"/>
-              <a:t> Input </a:t>
+              <a:t>3-Layer </a:t>
             </a:r>
             <a:r>
               <a:rPr lang="de-CH" dirty="0" err="1" smtClean="0"/>
-              <a:t>LibGDX</a:t>
+              <a:t>Architecture</a:t>
             </a:r>
             <a:endParaRPr lang="de-CH" dirty="0"/>
           </a:p>
         </p:txBody>
       </p:sp>
+      <p:sp>
+        <p:nvSpPr>
+          <p:cNvPr id="9" name="Inhaltsplatzhalter 8"/>
+          <p:cNvSpPr>
+            <a:spLocks noGrp="1"/>
+          </p:cNvSpPr>
+          <p:nvPr>
+            <p:ph sz="quarter" idx="14"/>
+          </p:nvPr>
+        </p:nvSpPr>
+        <p:spPr/>
+        <p:txBody>
+          <a:bodyPr/>
+          <a:lstStyle/>
+          <a:p>
+            <a:endParaRPr lang="de-CH" dirty="0"/>
+          </a:p>
+        </p:txBody>
+      </p:sp>
+      <p:pic>
+        <p:nvPicPr>
+          <p:cNvPr id="10" name="Grafik 9"/>
+          <p:cNvPicPr>
+            <a:picLocks noChangeAspect="1"/>
+          </p:cNvPicPr>
+          <p:nvPr/>
+        </p:nvPicPr>
+        <p:blipFill>
+          <a:blip r:embed="rId3"/>
+          <a:stretch>
+            <a:fillRect/>
+          </a:stretch>
+        </p:blipFill>
+        <p:spPr>
+          <a:xfrm>
+            <a:off x="4644008" y="1412776"/>
+            <a:ext cx="3922369" cy="4838701"/>
+          </a:xfrm>
+          <a:prstGeom prst="rect">
+            <a:avLst/>
+          </a:prstGeom>
+        </p:spPr>
+      </p:pic>
     </p:spTree>
     <p:extLst>
       <p:ext uri="{BB962C8B-B14F-4D97-AF65-F5344CB8AC3E}">
-        <p14:creationId xmlns:p14="http://schemas.microsoft.com/office/powerpoint/2010/main" val="3178079573"/>
+        <p14:creationId xmlns:p14="http://schemas.microsoft.com/office/powerpoint/2010/main" val="3265436870"/>
       </p:ext>
     </p:extLst>
   </p:cSld>
@@ -4390,6 +3841,414 @@
           <a:chExt cx="0" cy="0"/>
         </a:xfrm>
       </p:grpSpPr>
+      <p:pic>
+        <p:nvPicPr>
+          <p:cNvPr id="14" name="Grafik 13"/>
+          <p:cNvPicPr>
+            <a:picLocks noChangeAspect="1"/>
+          </p:cNvPicPr>
+          <p:nvPr/>
+        </p:nvPicPr>
+        <p:blipFill>
+          <a:blip r:embed="rId2"/>
+          <a:stretch>
+            <a:fillRect/>
+          </a:stretch>
+        </p:blipFill>
+        <p:spPr>
+          <a:xfrm>
+            <a:off x="107504" y="1844824"/>
+            <a:ext cx="8955966" cy="12896241"/>
+          </a:xfrm>
+          <a:prstGeom prst="rect">
+            <a:avLst/>
+          </a:prstGeom>
+        </p:spPr>
+      </p:pic>
+      <p:grpSp>
+        <p:nvGrpSpPr>
+          <p:cNvPr id="2" name="Gruppieren 1"/>
+          <p:cNvGrpSpPr/>
+          <p:nvPr/>
+        </p:nvGrpSpPr>
+        <p:grpSpPr>
+          <a:xfrm>
+            <a:off x="538480" y="330687"/>
+            <a:ext cx="8607011" cy="938073"/>
+            <a:chOff x="538480" y="330687"/>
+            <a:chExt cx="8607011" cy="938073"/>
+          </a:xfrm>
+        </p:grpSpPr>
+        <p:sp>
+          <p:nvSpPr>
+            <p:cNvPr id="3" name="Rectangle 9"/>
+            <p:cNvSpPr/>
+            <p:nvPr/>
+          </p:nvSpPr>
+          <p:spPr>
+            <a:xfrm>
+              <a:off x="8435268" y="573807"/>
+              <a:ext cx="86236" cy="572316"/>
+            </a:xfrm>
+            <a:prstGeom prst="rect">
+              <a:avLst/>
+            </a:prstGeom>
+            <a:solidFill>
+              <a:schemeClr val="tx2"/>
+            </a:solidFill>
+            <a:ln>
+              <a:noFill/>
+            </a:ln>
+          </p:spPr>
+          <p:style>
+            <a:lnRef idx="2">
+              <a:schemeClr val="accent1">
+                <a:shade val="50000"/>
+              </a:schemeClr>
+            </a:lnRef>
+            <a:fillRef idx="1">
+              <a:schemeClr val="accent1"/>
+            </a:fillRef>
+            <a:effectRef idx="0">
+              <a:schemeClr val="accent1"/>
+            </a:effectRef>
+            <a:fontRef idx="minor">
+              <a:schemeClr val="lt1"/>
+            </a:fontRef>
+          </p:style>
+          <p:txBody>
+            <a:bodyPr rtlCol="0" anchor="ctr"/>
+            <a:lstStyle/>
+            <a:p>
+              <a:pPr algn="ctr"/>
+              <a:endParaRPr lang="en-US"/>
+            </a:p>
+          </p:txBody>
+        </p:sp>
+        <p:sp>
+          <p:nvSpPr>
+            <p:cNvPr id="4" name="Rectangle 10"/>
+            <p:cNvSpPr/>
+            <p:nvPr/>
+          </p:nvSpPr>
+          <p:spPr>
+            <a:xfrm>
+              <a:off x="8569419" y="573807"/>
+              <a:ext cx="576072" cy="572316"/>
+            </a:xfrm>
+            <a:prstGeom prst="rect">
+              <a:avLst/>
+            </a:prstGeom>
+            <a:solidFill>
+              <a:schemeClr val="tx2"/>
+            </a:solidFill>
+            <a:ln>
+              <a:noFill/>
+            </a:ln>
+          </p:spPr>
+          <p:style>
+            <a:lnRef idx="2">
+              <a:schemeClr val="accent1">
+                <a:shade val="50000"/>
+              </a:schemeClr>
+            </a:lnRef>
+            <a:fillRef idx="1">
+              <a:schemeClr val="accent1"/>
+            </a:fillRef>
+            <a:effectRef idx="0">
+              <a:schemeClr val="accent1"/>
+            </a:effectRef>
+            <a:fontRef idx="minor">
+              <a:schemeClr val="lt1"/>
+            </a:fontRef>
+          </p:style>
+          <p:txBody>
+            <a:bodyPr rtlCol="0" anchor="ctr"/>
+            <a:lstStyle/>
+            <a:p>
+              <a:pPr algn="ctr"/>
+              <a:endParaRPr lang="en-US"/>
+            </a:p>
+          </p:txBody>
+        </p:sp>
+        <p:sp>
+          <p:nvSpPr>
+            <p:cNvPr id="5" name="Title Placeholder 1"/>
+            <p:cNvSpPr txBox="1">
+              <a:spLocks/>
+            </p:cNvSpPr>
+            <p:nvPr/>
+          </p:nvSpPr>
+          <p:spPr>
+            <a:xfrm>
+              <a:off x="538480" y="330687"/>
+              <a:ext cx="7691120" cy="938073"/>
+            </a:xfrm>
+            <a:prstGeom prst="rect">
+              <a:avLst/>
+            </a:prstGeom>
+          </p:spPr>
+          <p:txBody>
+            <a:bodyPr vert="horz" lIns="91440" tIns="45720" rIns="91440" bIns="45720" rtlCol="0" anchor="t">
+              <a:normAutofit/>
+            </a:bodyPr>
+            <a:lstStyle>
+              <a:lvl1pPr algn="l" defTabSz="914400" rtl="0" eaLnBrk="1" latinLnBrk="0" hangingPunct="1">
+                <a:spcBef>
+                  <a:spcPct val="0"/>
+                </a:spcBef>
+                <a:buNone/>
+                <a:defRPr lang="en-US" sz="6000" kern="1200" dirty="0">
+                  <a:solidFill>
+                    <a:schemeClr val="tx2"/>
+                  </a:solidFill>
+                  <a:latin typeface="+mj-lt"/>
+                  <a:ea typeface="+mj-ea"/>
+                  <a:cs typeface="+mj-cs"/>
+                </a:defRPr>
+              </a:lvl1pPr>
+              <a:lvl2pPr eaLnBrk="1" hangingPunct="1">
+                <a:defRPr>
+                  <a:solidFill>
+                    <a:schemeClr val="tx2"/>
+                  </a:solidFill>
+                </a:defRPr>
+              </a:lvl2pPr>
+              <a:lvl3pPr eaLnBrk="1" hangingPunct="1">
+                <a:defRPr>
+                  <a:solidFill>
+                    <a:schemeClr val="tx2"/>
+                  </a:solidFill>
+                </a:defRPr>
+              </a:lvl3pPr>
+              <a:lvl4pPr eaLnBrk="1" hangingPunct="1">
+                <a:defRPr>
+                  <a:solidFill>
+                    <a:schemeClr val="tx2"/>
+                  </a:solidFill>
+                </a:defRPr>
+              </a:lvl4pPr>
+              <a:lvl5pPr eaLnBrk="1" hangingPunct="1">
+                <a:defRPr>
+                  <a:solidFill>
+                    <a:schemeClr val="tx2"/>
+                  </a:solidFill>
+                </a:defRPr>
+              </a:lvl5pPr>
+              <a:lvl6pPr eaLnBrk="1" hangingPunct="1">
+                <a:defRPr>
+                  <a:solidFill>
+                    <a:schemeClr val="tx2"/>
+                  </a:solidFill>
+                </a:defRPr>
+              </a:lvl6pPr>
+              <a:lvl7pPr eaLnBrk="1" hangingPunct="1">
+                <a:defRPr>
+                  <a:solidFill>
+                    <a:schemeClr val="tx2"/>
+                  </a:solidFill>
+                </a:defRPr>
+              </a:lvl7pPr>
+              <a:lvl8pPr eaLnBrk="1" hangingPunct="1">
+                <a:defRPr>
+                  <a:solidFill>
+                    <a:schemeClr val="tx2"/>
+                  </a:solidFill>
+                </a:defRPr>
+              </a:lvl8pPr>
+              <a:lvl9pPr eaLnBrk="1" hangingPunct="1">
+                <a:defRPr>
+                  <a:solidFill>
+                    <a:schemeClr val="tx2"/>
+                  </a:solidFill>
+                </a:defRPr>
+              </a:lvl9pPr>
+            </a:lstStyle>
+            <a:p>
+              <a:r>
+                <a:rPr lang="en-US" sz="5400" dirty="0" err="1" smtClean="0"/>
+                <a:t>Architektur</a:t>
+              </a:r>
+              <a:endParaRPr lang="en-US" sz="5400" dirty="0"/>
+            </a:p>
+          </p:txBody>
+        </p:sp>
+      </p:grpSp>
+    </p:spTree>
+    <p:extLst>
+      <p:ext uri="{BB962C8B-B14F-4D97-AF65-F5344CB8AC3E}">
+        <p14:creationId xmlns:p14="http://schemas.microsoft.com/office/powerpoint/2010/main" val="1648794995"/>
+      </p:ext>
+    </p:extLst>
+  </p:cSld>
+  <p:clrMapOvr>
+    <a:masterClrMapping/>
+  </p:clrMapOvr>
+  <p:timing>
+    <p:tnLst>
+      <p:par>
+        <p:cTn id="1" dur="indefinite" restart="never" nodeType="tmRoot">
+          <p:childTnLst>
+            <p:seq concurrent="1" nextAc="seek">
+              <p:cTn id="2" dur="indefinite" nodeType="mainSeq">
+                <p:childTnLst>
+                  <p:par>
+                    <p:cTn id="3" fill="hold">
+                      <p:stCondLst>
+                        <p:cond delay="indefinite"/>
+                      </p:stCondLst>
+                      <p:childTnLst>
+                        <p:par>
+                          <p:cTn id="4" fill="hold">
+                            <p:stCondLst>
+                              <p:cond delay="0"/>
+                            </p:stCondLst>
+                            <p:childTnLst>
+                              <p:par>
+                                <p:cTn id="5" presetID="64" presetClass="path" presetSubtype="0" accel="50000" decel="50000" fill="hold" nodeType="clickEffect">
+                                  <p:stCondLst>
+                                    <p:cond delay="0"/>
+                                  </p:stCondLst>
+                                  <p:childTnLst>
+                                    <p:animMotion origin="layout" path="M 1.11111E-6 7.40741E-7 L 1.11111E-6 -0.88264 " pathEditMode="relative" rAng="0" ptsTypes="AA">
+                                      <p:cBhvr>
+                                        <p:cTn id="6" dur="2000" fill="hold"/>
+                                        <p:tgtEl>
+                                          <p:spTgt spid="14"/>
+                                        </p:tgtEl>
+                                        <p:attrNameLst>
+                                          <p:attrName>ppt_x</p:attrName>
+                                          <p:attrName>ppt_y</p:attrName>
+                                        </p:attrNameLst>
+                                      </p:cBhvr>
+                                      <p:rCtr x="0" y="-44144"/>
+                                    </p:animMotion>
+                                  </p:childTnLst>
+                                </p:cTn>
+                              </p:par>
+                              <p:par>
+                                <p:cTn id="7" presetID="10" presetClass="exit" presetSubtype="0" fill="hold" nodeType="withEffect">
+                                  <p:stCondLst>
+                                    <p:cond delay="0"/>
+                                  </p:stCondLst>
+                                  <p:childTnLst>
+                                    <p:animEffect transition="out" filter="fade">
+                                      <p:cBhvr>
+                                        <p:cTn id="8" dur="500"/>
+                                        <p:tgtEl>
+                                          <p:spTgt spid="2"/>
+                                        </p:tgtEl>
+                                      </p:cBhvr>
+                                    </p:animEffect>
+                                    <p:set>
+                                      <p:cBhvr>
+                                        <p:cTn id="9" dur="1" fill="hold">
+                                          <p:stCondLst>
+                                            <p:cond delay="499"/>
+                                          </p:stCondLst>
+                                        </p:cTn>
+                                        <p:tgtEl>
+                                          <p:spTgt spid="2"/>
+                                        </p:tgtEl>
+                                        <p:attrNameLst>
+                                          <p:attrName>style.visibility</p:attrName>
+                                        </p:attrNameLst>
+                                      </p:cBhvr>
+                                      <p:to>
+                                        <p:strVal val="hidden"/>
+                                      </p:to>
+                                    </p:set>
+                                  </p:childTnLst>
+                                </p:cTn>
+                              </p:par>
+                            </p:childTnLst>
+                          </p:cTn>
+                        </p:par>
+                      </p:childTnLst>
+                    </p:cTn>
+                  </p:par>
+                  <p:par>
+                    <p:cTn id="10" fill="hold">
+                      <p:stCondLst>
+                        <p:cond delay="indefinite"/>
+                      </p:stCondLst>
+                      <p:childTnLst>
+                        <p:par>
+                          <p:cTn id="11" fill="hold">
+                            <p:stCondLst>
+                              <p:cond delay="0"/>
+                            </p:stCondLst>
+                            <p:childTnLst>
+                              <p:par>
+                                <p:cTn id="12" presetID="64" presetClass="path" presetSubtype="0" accel="50000" decel="50000" fill="hold" nodeType="clickEffect">
+                                  <p:stCondLst>
+                                    <p:cond delay="0"/>
+                                  </p:stCondLst>
+                                  <p:childTnLst>
+                                    <p:animMotion origin="layout" path="M 1.11111E-6 -0.88264 L 1.11111E-6 -1.30255 " pathEditMode="relative" rAng="0" ptsTypes="AA">
+                                      <p:cBhvr>
+                                        <p:cTn id="13" dur="2000" fill="hold"/>
+                                        <p:tgtEl>
+                                          <p:spTgt spid="14"/>
+                                        </p:tgtEl>
+                                        <p:attrNameLst>
+                                          <p:attrName>ppt_x</p:attrName>
+                                          <p:attrName>ppt_y</p:attrName>
+                                        </p:attrNameLst>
+                                      </p:cBhvr>
+                                      <p:rCtr x="0" y="-20995"/>
+                                    </p:animMotion>
+                                  </p:childTnLst>
+                                </p:cTn>
+                              </p:par>
+                            </p:childTnLst>
+                          </p:cTn>
+                        </p:par>
+                      </p:childTnLst>
+                    </p:cTn>
+                  </p:par>
+                </p:childTnLst>
+              </p:cTn>
+              <p:prevCondLst>
+                <p:cond evt="onPrev" delay="0">
+                  <p:tgtEl>
+                    <p:sldTgt/>
+                  </p:tgtEl>
+                </p:cond>
+              </p:prevCondLst>
+              <p:nextCondLst>
+                <p:cond evt="onNext" delay="0">
+                  <p:tgtEl>
+                    <p:sldTgt/>
+                  </p:tgtEl>
+                </p:cond>
+              </p:nextCondLst>
+            </p:seq>
+          </p:childTnLst>
+        </p:cTn>
+      </p:par>
+    </p:tnLst>
+  </p:timing>
+</p:sld>
+</file>
+
+<file path=ppt/slides/slide6.xml><?xml version="1.0" encoding="utf-8"?>
+<p:sld xmlns:a="http://schemas.openxmlformats.org/drawingml/2006/main" xmlns:r="http://schemas.openxmlformats.org/officeDocument/2006/relationships" xmlns:p="http://schemas.openxmlformats.org/presentationml/2006/main">
+  <p:cSld>
+    <p:spTree>
+      <p:nvGrpSpPr>
+        <p:cNvPr id="1" name=""/>
+        <p:cNvGrpSpPr/>
+        <p:nvPr/>
+      </p:nvGrpSpPr>
+      <p:grpSpPr>
+        <a:xfrm>
+          <a:off x="0" y="0"/>
+          <a:ext cx="0" cy="0"/>
+          <a:chOff x="0" y="0"/>
+          <a:chExt cx="0" cy="0"/>
+        </a:xfrm>
+      </p:grpSpPr>
       <p:sp>
         <p:nvSpPr>
           <p:cNvPr id="2" name="Titel 1"/>
@@ -4398,6 +4257,31 @@
           </p:cNvSpPr>
           <p:nvPr>
             <p:ph type="title"/>
+          </p:nvPr>
+        </p:nvSpPr>
+        <p:spPr/>
+        <p:txBody>
+          <a:bodyPr>
+            <a:normAutofit fontScale="90000"/>
+          </a:bodyPr>
+          <a:lstStyle/>
+          <a:p>
+            <a:r>
+              <a:rPr lang="de-CH" dirty="0" smtClean="0"/>
+              <a:t>libGDX</a:t>
+            </a:r>
+            <a:endParaRPr lang="de-CH" dirty="0"/>
+          </a:p>
+        </p:txBody>
+      </p:sp>
+      <p:sp>
+        <p:nvSpPr>
+          <p:cNvPr id="3" name="Inhaltsplatzhalter 2"/>
+          <p:cNvSpPr>
+            <a:spLocks noGrp="1"/>
+          </p:cNvSpPr>
+          <p:nvPr>
+            <p:ph idx="1"/>
           </p:nvPr>
         </p:nvSpPr>
         <p:spPr/>
@@ -4409,47 +4293,477 @@
           <a:p>
             <a:r>
               <a:rPr lang="de-CH" dirty="0" smtClean="0"/>
-              <a:t>Zusätzliche </a:t>
+              <a:t>Java-Spieleentwicklungsframework</a:t>
+            </a:r>
+          </a:p>
+          <a:p>
+            <a:r>
+              <a:rPr lang="de-CH" dirty="0" smtClean="0"/>
+              <a:t>Einheitliche API für unterstützte Plattformen</a:t>
+            </a:r>
+            <a:endParaRPr lang="de-CH" dirty="0" smtClean="0"/>
+          </a:p>
+          <a:p>
+            <a:endParaRPr lang="de-CH" dirty="0"/>
+          </a:p>
+          <a:p>
+            <a:r>
+              <a:rPr lang="de-CH" dirty="0" smtClean="0"/>
+              <a:t>Nutzt </a:t>
             </a:r>
             <a:r>
               <a:rPr lang="de-CH" dirty="0" err="1" smtClean="0"/>
-              <a:t>Specs</a:t>
-            </a:r>
-            <a:endParaRPr lang="de-CH" dirty="0"/>
-          </a:p>
-        </p:txBody>
-      </p:sp>
-      <p:sp>
-        <p:nvSpPr>
-          <p:cNvPr id="3" name="Inhaltsplatzhalter 2"/>
-          <p:cNvSpPr>
-            <a:spLocks noGrp="1"/>
-          </p:cNvSpPr>
-          <p:nvPr>
-            <p:ph idx="1"/>
-          </p:nvPr>
-        </p:nvSpPr>
-        <p:spPr/>
-        <p:txBody>
-          <a:bodyPr/>
-          <a:lstStyle/>
-          <a:p>
+              <a:t>u.A.</a:t>
+            </a:r>
+            <a:r>
+              <a:rPr lang="de-CH" dirty="0" smtClean="0"/>
+              <a:t> folgende </a:t>
+            </a:r>
             <a:r>
               <a:rPr lang="de-CH" dirty="0" err="1" smtClean="0"/>
-              <a:t>Inkl</a:t>
+              <a:t>third</a:t>
             </a:r>
             <a:r>
               <a:rPr lang="de-CH" dirty="0" smtClean="0"/>
-              <a:t> Input Android</a:t>
-            </a:r>
-            <a:endParaRPr lang="de-CH" dirty="0"/>
-          </a:p>
-        </p:txBody>
-      </p:sp>
+              <a:t>-party </a:t>
+            </a:r>
+            <a:r>
+              <a:rPr lang="de-CH" dirty="0" err="1" smtClean="0"/>
+              <a:t>libraries</a:t>
+            </a:r>
+            <a:r>
+              <a:rPr lang="de-CH" dirty="0" smtClean="0"/>
+              <a:t>:</a:t>
+            </a:r>
+          </a:p>
+          <a:p>
+            <a:pPr lvl="1"/>
+            <a:r>
+              <a:rPr lang="de-CH" dirty="0" smtClean="0"/>
+              <a:t>Lightweight Java Game Library</a:t>
+            </a:r>
+          </a:p>
+          <a:p>
+            <a:pPr lvl="1"/>
+            <a:r>
+              <a:rPr lang="de-CH" dirty="0"/>
+              <a:t>OpenGL ES 2.0</a:t>
+            </a:r>
+          </a:p>
+        </p:txBody>
+      </p:sp>
+      <p:pic>
+        <p:nvPicPr>
+          <p:cNvPr id="1026" name="Picture 2" descr="http://libgdx.badlogicgames.com/img/logo.png"/>
+          <p:cNvPicPr>
+            <a:picLocks noChangeAspect="1" noChangeArrowheads="1"/>
+          </p:cNvPicPr>
+          <p:nvPr/>
+        </p:nvPicPr>
+        <p:blipFill>
+          <a:blip r:embed="rId2">
+            <a:extLst>
+              <a:ext uri="{28A0092B-C50C-407E-A947-70E740481C1C}">
+                <a14:useLocalDpi xmlns:a14="http://schemas.microsoft.com/office/drawing/2010/main" val="0"/>
+              </a:ext>
+            </a:extLst>
+          </a:blip>
+          <a:srcRect/>
+          <a:stretch>
+            <a:fillRect/>
+          </a:stretch>
+        </p:blipFill>
+        <p:spPr bwMode="auto">
+          <a:xfrm>
+            <a:off x="5748020" y="5833111"/>
+            <a:ext cx="2857500" cy="476250"/>
+          </a:xfrm>
+          <a:prstGeom prst="rect">
+            <a:avLst/>
+          </a:prstGeom>
+          <a:noFill/>
+          <a:extLst>
+            <a:ext uri="{909E8E84-426E-40DD-AFC4-6F175D3DCCD1}">
+              <a14:hiddenFill xmlns:a14="http://schemas.microsoft.com/office/drawing/2010/main">
+                <a:solidFill>
+                  <a:srgbClr val="FFFFFF"/>
+                </a:solidFill>
+              </a14:hiddenFill>
+            </a:ext>
+          </a:extLst>
+        </p:spPr>
+      </p:pic>
     </p:spTree>
     <p:extLst>
       <p:ext uri="{BB962C8B-B14F-4D97-AF65-F5344CB8AC3E}">
-        <p14:creationId xmlns:p14="http://schemas.microsoft.com/office/powerpoint/2010/main" val="591035820"/>
+        <p14:creationId xmlns:p14="http://schemas.microsoft.com/office/powerpoint/2010/main" val="3420804160"/>
+      </p:ext>
+    </p:extLst>
+  </p:cSld>
+  <p:clrMapOvr>
+    <a:masterClrMapping/>
+  </p:clrMapOvr>
+  <p:timing>
+    <p:tnLst>
+      <p:par>
+        <p:cTn id="1" dur="indefinite" restart="never" nodeType="tmRoot"/>
+      </p:par>
+    </p:tnLst>
+  </p:timing>
+</p:sld>
+</file>
+
+<file path=ppt/slides/slide7.xml><?xml version="1.0" encoding="utf-8"?>
+<p:sld xmlns:a="http://schemas.openxmlformats.org/drawingml/2006/main" xmlns:r="http://schemas.openxmlformats.org/officeDocument/2006/relationships" xmlns:p="http://schemas.openxmlformats.org/presentationml/2006/main">
+  <p:cSld>
+    <p:spTree>
+      <p:nvGrpSpPr>
+        <p:cNvPr id="1" name=""/>
+        <p:cNvGrpSpPr/>
+        <p:nvPr/>
+      </p:nvGrpSpPr>
+      <p:grpSpPr>
+        <a:xfrm>
+          <a:off x="0" y="0"/>
+          <a:ext cx="0" cy="0"/>
+          <a:chOff x="0" y="0"/>
+          <a:chExt cx="0" cy="0"/>
+        </a:xfrm>
+      </p:grpSpPr>
+      <p:sp>
+        <p:nvSpPr>
+          <p:cNvPr id="2" name="Titel 1"/>
+          <p:cNvSpPr>
+            <a:spLocks noGrp="1"/>
+          </p:cNvSpPr>
+          <p:nvPr>
+            <p:ph type="title"/>
+          </p:nvPr>
+        </p:nvSpPr>
+        <p:spPr/>
+        <p:txBody>
+          <a:bodyPr>
+            <a:normAutofit fontScale="90000"/>
+          </a:bodyPr>
+          <a:lstStyle/>
+          <a:p>
+            <a:r>
+              <a:rPr lang="de-CH" dirty="0" smtClean="0"/>
+              <a:t>libGDX</a:t>
+            </a:r>
+            <a:endParaRPr lang="de-CH" dirty="0"/>
+          </a:p>
+        </p:txBody>
+      </p:sp>
+      <p:sp>
+        <p:nvSpPr>
+          <p:cNvPr id="3" name="Inhaltsplatzhalter 2"/>
+          <p:cNvSpPr>
+            <a:spLocks noGrp="1"/>
+          </p:cNvSpPr>
+          <p:nvPr>
+            <p:ph idx="1"/>
+          </p:nvPr>
+        </p:nvSpPr>
+        <p:spPr/>
+        <p:txBody>
+          <a:bodyPr>
+            <a:normAutofit/>
+          </a:bodyPr>
+          <a:lstStyle/>
+          <a:p>
+            <a:pPr lvl="0"/>
+            <a:r>
+              <a:rPr lang="de-CH" dirty="0" smtClean="0"/>
+              <a:t>Open Source (Apache 2.0)</a:t>
+            </a:r>
+          </a:p>
+          <a:p>
+            <a:pPr lvl="0"/>
+            <a:r>
+              <a:rPr lang="de-CH" dirty="0" err="1" smtClean="0"/>
+              <a:t>Gradle</a:t>
+            </a:r>
+            <a:r>
+              <a:rPr lang="de-CH" dirty="0" smtClean="0"/>
+              <a:t> Integration</a:t>
+            </a:r>
+            <a:endParaRPr lang="de-CH" dirty="0"/>
+          </a:p>
+          <a:p>
+            <a:pPr lvl="0"/>
+            <a:r>
+              <a:rPr lang="de-CH" dirty="0"/>
+              <a:t>Viele, modulare Features</a:t>
+            </a:r>
+          </a:p>
+          <a:p>
+            <a:pPr lvl="0"/>
+            <a:r>
+              <a:rPr lang="de-CH" dirty="0" smtClean="0"/>
+              <a:t>In </a:t>
+            </a:r>
+            <a:r>
+              <a:rPr lang="de-CH" dirty="0"/>
+              <a:t>aktiver </a:t>
+            </a:r>
+            <a:r>
+              <a:rPr lang="de-CH" dirty="0" err="1" smtClean="0"/>
+              <a:t>EntwicklungGrosse</a:t>
+            </a:r>
+            <a:r>
+              <a:rPr lang="de-CH" dirty="0"/>
+              <a:t>, aktive Community</a:t>
+            </a:r>
+          </a:p>
+          <a:p>
+            <a:pPr lvl="0"/>
+            <a:r>
+              <a:rPr lang="de-CH" dirty="0" smtClean="0"/>
+              <a:t>Sehr </a:t>
+            </a:r>
+            <a:r>
+              <a:rPr lang="de-CH" dirty="0"/>
+              <a:t>gut </a:t>
+            </a:r>
+            <a:r>
+              <a:rPr lang="de-CH" dirty="0" smtClean="0"/>
+              <a:t>dokumentiert</a:t>
+            </a:r>
+          </a:p>
+          <a:p>
+            <a:pPr lvl="0"/>
+            <a:r>
+              <a:rPr lang="de-CH" dirty="0" smtClean="0"/>
+              <a:t>Cross </a:t>
+            </a:r>
+            <a:r>
+              <a:rPr lang="de-CH" dirty="0" err="1" smtClean="0"/>
+              <a:t>Platform</a:t>
+            </a:r>
+            <a:endParaRPr lang="de-CH" dirty="0" smtClean="0"/>
+          </a:p>
+          <a:p>
+            <a:pPr lvl="1"/>
+            <a:r>
+              <a:rPr lang="de-CH" dirty="0" smtClean="0"/>
+              <a:t>Android, Windows, Mac, Linux, iOS, BlackBerry und HTML5</a:t>
+            </a:r>
+            <a:endParaRPr lang="de-CH" dirty="0"/>
+          </a:p>
+        </p:txBody>
+      </p:sp>
+      <p:pic>
+        <p:nvPicPr>
+          <p:cNvPr id="1026" name="Picture 2" descr="http://libgdx.badlogicgames.com/img/logo.png"/>
+          <p:cNvPicPr>
+            <a:picLocks noChangeAspect="1" noChangeArrowheads="1"/>
+          </p:cNvPicPr>
+          <p:nvPr/>
+        </p:nvPicPr>
+        <p:blipFill>
+          <a:blip r:embed="rId2">
+            <a:extLst>
+              <a:ext uri="{28A0092B-C50C-407E-A947-70E740481C1C}">
+                <a14:useLocalDpi xmlns:a14="http://schemas.microsoft.com/office/drawing/2010/main" val="0"/>
+              </a:ext>
+            </a:extLst>
+          </a:blip>
+          <a:srcRect/>
+          <a:stretch>
+            <a:fillRect/>
+          </a:stretch>
+        </p:blipFill>
+        <p:spPr bwMode="auto">
+          <a:xfrm>
+            <a:off x="5748020" y="5833111"/>
+            <a:ext cx="2857500" cy="476250"/>
+          </a:xfrm>
+          <a:prstGeom prst="rect">
+            <a:avLst/>
+          </a:prstGeom>
+          <a:noFill/>
+          <a:extLst>
+            <a:ext uri="{909E8E84-426E-40DD-AFC4-6F175D3DCCD1}">
+              <a14:hiddenFill xmlns:a14="http://schemas.microsoft.com/office/drawing/2010/main">
+                <a:solidFill>
+                  <a:srgbClr val="FFFFFF"/>
+                </a:solidFill>
+              </a14:hiddenFill>
+            </a:ext>
+          </a:extLst>
+        </p:spPr>
+      </p:pic>
+    </p:spTree>
+    <p:extLst>
+      <p:ext uri="{BB962C8B-B14F-4D97-AF65-F5344CB8AC3E}">
+        <p14:creationId xmlns:p14="http://schemas.microsoft.com/office/powerpoint/2010/main" val="2822223054"/>
+      </p:ext>
+    </p:extLst>
+  </p:cSld>
+  <p:clrMapOvr>
+    <a:masterClrMapping/>
+  </p:clrMapOvr>
+  <p:timing>
+    <p:tnLst>
+      <p:par>
+        <p:cTn id="1" dur="indefinite" restart="never" nodeType="tmRoot"/>
+      </p:par>
+    </p:tnLst>
+  </p:timing>
+</p:sld>
+</file>
+
+<file path=ppt/slides/slide8.xml><?xml version="1.0" encoding="utf-8"?>
+<p:sld xmlns:a="http://schemas.openxmlformats.org/drawingml/2006/main" xmlns:r="http://schemas.openxmlformats.org/officeDocument/2006/relationships" xmlns:p="http://schemas.openxmlformats.org/presentationml/2006/main">
+  <p:cSld>
+    <p:spTree>
+      <p:nvGrpSpPr>
+        <p:cNvPr id="1" name=""/>
+        <p:cNvGrpSpPr/>
+        <p:nvPr/>
+      </p:nvGrpSpPr>
+      <p:grpSpPr>
+        <a:xfrm>
+          <a:off x="0" y="0"/>
+          <a:ext cx="0" cy="0"/>
+          <a:chOff x="0" y="0"/>
+          <a:chExt cx="0" cy="0"/>
+        </a:xfrm>
+      </p:grpSpPr>
+      <p:sp>
+        <p:nvSpPr>
+          <p:cNvPr id="2" name="Titel 1"/>
+          <p:cNvSpPr>
+            <a:spLocks noGrp="1"/>
+          </p:cNvSpPr>
+          <p:nvPr>
+            <p:ph type="title"/>
+          </p:nvPr>
+        </p:nvSpPr>
+        <p:spPr/>
+        <p:txBody>
+          <a:bodyPr>
+            <a:normAutofit fontScale="90000"/>
+          </a:bodyPr>
+          <a:lstStyle/>
+          <a:p>
+            <a:r>
+              <a:rPr lang="de-CH" dirty="0" smtClean="0"/>
+              <a:t>Zusätzliche </a:t>
+            </a:r>
+            <a:r>
+              <a:rPr lang="de-CH" dirty="0" err="1" smtClean="0"/>
+              <a:t>Specs</a:t>
+            </a:r>
+            <a:endParaRPr lang="de-CH" dirty="0"/>
+          </a:p>
+        </p:txBody>
+      </p:sp>
+      <p:sp>
+        <p:nvSpPr>
+          <p:cNvPr id="3" name="Inhaltsplatzhalter 2"/>
+          <p:cNvSpPr>
+            <a:spLocks noGrp="1"/>
+          </p:cNvSpPr>
+          <p:nvPr>
+            <p:ph idx="1"/>
+          </p:nvPr>
+        </p:nvSpPr>
+        <p:spPr/>
+        <p:txBody>
+          <a:bodyPr/>
+          <a:lstStyle/>
+          <a:p>
+            <a:endParaRPr lang="de-CH" dirty="0"/>
+          </a:p>
+        </p:txBody>
+      </p:sp>
+    </p:spTree>
+    <p:extLst>
+      <p:ext uri="{BB962C8B-B14F-4D97-AF65-F5344CB8AC3E}">
+        <p14:creationId xmlns:p14="http://schemas.microsoft.com/office/powerpoint/2010/main" val="1871111388"/>
+      </p:ext>
+    </p:extLst>
+  </p:cSld>
+  <p:clrMapOvr>
+    <a:masterClrMapping/>
+  </p:clrMapOvr>
+  <p:timing>
+    <p:tnLst>
+      <p:par>
+        <p:cTn id="1" dur="indefinite" restart="never" nodeType="tmRoot"/>
+      </p:par>
+    </p:tnLst>
+  </p:timing>
+</p:sld>
+</file>
+
+<file path=ppt/slides/slide9.xml><?xml version="1.0" encoding="utf-8"?>
+<p:sld xmlns:a="http://schemas.openxmlformats.org/drawingml/2006/main" xmlns:r="http://schemas.openxmlformats.org/officeDocument/2006/relationships" xmlns:p="http://schemas.openxmlformats.org/presentationml/2006/main">
+  <p:cSld>
+    <p:spTree>
+      <p:nvGrpSpPr>
+        <p:cNvPr id="1" name=""/>
+        <p:cNvGrpSpPr/>
+        <p:nvPr/>
+      </p:nvGrpSpPr>
+      <p:grpSpPr>
+        <a:xfrm>
+          <a:off x="0" y="0"/>
+          <a:ext cx="0" cy="0"/>
+          <a:chOff x="0" y="0"/>
+          <a:chExt cx="0" cy="0"/>
+        </a:xfrm>
+      </p:grpSpPr>
+      <p:sp>
+        <p:nvSpPr>
+          <p:cNvPr id="2" name="Titel 1"/>
+          <p:cNvSpPr>
+            <a:spLocks noGrp="1"/>
+          </p:cNvSpPr>
+          <p:nvPr>
+            <p:ph type="title"/>
+          </p:nvPr>
+        </p:nvSpPr>
+        <p:spPr/>
+        <p:txBody>
+          <a:bodyPr>
+            <a:normAutofit fontScale="90000"/>
+          </a:bodyPr>
+          <a:lstStyle/>
+          <a:p>
+            <a:r>
+              <a:rPr lang="de-CH" dirty="0" smtClean="0"/>
+              <a:t>Android</a:t>
+            </a:r>
+            <a:endParaRPr lang="de-CH" dirty="0"/>
+          </a:p>
+        </p:txBody>
+      </p:sp>
+      <p:sp>
+        <p:nvSpPr>
+          <p:cNvPr id="3" name="Inhaltsplatzhalter 2"/>
+          <p:cNvSpPr>
+            <a:spLocks noGrp="1"/>
+          </p:cNvSpPr>
+          <p:nvPr>
+            <p:ph idx="1"/>
+          </p:nvPr>
+        </p:nvSpPr>
+        <p:spPr/>
+        <p:txBody>
+          <a:bodyPr/>
+          <a:lstStyle/>
+          <a:p>
+            <a:endParaRPr lang="de-CH"/>
+          </a:p>
+        </p:txBody>
+      </p:sp>
+    </p:spTree>
+    <p:extLst>
+      <p:ext uri="{BB962C8B-B14F-4D97-AF65-F5344CB8AC3E}">
+        <p14:creationId xmlns:p14="http://schemas.microsoft.com/office/powerpoint/2010/main" val="3006280835"/>
       </p:ext>
     </p:extLst>
   </p:cSld>
@@ -5296,7 +5610,7 @@
   <a:extraClrSchemeLst/>
   <a:extLst>
     <a:ext uri="{05A4C25C-085E-4340-85A3-A5531E510DB2}">
-      <thm15:themeFamily xmlns:thm15="http://schemas.microsoft.com/office/thememl/2012/main" xmlns="" name="Office Theme" id="{62F939B6-93AF-4DB8-9C6B-D6C7DFDC589F}" vid="{4A3C46E8-61CC-4603-A589-7422A47A8E4A}"/>
+      <thm15:themeFamily xmlns:thm15="http://schemas.microsoft.com/office/thememl/2012/main" name="Office Theme" id="{62F939B6-93AF-4DB8-9C6B-D6C7DFDC589F}" vid="{4A3C46E8-61CC-4603-A589-7422A47A8E4A}"/>
     </a:ext>
   </a:extLst>
 </a:theme>

</xml_diff>

<commit_message>
libGDX-Teil der Architektur etwas erweitert.
</commit_message>
<xml_diff>
--- a/Documents/Analyse/Analyse_Präsentation_v1.pptx
+++ b/Documents/Analyse/Analyse_Präsentation_v1.pptx
@@ -5,10 +5,10 @@
     <p:sldMasterId id="2147483696" r:id="rId1"/>
   </p:sldMasterIdLst>
   <p:notesMasterIdLst>
-    <p:notesMasterId r:id="rId11"/>
+    <p:notesMasterId r:id="rId12"/>
   </p:notesMasterIdLst>
   <p:handoutMasterIdLst>
-    <p:handoutMasterId r:id="rId12"/>
+    <p:handoutMasterId r:id="rId13"/>
   </p:handoutMasterIdLst>
   <p:sldIdLst>
     <p:sldId id="256" r:id="rId2"/>
@@ -18,8 +18,9 @@
     <p:sldId id="257" r:id="rId6"/>
     <p:sldId id="258" r:id="rId7"/>
     <p:sldId id="265" r:id="rId8"/>
-    <p:sldId id="263" r:id="rId9"/>
-    <p:sldId id="264" r:id="rId10"/>
+    <p:sldId id="266" r:id="rId9"/>
+    <p:sldId id="263" r:id="rId10"/>
+    <p:sldId id="264" r:id="rId11"/>
   </p:sldIdLst>
   <p:sldSz cx="9144000" cy="6858000" type="screen4x3"/>
   <p:notesSz cx="6858000" cy="9144000"/>
@@ -222,7 +223,7 @@
           <a:p>
             <a:fld id="{4B25F24D-90CF-44A7-A9EA-C384FF6564EC}" type="datetimeFigureOut">
               <a:rPr lang="de-CH" smtClean="0"/>
-              <a:t>16.10.2014</a:t>
+              <a:t>18.10.2014</a:t>
             </a:fld>
             <a:endParaRPr lang="de-CH"/>
           </a:p>
@@ -387,7 +388,7 @@
           <a:p>
             <a:fld id="{F2686799-5163-409F-B733-C9681AE00980}" type="datetimeFigureOut">
               <a:rPr lang="de-CH" smtClean="0"/>
-              <a:t>16.10.2014</a:t>
+              <a:t>18.10.2014</a:t>
             </a:fld>
             <a:endParaRPr lang="de-CH"/>
           </a:p>
@@ -911,7 +912,7 @@
           <a:p>
             <a:fld id="{1BA50D42-C9CD-4801-B293-61D1F53EC57E}" type="datetimeFigureOut">
               <a:rPr lang="de-DE" smtClean="0"/>
-              <a:t>16.10.2014</a:t>
+              <a:t>18.10.2014</a:t>
             </a:fld>
             <a:endParaRPr lang="de-DE"/>
           </a:p>
@@ -1110,7 +1111,7 @@
           <a:p>
             <a:fld id="{1BA50D42-C9CD-4801-B293-61D1F53EC57E}" type="datetimeFigureOut">
               <a:rPr lang="de-DE" smtClean="0"/>
-              <a:t>16.10.2014</a:t>
+              <a:t>18.10.2014</a:t>
             </a:fld>
             <a:endParaRPr lang="de-DE"/>
           </a:p>
@@ -1663,7 +1664,7 @@
           <a:p>
             <a:fld id="{1BA50D42-C9CD-4801-B293-61D1F53EC57E}" type="datetimeFigureOut">
               <a:rPr lang="de-DE" smtClean="0"/>
-              <a:t>16.10.2014</a:t>
+              <a:t>18.10.2014</a:t>
             </a:fld>
             <a:endParaRPr lang="de-DE"/>
           </a:p>
@@ -1933,7 +1934,7 @@
           <a:p>
             <a:fld id="{1BA50D42-C9CD-4801-B293-61D1F53EC57E}" type="datetimeFigureOut">
               <a:rPr lang="de-DE" smtClean="0"/>
-              <a:t>16.10.2014</a:t>
+              <a:t>18.10.2014</a:t>
             </a:fld>
             <a:endParaRPr lang="de-DE"/>
           </a:p>
@@ -2086,7 +2087,7 @@
           <a:p>
             <a:fld id="{1BA50D42-C9CD-4801-B293-61D1F53EC57E}" type="datetimeFigureOut">
               <a:rPr lang="de-DE" smtClean="0"/>
-              <a:t>16.10.2014</a:t>
+              <a:t>18.10.2014</a:t>
             </a:fld>
             <a:endParaRPr lang="de-DE"/>
           </a:p>
@@ -2468,7 +2469,7 @@
           <a:p>
             <a:fld id="{1BA50D42-C9CD-4801-B293-61D1F53EC57E}" type="datetimeFigureOut">
               <a:rPr lang="de-DE" smtClean="0"/>
-              <a:t>16.10.2014</a:t>
+              <a:t>18.10.2014</a:t>
             </a:fld>
             <a:endParaRPr lang="de-DE"/>
           </a:p>
@@ -2771,7 +2772,7 @@
           <a:p>
             <a:fld id="{1BA50D42-C9CD-4801-B293-61D1F53EC57E}" type="datetimeFigureOut">
               <a:rPr lang="de-DE" smtClean="0"/>
-              <a:t>16.10.2014</a:t>
+              <a:t>18.10.2014</a:t>
             </a:fld>
             <a:endParaRPr lang="de-DE"/>
           </a:p>
@@ -3504,6 +3505,87 @@
     <p:extLst>
       <p:ext uri="{BB962C8B-B14F-4D97-AF65-F5344CB8AC3E}">
         <p14:creationId xmlns:p14="http://schemas.microsoft.com/office/powerpoint/2010/main" val="2732462891"/>
+      </p:ext>
+    </p:extLst>
+  </p:cSld>
+  <p:clrMapOvr>
+    <a:masterClrMapping/>
+  </p:clrMapOvr>
+  <p:timing>
+    <p:tnLst>
+      <p:par>
+        <p:cTn id="1" dur="indefinite" restart="never" nodeType="tmRoot"/>
+      </p:par>
+    </p:tnLst>
+  </p:timing>
+</p:sld>
+</file>
+
+<file path=ppt/slides/slide10.xml><?xml version="1.0" encoding="utf-8"?>
+<p:sld xmlns:a="http://schemas.openxmlformats.org/drawingml/2006/main" xmlns:r="http://schemas.openxmlformats.org/officeDocument/2006/relationships" xmlns:p="http://schemas.openxmlformats.org/presentationml/2006/main">
+  <p:cSld>
+    <p:spTree>
+      <p:nvGrpSpPr>
+        <p:cNvPr id="1" name=""/>
+        <p:cNvGrpSpPr/>
+        <p:nvPr/>
+      </p:nvGrpSpPr>
+      <p:grpSpPr>
+        <a:xfrm>
+          <a:off x="0" y="0"/>
+          <a:ext cx="0" cy="0"/>
+          <a:chOff x="0" y="0"/>
+          <a:chExt cx="0" cy="0"/>
+        </a:xfrm>
+      </p:grpSpPr>
+      <p:sp>
+        <p:nvSpPr>
+          <p:cNvPr id="2" name="Titel 1"/>
+          <p:cNvSpPr>
+            <a:spLocks noGrp="1"/>
+          </p:cNvSpPr>
+          <p:nvPr>
+            <p:ph type="title"/>
+          </p:nvPr>
+        </p:nvSpPr>
+        <p:spPr/>
+        <p:txBody>
+          <a:bodyPr>
+            <a:normAutofit fontScale="90000"/>
+          </a:bodyPr>
+          <a:lstStyle/>
+          <a:p>
+            <a:r>
+              <a:rPr lang="de-CH" dirty="0" smtClean="0"/>
+              <a:t>Android</a:t>
+            </a:r>
+            <a:endParaRPr lang="de-CH" dirty="0"/>
+          </a:p>
+        </p:txBody>
+      </p:sp>
+      <p:sp>
+        <p:nvSpPr>
+          <p:cNvPr id="3" name="Inhaltsplatzhalter 2"/>
+          <p:cNvSpPr>
+            <a:spLocks noGrp="1"/>
+          </p:cNvSpPr>
+          <p:nvPr>
+            <p:ph idx="1"/>
+          </p:nvPr>
+        </p:nvSpPr>
+        <p:spPr/>
+        <p:txBody>
+          <a:bodyPr/>
+          <a:lstStyle/>
+          <a:p>
+            <a:endParaRPr lang="de-CH"/>
+          </a:p>
+        </p:txBody>
+      </p:sp>
+    </p:spTree>
+    <p:extLst>
+      <p:ext uri="{BB962C8B-B14F-4D97-AF65-F5344CB8AC3E}">
+        <p14:creationId xmlns:p14="http://schemas.microsoft.com/office/powerpoint/2010/main" val="3006280835"/>
       </p:ext>
     </p:extLst>
   </p:cSld>
@@ -4301,54 +4383,56 @@
               <a:rPr lang="de-CH" dirty="0" smtClean="0"/>
               <a:t>Einheitliche API für unterstützte Plattformen</a:t>
             </a:r>
+          </a:p>
+          <a:p>
             <a:endParaRPr lang="de-CH" dirty="0" smtClean="0"/>
           </a:p>
           <a:p>
+            <a:r>
+              <a:rPr lang="de-CH" dirty="0" smtClean="0"/>
+              <a:t>Entwickelt von </a:t>
+            </a:r>
+            <a:r>
+              <a:rPr lang="de-CH" dirty="0" err="1" smtClean="0"/>
+              <a:t>Badlogic</a:t>
+            </a:r>
+            <a:r>
+              <a:rPr lang="de-CH" dirty="0" smtClean="0"/>
+              <a:t> Games</a:t>
+            </a:r>
+          </a:p>
+          <a:p>
+            <a:pPr lvl="1"/>
+            <a:r>
+              <a:rPr lang="de-CH" dirty="0" smtClean="0"/>
+              <a:t>Mario Zechner aus Graz, Österreich</a:t>
+            </a:r>
+            <a:endParaRPr lang="de-CH" dirty="0" smtClean="0"/>
+          </a:p>
+          <a:p>
+            <a:r>
+              <a:rPr lang="de-CH" dirty="0" smtClean="0"/>
+              <a:t>Version 1.0.0 vor 6 Monaten erschienen</a:t>
+            </a:r>
+          </a:p>
+          <a:p>
+            <a:pPr lvl="1"/>
+            <a:r>
+              <a:rPr lang="de-CH" dirty="0" smtClean="0"/>
+              <a:t>Davor 4 Jahren Entwicklung</a:t>
+            </a:r>
             <a:endParaRPr lang="de-CH" dirty="0"/>
           </a:p>
           <a:p>
             <a:r>
               <a:rPr lang="de-CH" dirty="0" smtClean="0"/>
-              <a:t>Nutzt </a:t>
-            </a:r>
-            <a:r>
-              <a:rPr lang="de-CH" dirty="0" err="1" smtClean="0"/>
-              <a:t>u.A.</a:t>
+              <a:t>Aktuell: </a:t>
             </a:r>
             <a:r>
               <a:rPr lang="de-CH" dirty="0" smtClean="0"/>
-              <a:t> folgende </a:t>
-            </a:r>
-            <a:r>
-              <a:rPr lang="de-CH" dirty="0" err="1" smtClean="0"/>
-              <a:t>third</a:t>
-            </a:r>
-            <a:r>
-              <a:rPr lang="de-CH" dirty="0" smtClean="0"/>
-              <a:t>-party </a:t>
-            </a:r>
-            <a:r>
-              <a:rPr lang="de-CH" dirty="0" err="1" smtClean="0"/>
-              <a:t>libraries</a:t>
-            </a:r>
-            <a:r>
-              <a:rPr lang="de-CH" dirty="0" smtClean="0"/>
-              <a:t>:</a:t>
-            </a:r>
-          </a:p>
-          <a:p>
-            <a:pPr lvl="1"/>
-            <a:r>
-              <a:rPr lang="de-CH" dirty="0" smtClean="0"/>
-              <a:t>Lightweight Java Game Library</a:t>
-            </a:r>
-          </a:p>
-          <a:p>
-            <a:pPr lvl="1"/>
-            <a:r>
-              <a:rPr lang="de-CH" dirty="0"/>
-              <a:t>OpenGL ES 2.0</a:t>
-            </a:r>
+              <a:t>1.4.1</a:t>
+            </a:r>
+            <a:endParaRPr lang="de-CH" dirty="0" smtClean="0"/>
           </a:p>
         </p:txBody>
       </p:sp>
@@ -4377,6 +4461,47 @@
           <a:xfrm>
             <a:off x="5748020" y="5833111"/>
             <a:ext cx="2857500" cy="476250"/>
+          </a:xfrm>
+          <a:prstGeom prst="rect">
+            <a:avLst/>
+          </a:prstGeom>
+          <a:noFill/>
+          <a:extLst>
+            <a:ext uri="{909E8E84-426E-40DD-AFC4-6F175D3DCCD1}">
+              <a14:hiddenFill xmlns:a14="http://schemas.microsoft.com/office/drawing/2010/main">
+                <a:solidFill>
+                  <a:srgbClr val="FFFFFF"/>
+                </a:solidFill>
+              </a14:hiddenFill>
+            </a:ext>
+          </a:extLst>
+        </p:spPr>
+      </p:pic>
+      <p:pic>
+        <p:nvPicPr>
+          <p:cNvPr id="4" name="Picture 2" descr="http://www.badlogicgames.com/wordpress/wp-content/uploads/2012/01/badlogic-new.png"/>
+          <p:cNvPicPr>
+            <a:picLocks noChangeAspect="1" noChangeArrowheads="1"/>
+          </p:cNvPicPr>
+          <p:nvPr/>
+        </p:nvPicPr>
+        <p:blipFill>
+          <a:blip r:embed="rId3">
+            <a:extLst>
+              <a:ext uri="{28A0092B-C50C-407E-A947-70E740481C1C}">
+                <a14:useLocalDpi xmlns:a14="http://schemas.microsoft.com/office/drawing/2010/main" val="0"/>
+              </a:ext>
+            </a:extLst>
+          </a:blip>
+          <a:srcRect/>
+          <a:stretch>
+            <a:fillRect/>
+          </a:stretch>
+        </p:blipFill>
+        <p:spPr bwMode="auto">
+          <a:xfrm>
+            <a:off x="6279459" y="2985760"/>
+            <a:ext cx="2333253" cy="887084"/>
           </a:xfrm>
           <a:prstGeom prst="rect">
             <a:avLst/>
@@ -4486,7 +4611,18 @@
             </a:r>
             <a:r>
               <a:rPr lang="de-CH" dirty="0" smtClean="0"/>
-              <a:t> Integration</a:t>
+              <a:t> </a:t>
+            </a:r>
+            <a:r>
+              <a:rPr lang="de-CH" dirty="0" smtClean="0"/>
+              <a:t>Integration</a:t>
+            </a:r>
+          </a:p>
+          <a:p>
+            <a:pPr lvl="0"/>
+            <a:r>
+              <a:rPr lang="de-CH" dirty="0" smtClean="0"/>
+              <a:t>OpenGL ES 3.0</a:t>
             </a:r>
             <a:endParaRPr lang="de-CH" dirty="0"/>
           </a:p>
@@ -4650,11 +4786,7 @@
           <a:p>
             <a:r>
               <a:rPr lang="de-CH" dirty="0" smtClean="0"/>
-              <a:t>Zusätzliche </a:t>
-            </a:r>
-            <a:r>
-              <a:rPr lang="de-CH" dirty="0" err="1" smtClean="0"/>
-              <a:t>Specs</a:t>
+              <a:t>libGDX</a:t>
             </a:r>
             <a:endParaRPr lang="de-CH" dirty="0"/>
           </a:p>
@@ -4675,14 +4807,118 @@
           <a:bodyPr/>
           <a:lstStyle/>
           <a:p>
-            <a:endParaRPr lang="de-CH" dirty="0"/>
-          </a:p>
-        </p:txBody>
-      </p:sp>
+            <a:r>
+              <a:rPr lang="de-CH" dirty="0" smtClean="0"/>
+              <a:t>Links:</a:t>
+            </a:r>
+          </a:p>
+          <a:p>
+            <a:pPr lvl="1"/>
+            <a:r>
+              <a:rPr lang="de-CH" dirty="0" smtClean="0">
+                <a:hlinkClick r:id="rId2"/>
+              </a:rPr>
+              <a:t>http</a:t>
+            </a:r>
+            <a:r>
+              <a:rPr lang="de-CH" dirty="0">
+                <a:hlinkClick r:id="rId2"/>
+              </a:rPr>
+              <a:t>://libgdx.badlogicgames.com</a:t>
+            </a:r>
+            <a:r>
+              <a:rPr lang="de-CH" dirty="0" smtClean="0">
+                <a:hlinkClick r:id="rId2"/>
+              </a:rPr>
+              <a:t>/</a:t>
+            </a:r>
+            <a:endParaRPr lang="de-CH" dirty="0" smtClean="0"/>
+          </a:p>
+          <a:p>
+            <a:pPr lvl="1"/>
+            <a:r>
+              <a:rPr lang="de-CH" dirty="0" smtClean="0">
+                <a:hlinkClick r:id="rId3"/>
+              </a:rPr>
+              <a:t>https</a:t>
+            </a:r>
+            <a:r>
+              <a:rPr lang="de-CH" dirty="0">
+                <a:hlinkClick r:id="rId3"/>
+              </a:rPr>
+              <a:t>://</a:t>
+            </a:r>
+            <a:r>
+              <a:rPr lang="de-CH" dirty="0" smtClean="0">
+                <a:hlinkClick r:id="rId3"/>
+              </a:rPr>
+              <a:t>github.com/libgdx/libgdx</a:t>
+            </a:r>
+            <a:endParaRPr lang="de-CH" dirty="0" smtClean="0"/>
+          </a:p>
+          <a:p>
+            <a:pPr lvl="1"/>
+            <a:r>
+              <a:rPr lang="de-CH" dirty="0">
+                <a:hlinkClick r:id="rId4"/>
+              </a:rPr>
+              <a:t>http://</a:t>
+            </a:r>
+            <a:r>
+              <a:rPr lang="de-CH" dirty="0" smtClean="0">
+                <a:hlinkClick r:id="rId4"/>
+              </a:rPr>
+              <a:t>www.badlogicgames.com</a:t>
+            </a:r>
+            <a:endParaRPr lang="de-CH" dirty="0" smtClean="0"/>
+          </a:p>
+        </p:txBody>
+      </p:sp>
+      <p:pic>
+        <p:nvPicPr>
+          <p:cNvPr id="4" name="Picture 2" descr="http://libgdx.badlogicgames.com/img/logo.png"/>
+          <p:cNvPicPr>
+            <a:picLocks noChangeAspect="1" noChangeArrowheads="1"/>
+          </p:cNvPicPr>
+          <p:nvPr/>
+        </p:nvPicPr>
+        <p:blipFill>
+          <a:blip r:embed="rId5">
+            <a:extLst>
+              <a:ext uri="{28A0092B-C50C-407E-A947-70E740481C1C}">
+                <a14:useLocalDpi xmlns:a14="http://schemas.microsoft.com/office/drawing/2010/main" val="0"/>
+              </a:ext>
+            </a:extLst>
+          </a:blip>
+          <a:srcRect/>
+          <a:stretch>
+            <a:fillRect/>
+          </a:stretch>
+        </p:blipFill>
+        <p:spPr bwMode="auto">
+          <a:xfrm>
+            <a:off x="5748020" y="5833111"/>
+            <a:ext cx="2857500" cy="476250"/>
+          </a:xfrm>
+          <a:prstGeom prst="rect">
+            <a:avLst/>
+          </a:prstGeom>
+          <a:noFill/>
+          <a:extLst>
+            <a:ext uri="{909E8E84-426E-40DD-AFC4-6F175D3DCCD1}">
+              <a14:hiddenFill xmlns:a14="http://schemas.microsoft.com/office/drawing/2010/main">
+                <a:solidFill>
+                  <a:srgbClr val="FFFFFF"/>
+                </a:solidFill>
+              </a14:hiddenFill>
+            </a:ext>
+          </a:extLst>
+        </p:spPr>
+      </p:pic>
     </p:spTree>
     <p:extLst>
       <p:ext uri="{BB962C8B-B14F-4D97-AF65-F5344CB8AC3E}">
-        <p14:creationId xmlns:p14="http://schemas.microsoft.com/office/powerpoint/2010/main" val="1871111388"/>
+        <p14:creationId xmlns:p14="http://schemas.microsoft.com/office/powerpoint/2010/main" val="1863351020"/>
       </p:ext>
     </p:extLst>
   </p:cSld>
@@ -4735,7 +4971,11 @@
           <a:p>
             <a:r>
               <a:rPr lang="de-CH" dirty="0" smtClean="0"/>
-              <a:t>Android</a:t>
+              <a:t>Zusätzliche </a:t>
+            </a:r>
+            <a:r>
+              <a:rPr lang="de-CH" dirty="0" err="1" smtClean="0"/>
+              <a:t>Specs</a:t>
             </a:r>
             <a:endParaRPr lang="de-CH" dirty="0"/>
           </a:p>
@@ -4756,14 +4996,14 @@
           <a:bodyPr/>
           <a:lstStyle/>
           <a:p>
-            <a:endParaRPr lang="de-CH"/>
+            <a:endParaRPr lang="de-CH" dirty="0"/>
           </a:p>
         </p:txBody>
       </p:sp>
     </p:spTree>
     <p:extLst>
       <p:ext uri="{BB962C8B-B14F-4D97-AF65-F5344CB8AC3E}">
-        <p14:creationId xmlns:p14="http://schemas.microsoft.com/office/powerpoint/2010/main" val="3006280835"/>
+        <p14:creationId xmlns:p14="http://schemas.microsoft.com/office/powerpoint/2010/main" val="1871111388"/>
       </p:ext>
     </p:extLst>
   </p:cSld>

</xml_diff>

<commit_message>
Anwendungsfalldiagramm in Analyse/Analyse_Präsentation_v1.pptx etwas angepasst.
</commit_message>
<xml_diff>
--- a/Documents/Analyse/Analyse_Präsentation_v1.pptx
+++ b/Documents/Analyse/Analyse_Präsentation_v1.pptx
@@ -126,7 +126,7 @@
   </p:defaultTextStyle>
   <p:extLst>
     <p:ext uri="{EFAFB233-063F-42B5-8137-9DF3F51BA10A}">
-      <p15:sldGuideLst xmlns="" xmlns:p15="http://schemas.microsoft.com/office/powerpoint/2012/main">
+      <p15:sldGuideLst xmlns:p15="http://schemas.microsoft.com/office/powerpoint/2012/main">
         <p15:guide id="1" orient="horz" pos="2160">
           <p15:clr>
             <a:srgbClr val="A4A3A4"/>
@@ -140,7 +140,7 @@
       </p15:sldGuideLst>
     </p:ext>
     <p:ext uri="{2D200454-40CA-4A62-9FC3-DE9A4176ACB9}">
-      <p15:notesGuideLst xmlns="" xmlns:p15="http://schemas.microsoft.com/office/powerpoint/2012/main"/>
+      <p15:notesGuideLst xmlns:p15="http://schemas.microsoft.com/office/powerpoint/2012/main"/>
     </p:ext>
   </p:extLst>
 </p:presentation>
@@ -662,6 +662,90 @@
 </file>
 
 <file path=ppt/notesSlides/notesSlide1.xml><?xml version="1.0" encoding="utf-8"?>
+<p:notes xmlns:a="http://schemas.openxmlformats.org/drawingml/2006/main" xmlns:r="http://schemas.openxmlformats.org/officeDocument/2006/relationships" xmlns:p="http://schemas.openxmlformats.org/presentationml/2006/main">
+  <p:cSld>
+    <p:spTree>
+      <p:nvGrpSpPr>
+        <p:cNvPr id="1" name=""/>
+        <p:cNvGrpSpPr/>
+        <p:nvPr/>
+      </p:nvGrpSpPr>
+      <p:grpSpPr>
+        <a:xfrm>
+          <a:off x="0" y="0"/>
+          <a:ext cx="0" cy="0"/>
+          <a:chOff x="0" y="0"/>
+          <a:chExt cx="0" cy="0"/>
+        </a:xfrm>
+      </p:grpSpPr>
+      <p:sp>
+        <p:nvSpPr>
+          <p:cNvPr id="2" name="Folienbildplatzhalter 1"/>
+          <p:cNvSpPr>
+            <a:spLocks noGrp="1" noRot="1" noChangeAspect="1"/>
+          </p:cNvSpPr>
+          <p:nvPr>
+            <p:ph type="sldImg"/>
+          </p:nvPr>
+        </p:nvSpPr>
+        <p:spPr/>
+      </p:sp>
+      <p:sp>
+        <p:nvSpPr>
+          <p:cNvPr id="3" name="Notizenplatzhalter 2"/>
+          <p:cNvSpPr>
+            <a:spLocks noGrp="1"/>
+          </p:cNvSpPr>
+          <p:nvPr>
+            <p:ph type="body" idx="1"/>
+          </p:nvPr>
+        </p:nvSpPr>
+        <p:spPr/>
+        <p:txBody>
+          <a:bodyPr/>
+          <a:lstStyle/>
+          <a:p>
+            <a:endParaRPr lang="de-CH" dirty="0"/>
+          </a:p>
+        </p:txBody>
+      </p:sp>
+      <p:sp>
+        <p:nvSpPr>
+          <p:cNvPr id="4" name="Foliennummernplatzhalter 3"/>
+          <p:cNvSpPr>
+            <a:spLocks noGrp="1"/>
+          </p:cNvSpPr>
+          <p:nvPr>
+            <p:ph type="sldNum" sz="quarter" idx="10"/>
+          </p:nvPr>
+        </p:nvSpPr>
+        <p:spPr/>
+        <p:txBody>
+          <a:bodyPr/>
+          <a:lstStyle/>
+          <a:p>
+            <a:fld id="{539D6FB8-A289-4D31-AE1B-368BC10F6FE7}" type="slidenum">
+              <a:rPr lang="de-CH" smtClean="0"/>
+              <a:t>2</a:t>
+            </a:fld>
+            <a:endParaRPr lang="de-CH"/>
+          </a:p>
+        </p:txBody>
+      </p:sp>
+    </p:spTree>
+    <p:extLst>
+      <p:ext uri="{BB962C8B-B14F-4D97-AF65-F5344CB8AC3E}">
+        <p14:creationId xmlns:p14="http://schemas.microsoft.com/office/powerpoint/2010/main" val="2707662784"/>
+      </p:ext>
+    </p:extLst>
+  </p:cSld>
+  <p:clrMapOvr>
+    <a:masterClrMapping/>
+  </p:clrMapOvr>
+</p:notes>
+</file>
+
+<file path=ppt/notesSlides/notesSlide2.xml><?xml version="1.0" encoding="utf-8"?>
 <p:notes xmlns:a="http://schemas.openxmlformats.org/drawingml/2006/main" xmlns:r="http://schemas.openxmlformats.org/officeDocument/2006/relationships" xmlns:p="http://schemas.openxmlformats.org/presentationml/2006/main">
   <p:cSld>
     <p:spTree>
@@ -4426,33 +4510,47 @@
           </a:p>
         </p:txBody>
       </p:sp>
+      <p:sp>
+        <p:nvSpPr>
+          <p:cNvPr id="8" name="Inhaltsplatzhalter 7"/>
+          <p:cNvSpPr>
+            <a:spLocks noGrp="1"/>
+          </p:cNvSpPr>
+          <p:nvPr>
+            <p:ph idx="1"/>
+          </p:nvPr>
+        </p:nvSpPr>
+        <p:spPr/>
+        <p:txBody>
+          <a:bodyPr/>
+          <a:lstStyle/>
+          <a:p>
+            <a:endParaRPr lang="de-CH" dirty="0"/>
+          </a:p>
+        </p:txBody>
+      </p:sp>
       <p:pic>
         <p:nvPicPr>
-          <p:cNvPr id="6" name="Inhaltsplatzhalter 5"/>
+          <p:cNvPr id="11" name="Grafik 10"/>
           <p:cNvPicPr>
-            <a:picLocks noGrp="1" noChangeAspect="1"/>
+            <a:picLocks noChangeAspect="1"/>
           </p:cNvPicPr>
-          <p:nvPr>
-            <p:ph idx="1"/>
-          </p:nvPr>
+          <p:nvPr/>
         </p:nvPicPr>
         <p:blipFill>
-          <a:blip r:embed="rId2">
-            <a:extLst>
-              <a:ext uri="{28A0092B-C50C-407E-A947-70E740481C1C}">
-                <a14:useLocalDpi xmlns:a14="http://schemas.microsoft.com/office/drawing/2010/main" val="0"/>
-              </a:ext>
-            </a:extLst>
-          </a:blip>
+          <a:blip r:embed="rId3"/>
           <a:stretch>
             <a:fillRect/>
           </a:stretch>
         </p:blipFill>
         <p:spPr>
           <a:xfrm>
-            <a:off x="2352670" y="1412875"/>
-            <a:ext cx="4438660" cy="4895850"/>
+            <a:off x="2051175" y="1252428"/>
+            <a:ext cx="5041650" cy="5560948"/>
           </a:xfrm>
+          <a:prstGeom prst="rect">
+            <a:avLst/>
+          </a:prstGeom>
         </p:spPr>
       </p:pic>
     </p:spTree>
@@ -6481,7 +6579,7 @@
   <a:extraClrSchemeLst/>
   <a:extLst>
     <a:ext uri="{05A4C25C-085E-4340-85A3-A5531E510DB2}">
-      <thm15:themeFamily xmlns="" xmlns:thm15="http://schemas.microsoft.com/office/thememl/2012/main" name="Office Theme" id="{62F939B6-93AF-4DB8-9C6B-D6C7DFDC589F}" vid="{4A3C46E8-61CC-4603-A589-7422A47A8E4A}"/>
+      <thm15:themeFamily xmlns:thm15="http://schemas.microsoft.com/office/thememl/2012/main" name="Office Theme" id="{62F939B6-93AF-4DB8-9C6B-D6C7DFDC589F}" vid="{4A3C46E8-61CC-4603-A589-7422A47A8E4A}"/>
     </a:ext>
   </a:extLst>
 </a:theme>

</xml_diff>

<commit_message>
Ein Zeilen im libGDX-Teil anders angeordnet.
</commit_message>
<xml_diff>
--- a/Documents/Analyse/Analyse_Präsentation_v1.pptx
+++ b/Documents/Analyse/Analyse_Präsentation_v1.pptx
@@ -127,7 +127,7 @@
   </p:defaultTextStyle>
   <p:extLst>
     <p:ext uri="{EFAFB233-063F-42B5-8137-9DF3F51BA10A}">
-      <p15:sldGuideLst xmlns:p15="http://schemas.microsoft.com/office/powerpoint/2012/main" xmlns="">
+      <p15:sldGuideLst xmlns:p15="http://schemas.microsoft.com/office/powerpoint/2012/main">
         <p15:guide id="1" orient="horz" pos="2160">
           <p15:clr>
             <a:srgbClr val="A4A3A4"/>
@@ -141,7 +141,7 @@
       </p15:sldGuideLst>
     </p:ext>
     <p:ext uri="{2D200454-40CA-4A62-9FC3-DE9A4176ACB9}">
-      <p15:notesGuideLst xmlns:p15="http://schemas.microsoft.com/office/powerpoint/2012/main" xmlns=""/>
+      <p15:notesGuideLst xmlns:p15="http://schemas.microsoft.com/office/powerpoint/2012/main"/>
     </p:ext>
   </p:extLst>
 </p:presentation>
@@ -229,7 +229,7 @@
           <a:p>
             <a:fld id="{4B25F24D-90CF-44A7-A9EA-C384FF6564EC}" type="datetimeFigureOut">
               <a:rPr lang="de-CH" smtClean="0"/>
-              <a:t>20/10/14</a:t>
+              <a:t>20.10.2014</a:t>
             </a:fld>
             <a:endParaRPr lang="de-CH"/>
           </a:p>
@@ -394,7 +394,7 @@
           <a:p>
             <a:fld id="{F2686799-5163-409F-B733-C9681AE00980}" type="datetimeFigureOut">
               <a:rPr lang="de-CH" smtClean="0"/>
-              <a:t>20/10/14</a:t>
+              <a:t>20.10.2014</a:t>
             </a:fld>
             <a:endParaRPr lang="de-CH"/>
           </a:p>
@@ -878,7 +878,7 @@
   <p:timing>
     <p:tnLst>
       <p:par>
-        <p:cTn xmlns:p14="http://schemas.microsoft.com/office/powerpoint/2010/main" id="1" dur="indefinite" restart="never" nodeType="tmRoot"/>
+        <p:cTn id="1" dur="indefinite" restart="never" nodeType="tmRoot"/>
       </p:par>
     </p:tnLst>
   </p:timing>
@@ -1002,7 +1002,7 @@
           <a:p>
             <a:fld id="{1BA50D42-C9CD-4801-B293-61D1F53EC57E}" type="datetimeFigureOut">
               <a:rPr lang="de-DE" smtClean="0"/>
-              <a:t>20/10/14</a:t>
+              <a:t>20.10.2014</a:t>
             </a:fld>
             <a:endParaRPr lang="de-DE"/>
           </a:p>
@@ -1201,7 +1201,7 @@
           <a:p>
             <a:fld id="{1BA50D42-C9CD-4801-B293-61D1F53EC57E}" type="datetimeFigureOut">
               <a:rPr lang="de-DE" smtClean="0"/>
-              <a:t>20/10/14</a:t>
+              <a:t>20.10.2014</a:t>
             </a:fld>
             <a:endParaRPr lang="de-DE"/>
           </a:p>
@@ -1378,7 +1378,7 @@
   <p:timing>
     <p:tnLst>
       <p:par>
-        <p:cTn xmlns:p14="http://schemas.microsoft.com/office/powerpoint/2010/main" id="1" dur="indefinite" restart="never" nodeType="tmRoot"/>
+        <p:cTn id="1" dur="indefinite" restart="never" nodeType="tmRoot"/>
       </p:par>
     </p:tnLst>
   </p:timing>
@@ -1552,7 +1552,7 @@
   <p:timing>
     <p:tnLst>
       <p:par>
-        <p:cTn xmlns:p14="http://schemas.microsoft.com/office/powerpoint/2010/main" id="1" dur="indefinite" restart="never" nodeType="tmRoot"/>
+        <p:cTn id="1" dur="indefinite" restart="never" nodeType="tmRoot"/>
       </p:par>
     </p:tnLst>
   </p:timing>
@@ -1754,7 +1754,7 @@
           <a:p>
             <a:fld id="{1BA50D42-C9CD-4801-B293-61D1F53EC57E}" type="datetimeFigureOut">
               <a:rPr lang="de-DE" smtClean="0"/>
-              <a:t>20/10/14</a:t>
+              <a:t>20.10.2014</a:t>
             </a:fld>
             <a:endParaRPr lang="de-DE"/>
           </a:p>
@@ -1826,7 +1826,7 @@
   <p:timing>
     <p:tnLst>
       <p:par>
-        <p:cTn xmlns:p14="http://schemas.microsoft.com/office/powerpoint/2010/main" id="1" dur="indefinite" restart="never" nodeType="tmRoot"/>
+        <p:cTn id="1" dur="indefinite" restart="never" nodeType="tmRoot"/>
       </p:par>
     </p:tnLst>
   </p:timing>
@@ -2024,7 +2024,7 @@
           <a:p>
             <a:fld id="{1BA50D42-C9CD-4801-B293-61D1F53EC57E}" type="datetimeFigureOut">
               <a:rPr lang="de-DE" smtClean="0"/>
-              <a:t>20/10/14</a:t>
+              <a:t>20.10.2014</a:t>
             </a:fld>
             <a:endParaRPr lang="de-DE"/>
           </a:p>
@@ -2096,7 +2096,7 @@
   <p:timing>
     <p:tnLst>
       <p:par>
-        <p:cTn xmlns:p14="http://schemas.microsoft.com/office/powerpoint/2010/main" id="1" dur="indefinite" restart="never" nodeType="tmRoot"/>
+        <p:cTn id="1" dur="indefinite" restart="never" nodeType="tmRoot"/>
       </p:par>
     </p:tnLst>
   </p:timing>
@@ -2128,7 +2128,7 @@
   <p:timing>
     <p:tnLst>
       <p:par>
-        <p:cTn xmlns:p14="http://schemas.microsoft.com/office/powerpoint/2010/main" id="1" dur="indefinite" restart="never" nodeType="tmRoot"/>
+        <p:cTn id="1" dur="indefinite" restart="never" nodeType="tmRoot"/>
       </p:par>
     </p:tnLst>
   </p:timing>
@@ -2177,7 +2177,7 @@
           <a:p>
             <a:fld id="{1BA50D42-C9CD-4801-B293-61D1F53EC57E}" type="datetimeFigureOut">
               <a:rPr lang="de-DE" smtClean="0"/>
-              <a:t>20/10/14</a:t>
+              <a:t>20.10.2014</a:t>
             </a:fld>
             <a:endParaRPr lang="de-DE"/>
           </a:p>
@@ -2326,7 +2326,7 @@
   <p:timing>
     <p:tnLst>
       <p:par>
-        <p:cTn xmlns:p14="http://schemas.microsoft.com/office/powerpoint/2010/main" id="1" dur="indefinite" restart="never" nodeType="tmRoot"/>
+        <p:cTn id="1" dur="indefinite" restart="never" nodeType="tmRoot"/>
       </p:par>
     </p:tnLst>
   </p:timing>
@@ -2559,7 +2559,7 @@
           <a:p>
             <a:fld id="{1BA50D42-C9CD-4801-B293-61D1F53EC57E}" type="datetimeFigureOut">
               <a:rPr lang="de-DE" smtClean="0"/>
-              <a:t>20/10/14</a:t>
+              <a:t>20.10.2014</a:t>
             </a:fld>
             <a:endParaRPr lang="de-DE"/>
           </a:p>
@@ -2631,7 +2631,7 @@
   <p:timing>
     <p:tnLst>
       <p:par>
-        <p:cTn xmlns:p14="http://schemas.microsoft.com/office/powerpoint/2010/main" id="1" dur="indefinite" restart="never" nodeType="tmRoot"/>
+        <p:cTn id="1" dur="indefinite" restart="never" nodeType="tmRoot"/>
       </p:par>
     </p:tnLst>
   </p:timing>
@@ -2862,7 +2862,7 @@
           <a:p>
             <a:fld id="{1BA50D42-C9CD-4801-B293-61D1F53EC57E}" type="datetimeFigureOut">
               <a:rPr lang="de-DE" smtClean="0"/>
-              <a:t>20/10/14</a:t>
+              <a:t>20.10.2014</a:t>
             </a:fld>
             <a:endParaRPr lang="de-DE"/>
           </a:p>
@@ -2934,7 +2934,7 @@
   <p:timing>
     <p:tnLst>
       <p:par>
-        <p:cTn xmlns:p14="http://schemas.microsoft.com/office/powerpoint/2010/main" id="1" dur="indefinite" restart="never" nodeType="tmRoot"/>
+        <p:cTn id="1" dur="indefinite" restart="never" nodeType="tmRoot"/>
       </p:par>
     </p:tnLst>
   </p:timing>
@@ -3169,7 +3169,7 @@
   <p:timing>
     <p:tnLst>
       <p:par>
-        <p:cTn xmlns:p14="http://schemas.microsoft.com/office/powerpoint/2010/main" id="1" dur="indefinite" restart="never" nodeType="tmRoot"/>
+        <p:cTn id="1" dur="indefinite" restart="never" nodeType="tmRoot"/>
       </p:par>
     </p:tnLst>
   </p:timing>
@@ -3604,7 +3604,7 @@
   <p:timing>
     <p:tnLst>
       <p:par>
-        <p:cTn xmlns:p14="http://schemas.microsoft.com/office/powerpoint/2010/main" id="1" dur="indefinite" restart="never" nodeType="tmRoot"/>
+        <p:cTn id="1" dur="indefinite" restart="never" nodeType="tmRoot"/>
       </p:par>
     </p:tnLst>
   </p:timing>
@@ -3678,10 +3678,24 @@
           <a:p>
             <a:r>
               <a:rPr lang="de-CH" dirty="0" smtClean="0"/>
-              <a:t>Einheitliche API für unterstützte Plattformen</a:t>
-            </a:r>
-          </a:p>
-          <a:p>
+              <a:t>Einheitliche API für unterstützte </a:t>
+            </a:r>
+            <a:r>
+              <a:rPr lang="de-CH" dirty="0" smtClean="0"/>
+              <a:t>Plattformen</a:t>
+            </a:r>
+          </a:p>
+          <a:p>
+            <a:pPr marL="411480" lvl="2"/>
+            <a:r>
+              <a:rPr lang="de-CH" dirty="0"/>
+              <a:t>Android, Windows, Mac, Linux, iOS, BlackBerry und HTML5</a:t>
+            </a:r>
+          </a:p>
+          <a:p>
+            <a:pPr marL="45720" indent="0">
+              <a:buNone/>
+            </a:pPr>
             <a:endParaRPr lang="de-CH" dirty="0" smtClean="0"/>
           </a:p>
           <a:p>
@@ -3759,7 +3773,7 @@
           <a:noFill/>
           <a:extLst>
             <a:ext uri="{909E8E84-426E-40dd-AFC4-6F175D3DCCD1}">
-              <a14:hiddenFill xmlns:a14="http://schemas.microsoft.com/office/drawing/2010/main">
+              <a14:hiddenFill xmlns:a14="http://schemas.microsoft.com/office/drawing/2010/main" xmlns="">
                 <a:solidFill>
                   <a:srgbClr val="FFFFFF"/>
                 </a:solidFill>
@@ -3791,7 +3805,7 @@
         </p:blipFill>
         <p:spPr bwMode="auto">
           <a:xfrm>
-            <a:off x="6279459" y="2985760"/>
+            <a:off x="6277339" y="3417526"/>
             <a:ext cx="2333253" cy="887084"/>
           </a:xfrm>
           <a:prstGeom prst="rect">
@@ -3800,7 +3814,7 @@
           <a:noFill/>
           <a:extLst>
             <a:ext uri="{909E8E84-426E-40dd-AFC4-6F175D3DCCD1}">
-              <a14:hiddenFill xmlns:a14="http://schemas.microsoft.com/office/drawing/2010/main">
+              <a14:hiddenFill xmlns:a14="http://schemas.microsoft.com/office/drawing/2010/main" xmlns="">
                 <a:solidFill>
                   <a:srgbClr val="FFFFFF"/>
                 </a:solidFill>
@@ -3822,7 +3836,7 @@
   <p:timing>
     <p:tnLst>
       <p:par>
-        <p:cTn xmlns:p14="http://schemas.microsoft.com/office/powerpoint/2010/main" id="1" dur="indefinite" restart="never" nodeType="tmRoot"/>
+        <p:cTn id="1" dur="indefinite" restart="never" nodeType="tmRoot"/>
       </p:par>
     </p:tnLst>
   </p:timing>
@@ -3931,8 +3945,15 @@
               <a:t>aktiver </a:t>
             </a:r>
             <a:r>
-              <a:rPr lang="de-CH" dirty="0" err="1" smtClean="0"/>
-              <a:t>EntwicklungGrosse</a:t>
+              <a:rPr lang="de-CH" dirty="0" smtClean="0"/>
+              <a:t>Entwicklung</a:t>
+            </a:r>
+          </a:p>
+          <a:p>
+            <a:pPr lvl="0"/>
+            <a:r>
+              <a:rPr lang="de-CH" dirty="0" smtClean="0"/>
+              <a:t>Grosse</a:t>
             </a:r>
             <a:r>
               <a:rPr lang="de-CH" dirty="0"/>
@@ -3953,26 +3974,7 @@
               <a:rPr lang="de-CH" dirty="0" smtClean="0"/>
               <a:t>dokumentiert</a:t>
             </a:r>
-          </a:p>
-          <a:p>
-            <a:pPr lvl="0"/>
-            <a:r>
-              <a:rPr lang="de-CH" dirty="0" smtClean="0"/>
-              <a:t>Cross </a:t>
-            </a:r>
-            <a:r>
-              <a:rPr lang="de-CH" dirty="0" err="1" smtClean="0"/>
-              <a:t>Platform</a:t>
-            </a:r>
             <a:endParaRPr lang="de-CH" dirty="0" smtClean="0"/>
-          </a:p>
-          <a:p>
-            <a:pPr lvl="1"/>
-            <a:r>
-              <a:rPr lang="de-CH" dirty="0" smtClean="0"/>
-              <a:t>Android, Windows, Mac, Linux, iOS, BlackBerry und HTML5</a:t>
-            </a:r>
-            <a:endParaRPr lang="de-CH" dirty="0"/>
           </a:p>
         </p:txBody>
       </p:sp>
@@ -4008,7 +4010,7 @@
           <a:noFill/>
           <a:extLst>
             <a:ext uri="{909E8E84-426E-40dd-AFC4-6F175D3DCCD1}">
-              <a14:hiddenFill xmlns:a14="http://schemas.microsoft.com/office/drawing/2010/main">
+              <a14:hiddenFill xmlns:a14="http://schemas.microsoft.com/office/drawing/2010/main" xmlns="">
                 <a:solidFill>
                   <a:srgbClr val="FFFFFF"/>
                 </a:solidFill>
@@ -4030,7 +4032,7 @@
   <p:timing>
     <p:tnLst>
       <p:par>
-        <p:cTn xmlns:p14="http://schemas.microsoft.com/office/powerpoint/2010/main" id="1" dur="indefinite" restart="never" nodeType="tmRoot"/>
+        <p:cTn id="1" dur="indefinite" restart="never" nodeType="tmRoot"/>
       </p:par>
     </p:tnLst>
   </p:timing>
@@ -4193,7 +4195,7 @@
           <a:noFill/>
           <a:extLst>
             <a:ext uri="{909E8E84-426E-40dd-AFC4-6F175D3DCCD1}">
-              <a14:hiddenFill xmlns:a14="http://schemas.microsoft.com/office/drawing/2010/main">
+              <a14:hiddenFill xmlns:a14="http://schemas.microsoft.com/office/drawing/2010/main" xmlns="">
                 <a:solidFill>
                   <a:srgbClr val="FFFFFF"/>
                 </a:solidFill>
@@ -4215,7 +4217,7 @@
   <p:timing>
     <p:tnLst>
       <p:par>
-        <p:cTn xmlns:p14="http://schemas.microsoft.com/office/powerpoint/2010/main" id="1" dur="indefinite" restart="never" nodeType="tmRoot"/>
+        <p:cTn id="1" dur="indefinite" restart="never" nodeType="tmRoot"/>
       </p:par>
     </p:tnLst>
   </p:timing>
@@ -4326,7 +4328,7 @@
   <p:timing>
     <p:tnLst>
       <p:par>
-        <p:cTn xmlns:p14="http://schemas.microsoft.com/office/powerpoint/2010/main" id="1" dur="indefinite" restart="never" nodeType="tmRoot"/>
+        <p:cTn id="1" dur="indefinite" restart="never" nodeType="tmRoot"/>
       </p:par>
     </p:tnLst>
   </p:timing>
@@ -4458,7 +4460,7 @@
           <p:nvPr/>
         </p:nvPicPr>
         <p:blipFill>
-          <a:blip r:embed="rId2">
+          <a:blip r:embed="rId2" cstate="print">
             <a:extLst>
               <a:ext uri="{28A0092B-C50C-407E-A947-70E740481C1C}">
                 <a14:useLocalDpi xmlns:a14="http://schemas.microsoft.com/office/drawing/2010/main" val="0"/>
@@ -4492,7 +4494,7 @@
   <p:timing>
     <p:tnLst>
       <p:par>
-        <p:cTn xmlns:p14="http://schemas.microsoft.com/office/powerpoint/2010/main" id="1" dur="indefinite" restart="never" nodeType="tmRoot"/>
+        <p:cTn id="1" dur="indefinite" restart="never" nodeType="tmRoot"/>
       </p:par>
     </p:tnLst>
   </p:timing>
@@ -4554,7 +4556,7 @@
   <p:timing>
     <p:tnLst>
       <p:par>
-        <p:cTn xmlns:p14="http://schemas.microsoft.com/office/powerpoint/2010/main" id="1" dur="indefinite" restart="never" nodeType="tmRoot"/>
+        <p:cTn id="1" dur="indefinite" restart="never" nodeType="tmRoot"/>
       </p:par>
     </p:tnLst>
   </p:timing>
@@ -4629,7 +4631,7 @@
   <p:timing>
     <p:tnLst>
       <p:par>
-        <p:cTn xmlns:p14="http://schemas.microsoft.com/office/powerpoint/2010/main" id="1" dur="indefinite" restart="never" nodeType="tmRoot"/>
+        <p:cTn id="1" dur="indefinite" restart="never" nodeType="tmRoot"/>
       </p:par>
     </p:tnLst>
   </p:timing>
@@ -4734,7 +4736,7 @@
   <p:timing>
     <p:tnLst>
       <p:par>
-        <p:cTn xmlns:p14="http://schemas.microsoft.com/office/powerpoint/2010/main" id="1" dur="indefinite" restart="never" nodeType="tmRoot"/>
+        <p:cTn id="1" dur="indefinite" restart="never" nodeType="tmRoot"/>
       </p:par>
     </p:tnLst>
   </p:timing>
@@ -4818,14 +4820,14 @@
           <a:effectLst/>
           <a:extLst>
             <a:ext uri="{909E8E84-426E-40dd-AFC4-6F175D3DCCD1}">
-              <a14:hiddenFill xmlns:a14="http://schemas.microsoft.com/office/drawing/2010/main">
+              <a14:hiddenFill xmlns:a14="http://schemas.microsoft.com/office/drawing/2010/main" xmlns="">
                 <a:solidFill>
                   <a:schemeClr val="accent1"/>
                 </a:solidFill>
               </a14:hiddenFill>
             </a:ext>
             <a:ext uri="{91240B29-F687-4f45-9708-019B960494DF}">
-              <a14:hiddenLine xmlns:a14="http://schemas.microsoft.com/office/drawing/2010/main" w="9525">
+              <a14:hiddenLine xmlns:a14="http://schemas.microsoft.com/office/drawing/2010/main" xmlns="" w="9525">
                 <a:solidFill>
                   <a:schemeClr val="tx1"/>
                 </a:solidFill>
@@ -4835,7 +4837,7 @@
               </a14:hiddenLine>
             </a:ext>
             <a:ext uri="{AF507438-7753-43e0-B8FC-AC1667EBCBE1}">
-              <a14:hiddenEffects xmlns:a14="http://schemas.microsoft.com/office/drawing/2010/main">
+              <a14:hiddenEffects xmlns:a14="http://schemas.microsoft.com/office/drawing/2010/main" xmlns="">
                 <a:effectLst>
                   <a:outerShdw dist="35921" dir="2700000" algn="ctr" rotWithShape="0">
                     <a:schemeClr val="bg2"/>
@@ -4859,7 +4861,7 @@
   <p:timing>
     <p:tnLst>
       <p:par>
-        <p:cTn xmlns:p14="http://schemas.microsoft.com/office/powerpoint/2010/main" id="1" dur="indefinite" restart="never" nodeType="tmRoot"/>
+        <p:cTn id="1" dur="indefinite" restart="never" nodeType="tmRoot"/>
       </p:par>
     </p:tnLst>
   </p:timing>
@@ -4943,14 +4945,14 @@
           <a:effectLst/>
           <a:extLst>
             <a:ext uri="{909E8E84-426E-40dd-AFC4-6F175D3DCCD1}">
-              <a14:hiddenFill xmlns:a14="http://schemas.microsoft.com/office/drawing/2010/main">
+              <a14:hiddenFill xmlns:a14="http://schemas.microsoft.com/office/drawing/2010/main" xmlns="">
                 <a:solidFill>
                   <a:schemeClr val="accent1"/>
                 </a:solidFill>
               </a14:hiddenFill>
             </a:ext>
             <a:ext uri="{91240B29-F687-4f45-9708-019B960494DF}">
-              <a14:hiddenLine xmlns:a14="http://schemas.microsoft.com/office/drawing/2010/main" w="9525">
+              <a14:hiddenLine xmlns:a14="http://schemas.microsoft.com/office/drawing/2010/main" xmlns="" w="9525">
                 <a:solidFill>
                   <a:schemeClr val="tx1"/>
                 </a:solidFill>
@@ -4960,7 +4962,7 @@
               </a14:hiddenLine>
             </a:ext>
             <a:ext uri="{AF507438-7753-43e0-B8FC-AC1667EBCBE1}">
-              <a14:hiddenEffects xmlns:a14="http://schemas.microsoft.com/office/drawing/2010/main">
+              <a14:hiddenEffects xmlns:a14="http://schemas.microsoft.com/office/drawing/2010/main" xmlns="">
                 <a:effectLst>
                   <a:outerShdw dist="35921" dir="2700000" algn="ctr" rotWithShape="0">
                     <a:schemeClr val="bg2"/>
@@ -4984,7 +4986,7 @@
   <p:timing>
     <p:tnLst>
       <p:par>
-        <p:cTn xmlns:p14="http://schemas.microsoft.com/office/powerpoint/2010/main" id="1" dur="indefinite" restart="never" nodeType="tmRoot"/>
+        <p:cTn id="1" dur="indefinite" restart="never" nodeType="tmRoot"/>
       </p:par>
     </p:tnLst>
   </p:timing>
@@ -5068,14 +5070,14 @@
           <a:effectLst/>
           <a:extLst>
             <a:ext uri="{909E8E84-426E-40dd-AFC4-6F175D3DCCD1}">
-              <a14:hiddenFill xmlns:a14="http://schemas.microsoft.com/office/drawing/2010/main">
+              <a14:hiddenFill xmlns:a14="http://schemas.microsoft.com/office/drawing/2010/main" xmlns="">
                 <a:solidFill>
                   <a:schemeClr val="accent1"/>
                 </a:solidFill>
               </a14:hiddenFill>
             </a:ext>
             <a:ext uri="{91240B29-F687-4f45-9708-019B960494DF}">
-              <a14:hiddenLine xmlns:a14="http://schemas.microsoft.com/office/drawing/2010/main" w="9525">
+              <a14:hiddenLine xmlns:a14="http://schemas.microsoft.com/office/drawing/2010/main" xmlns="" w="9525">
                 <a:solidFill>
                   <a:schemeClr val="tx1"/>
                 </a:solidFill>
@@ -5085,7 +5087,7 @@
               </a14:hiddenLine>
             </a:ext>
             <a:ext uri="{AF507438-7753-43e0-B8FC-AC1667EBCBE1}">
-              <a14:hiddenEffects xmlns:a14="http://schemas.microsoft.com/office/drawing/2010/main">
+              <a14:hiddenEffects xmlns:a14="http://schemas.microsoft.com/office/drawing/2010/main" xmlns="">
                 <a:effectLst>
                   <a:outerShdw dist="35921" dir="2700000" algn="ctr" rotWithShape="0">
                     <a:schemeClr val="bg2"/>
@@ -5109,7 +5111,7 @@
   <p:timing>
     <p:tnLst>
       <p:par>
-        <p:cTn xmlns:p14="http://schemas.microsoft.com/office/powerpoint/2010/main" id="1" dur="indefinite" restart="never" nodeType="tmRoot"/>
+        <p:cTn id="1" dur="indefinite" restart="never" nodeType="tmRoot"/>
       </p:par>
     </p:tnLst>
   </p:timing>
@@ -5193,14 +5195,14 @@
           <a:effectLst/>
           <a:extLst>
             <a:ext uri="{909E8E84-426E-40dd-AFC4-6F175D3DCCD1}">
-              <a14:hiddenFill xmlns:a14="http://schemas.microsoft.com/office/drawing/2010/main">
+              <a14:hiddenFill xmlns:a14="http://schemas.microsoft.com/office/drawing/2010/main" xmlns="">
                 <a:solidFill>
                   <a:schemeClr val="accent1"/>
                 </a:solidFill>
               </a14:hiddenFill>
             </a:ext>
             <a:ext uri="{91240B29-F687-4f45-9708-019B960494DF}">
-              <a14:hiddenLine xmlns:a14="http://schemas.microsoft.com/office/drawing/2010/main" w="9525">
+              <a14:hiddenLine xmlns:a14="http://schemas.microsoft.com/office/drawing/2010/main" xmlns="" w="9525">
                 <a:solidFill>
                   <a:schemeClr val="tx1"/>
                 </a:solidFill>
@@ -5210,7 +5212,7 @@
               </a14:hiddenLine>
             </a:ext>
             <a:ext uri="{AF507438-7753-43e0-B8FC-AC1667EBCBE1}">
-              <a14:hiddenEffects xmlns:a14="http://schemas.microsoft.com/office/drawing/2010/main">
+              <a14:hiddenEffects xmlns:a14="http://schemas.microsoft.com/office/drawing/2010/main" xmlns="">
                 <a:effectLst>
                   <a:outerShdw dist="35921" dir="2700000" algn="ctr" rotWithShape="0">
                     <a:schemeClr val="bg2"/>
@@ -5234,7 +5236,7 @@
   <p:timing>
     <p:tnLst>
       <p:par>
-        <p:cTn xmlns:p14="http://schemas.microsoft.com/office/powerpoint/2010/main" id="1" dur="indefinite" restart="never" nodeType="tmRoot"/>
+        <p:cTn id="1" dur="indefinite" restart="never" nodeType="tmRoot"/>
       </p:par>
     </p:tnLst>
   </p:timing>
@@ -5318,14 +5320,14 @@
           <a:effectLst/>
           <a:extLst>
             <a:ext uri="{909E8E84-426E-40dd-AFC4-6F175D3DCCD1}">
-              <a14:hiddenFill xmlns:a14="http://schemas.microsoft.com/office/drawing/2010/main">
+              <a14:hiddenFill xmlns:a14="http://schemas.microsoft.com/office/drawing/2010/main" xmlns="">
                 <a:solidFill>
                   <a:schemeClr val="accent1"/>
                 </a:solidFill>
               </a14:hiddenFill>
             </a:ext>
             <a:ext uri="{91240B29-F687-4f45-9708-019B960494DF}">
-              <a14:hiddenLine xmlns:a14="http://schemas.microsoft.com/office/drawing/2010/main" w="9525">
+              <a14:hiddenLine xmlns:a14="http://schemas.microsoft.com/office/drawing/2010/main" xmlns="" w="9525">
                 <a:solidFill>
                   <a:schemeClr val="tx1"/>
                 </a:solidFill>
@@ -5335,7 +5337,7 @@
               </a14:hiddenLine>
             </a:ext>
             <a:ext uri="{AF507438-7753-43e0-B8FC-AC1667EBCBE1}">
-              <a14:hiddenEffects xmlns:a14="http://schemas.microsoft.com/office/drawing/2010/main">
+              <a14:hiddenEffects xmlns:a14="http://schemas.microsoft.com/office/drawing/2010/main" xmlns="">
                 <a:effectLst>
                   <a:outerShdw dist="35921" dir="2700000" algn="ctr" rotWithShape="0">
                     <a:schemeClr val="bg2"/>
@@ -5359,7 +5361,7 @@
   <p:timing>
     <p:tnLst>
       <p:par>
-        <p:cTn xmlns:p14="http://schemas.microsoft.com/office/powerpoint/2010/main" id="1" dur="indefinite" restart="never" nodeType="tmRoot"/>
+        <p:cTn id="1" dur="indefinite" restart="never" nodeType="tmRoot"/>
       </p:par>
     </p:tnLst>
   </p:timing>
@@ -5502,7 +5504,7 @@
   <p:timing>
     <p:tnLst>
       <p:par>
-        <p:cTn xmlns:p14="http://schemas.microsoft.com/office/powerpoint/2010/main" id="1" dur="indefinite" restart="never" nodeType="tmRoot"/>
+        <p:cTn id="1" dur="indefinite" restart="never" nodeType="tmRoot"/>
       </p:par>
     </p:tnLst>
   </p:timing>
@@ -5772,7 +5774,7 @@
   <p:timing>
     <p:tnLst>
       <p:par>
-        <p:cTn xmlns:p14="http://schemas.microsoft.com/office/powerpoint/2010/main" id="1" dur="indefinite" restart="never" nodeType="tmRoot">
+        <p:cTn id="1" dur="indefinite" restart="never" nodeType="tmRoot">
           <p:childTnLst>
             <p:seq concurrent="1" nextAc="seek">
               <p:cTn id="2" dur="indefinite" nodeType="mainSeq">
@@ -6747,7 +6749,7 @@
   <a:extraClrSchemeLst/>
   <a:extLst>
     <a:ext uri="{05A4C25C-085E-4340-85A3-A5531E510DB2}">
-      <thm15:themeFamily xmlns:thm15="http://schemas.microsoft.com/office/thememl/2012/main" xmlns="" name="Office Theme" id="{62F939B6-93AF-4DB8-9C6B-D6C7DFDC589F}" vid="{4A3C46E8-61CC-4603-A589-7422A47A8E4A}"/>
+      <thm15:themeFamily xmlns:thm15="http://schemas.microsoft.com/office/thememl/2012/main" name="Office Theme" id="{62F939B6-93AF-4DB8-9C6B-D6C7DFDC589F}" vid="{4A3C46E8-61CC-4603-A589-7422A47A8E4A}"/>
     </a:ext>
   </a:extLst>
 </a:theme>

</xml_diff>